<commit_message>
Setting Up Data Storage System in Database
- Set object to be created every
  frame in master client

- Set the colliding game object to
  be destroyed when it collides with
  a photon object

- Set common variables to sync

- Set variables to save to playfab
  stats
</commit_message>
<xml_diff>
--- a/Assets/Class/Photon Server/PPT Data/Photon RPC.pptx
+++ b/Assets/Class/Photon Server/PPT Data/Photon RPC.pptx
@@ -2,7 +2,7 @@
 <file path=ppt/presentation.xml><?xml version="1.0" encoding="utf-8"?>
 <p:presentation xmlns:a="http://schemas.openxmlformats.org/drawingml/2006/main" xmlns:r="http://schemas.openxmlformats.org/officeDocument/2006/relationships" xmlns:p="http://schemas.openxmlformats.org/presentationml/2006/main" xmlns:p14="http://schemas.microsoft.com/office/powerpoint/2010/main" saveSubsetFonts="1" firstSlideNum="0">
   <p:sldMasterIdLst>
-    <p:sldMasterId id="2147486816" r:id="rId12"/>
+    <p:sldMasterId id="2147486818" r:id="rId12"/>
   </p:sldMasterIdLst>
   <p:notesMasterIdLst>
     <p:notesMasterId r:id="rId14"/>
@@ -13,11 +13,10 @@
     <p:sldId id="317" r:id="rId20"/>
     <p:sldId id="320" r:id="rId22"/>
     <p:sldId id="316" r:id="rId24"/>
-    <p:sldId id="321" r:id="rId26"/>
-    <p:sldId id="318" r:id="rId28"/>
-    <p:sldId id="314" r:id="rId30"/>
-    <p:sldId id="319" r:id="rId32"/>
-    <p:sldId id="322" r:id="rId34"/>
+    <p:sldId id="318" r:id="rId26"/>
+    <p:sldId id="314" r:id="rId27"/>
+    <p:sldId id="319" r:id="rId28"/>
+    <p:sldId id="322" r:id="rId29"/>
   </p:sldIdLst>
   <p:sldSz cx="12192000" cy="6858000"/>
   <p:notesSz cx="6858000" cy="9144000"/>
@@ -618,148 +617,6 @@
 </p:notes>
 </file>
 
-<file path=ppt/notesSlides/notesSlide10.xml><?xml version="1.0" encoding="utf-8"?>
-<p:notes xmlns:a="http://schemas.openxmlformats.org/drawingml/2006/main" xmlns:r="http://schemas.openxmlformats.org/officeDocument/2006/relationships" xmlns:p="http://schemas.openxmlformats.org/presentationml/2006/main">
-  <p:cSld>
-    <p:spTree>
-      <p:nvGrpSpPr>
-        <p:cNvPr id="1" name=""/>
-        <p:cNvGrpSpPr/>
-        <p:nvPr/>
-      </p:nvGrpSpPr>
-      <p:grpSpPr>
-        <a:xfrm>
-          <a:off x="0" y="0"/>
-          <a:ext cx="0" cy="0"/>
-          <a:chOff x="0" y="0"/>
-          <a:chExt cx="0" cy="0"/>
-        </a:xfrm>
-      </p:grpSpPr>
-      <p:sp>
-        <p:nvSpPr>
-          <p:cNvPr id="2" name="슬라이드 이미지 개체 틀 3"/>
-          <p:cNvSpPr>
-            <a:spLocks noChangeAspect="1"/>
-          </p:cNvSpPr>
-          <p:nvPr>
-            <p:ph type="sldImg" idx="2"/>
-          </p:nvPr>
-        </p:nvSpPr>
-        <p:spPr>
-          <a:xfrm rot="0">
-            <a:off x="685800" y="1143000"/>
-            <a:ext cx="5494020" cy="3093720"/>
-          </a:xfrm>
-          <a:prstGeom prst="rect"/>
-          <a:noFill/>
-          <a:ln w="12700" cap="flat" cmpd="sng">
-            <a:solidFill>
-              <a:srgbClr val="000000">
-                <a:alpha val="100000"/>
-              </a:srgbClr>
-            </a:solidFill>
-            <a:prstDash val="solid"/>
-          </a:ln>
-        </p:spPr>
-        <p:txBody>
-          <a:bodyPr wrap="square" lIns="91440" tIns="45720" rIns="91440" bIns="45720" numCol="1" vert="horz" anchor="ctr">
-            <a:noAutofit/>
-          </a:bodyPr>
-          <a:lstStyle/>
-          <a:p>
-            <a:pPr marL="0" indent="0" latinLnBrk="0">
-              <a:buFontTx/>
-              <a:buNone/>
-            </a:pPr>
-          </a:p>
-        </p:txBody>
-      </p:sp>
-      <p:sp>
-        <p:nvSpPr>
-          <p:cNvPr id="3" name="슬라이드 노트 개체 틀 4"/>
-          <p:cNvSpPr txBox="1">
-            <a:spLocks/>
-          </p:cNvSpPr>
-          <p:nvPr>
-            <p:ph type="body" idx="3"/>
-          </p:nvPr>
-        </p:nvSpPr>
-        <p:spPr>
-          <a:xfrm rot="0">
-            <a:off x="685800" y="4400550"/>
-            <a:ext cx="5494020" cy="3608070"/>
-          </a:xfrm>
-          <a:prstGeom prst="rect"/>
-        </p:spPr>
-        <p:txBody>
-          <a:bodyPr wrap="square" lIns="91440" tIns="45720" rIns="91440" bIns="45720" numCol="1" vert="horz" anchor="t">
-            <a:noAutofit/>
-          </a:bodyPr>
-          <a:lstStyle/>
-          <a:p>
-            <a:pPr marL="0" indent="0" latinLnBrk="0">
-              <a:buFontTx/>
-              <a:buNone/>
-            </a:pPr>
-          </a:p>
-        </p:txBody>
-      </p:sp>
-      <p:sp>
-        <p:nvSpPr>
-          <p:cNvPr id="4" name="슬라이드 번호 개체 틀 6"/>
-          <p:cNvSpPr txBox="1">
-            <a:spLocks/>
-          </p:cNvSpPr>
-          <p:nvPr>
-            <p:ph type="sldNum" idx="5"/>
-          </p:nvPr>
-        </p:nvSpPr>
-        <p:spPr>
-          <a:xfrm rot="0">
-            <a:off x="3884930" y="8685530"/>
-            <a:ext cx="2979420" cy="466090"/>
-          </a:xfrm>
-          <a:prstGeom prst="rect"/>
-        </p:spPr>
-        <p:txBody>
-          <a:bodyPr wrap="square" lIns="91440" tIns="45720" rIns="91440" bIns="45720" numCol="1" vert="horz" anchor="b">
-            <a:noAutofit/>
-          </a:bodyPr>
-          <a:lstStyle>
-            <a:lvl1pPr marL="0" indent="0" algn="r" latinLnBrk="0">
-              <a:buFontTx/>
-              <a:buNone/>
-              <a:defRPr lang="en-GB" altLang="en-US" sz="1200"/>
-            </a:lvl1pPr>
-          </a:lstStyle>
-          <a:p>
-            <a:pPr marL="0" indent="0" latinLnBrk="0">
-              <a:buFontTx/>
-              <a:buNone/>
-            </a:pPr>
-            <a:fld id="{B9320F77-B9A0-41C5-862A-B4B631284C64}" type="slidenum">
-              <a:rPr lang="ko-KR" altLang="en-US"/>
-              <a:t>‹#›</a:t>
-            </a:fld>
-          </a:p>
-        </p:txBody>
-      </p:sp>
-    </p:spTree>
-  </p:cSld>
-  <p:clrMapOvr>
-    <a:masterClrMapping/>
-  </p:clrMapOvr>
-  <mc:AlternateContent xmlns:mc="http://schemas.openxmlformats.org/markup-compatibility/2006">
-    <mc:Choice xmlns:p14="http://schemas.microsoft.com/office/powerpoint/2010/main" Requires="p14">
-      <p:transition spd="slow" p14:dur="0"/>
-    </mc:Choice>
-    <mc:Fallback>
-      <p:transition spd="slow"/>
-    </mc:Fallback>
-  </mc:AlternateContent>
-</p:notes>
-</file>
-
 <file path=ppt/notesSlides/notesSlide2.xml><?xml version="1.0" encoding="utf-8"?>
 <p:notes xmlns:a="http://schemas.openxmlformats.org/drawingml/2006/main" xmlns:r="http://schemas.openxmlformats.org/officeDocument/2006/relationships" xmlns:p="http://schemas.openxmlformats.org/presentationml/2006/main">
   <p:cSld>
@@ -1358,7 +1215,7 @@
         <p:spPr>
           <a:xfrm rot="0">
             <a:off x="685800" y="1143000"/>
-            <a:ext cx="5494020" cy="3093720"/>
+            <a:ext cx="5493385" cy="3093085"/>
           </a:xfrm>
           <a:prstGeom prst="rect"/>
           <a:noFill/>
@@ -1397,7 +1254,7 @@
         <p:spPr>
           <a:xfrm rot="0">
             <a:off x="685800" y="4400550"/>
-            <a:ext cx="5494020" cy="3608070"/>
+            <a:ext cx="5493385" cy="3607435"/>
           </a:xfrm>
           <a:prstGeom prst="rect"/>
         </p:spPr>
@@ -1427,7 +1284,7 @@
         <p:spPr>
           <a:xfrm rot="0">
             <a:off x="3884930" y="8685530"/>
-            <a:ext cx="2979420" cy="466090"/>
+            <a:ext cx="2978785" cy="465455"/>
           </a:xfrm>
           <a:prstGeom prst="rect"/>
         </p:spPr>
@@ -1500,7 +1357,7 @@
         <p:spPr>
           <a:xfrm rot="0">
             <a:off x="685800" y="1143000"/>
-            <a:ext cx="5493385" cy="3093085"/>
+            <a:ext cx="5492750" cy="3092450"/>
           </a:xfrm>
           <a:prstGeom prst="rect"/>
           <a:noFill/>
@@ -1539,7 +1396,7 @@
         <p:spPr>
           <a:xfrm rot="0">
             <a:off x="685800" y="4400550"/>
-            <a:ext cx="5493385" cy="3607435"/>
+            <a:ext cx="5492750" cy="3606800"/>
           </a:xfrm>
           <a:prstGeom prst="rect"/>
         </p:spPr>
@@ -1569,7 +1426,7 @@
         <p:spPr>
           <a:xfrm rot="0">
             <a:off x="3884930" y="8685530"/>
-            <a:ext cx="2978785" cy="465455"/>
+            <a:ext cx="2978150" cy="464820"/>
           </a:xfrm>
           <a:prstGeom prst="rect"/>
         </p:spPr>
@@ -1642,7 +1499,7 @@
         <p:spPr>
           <a:xfrm rot="0">
             <a:off x="685800" y="1143000"/>
-            <a:ext cx="5492750" cy="3092450"/>
+            <a:ext cx="5493385" cy="3093085"/>
           </a:xfrm>
           <a:prstGeom prst="rect"/>
           <a:noFill/>
@@ -1681,7 +1538,7 @@
         <p:spPr>
           <a:xfrm rot="0">
             <a:off x="685800" y="4400550"/>
-            <a:ext cx="5492750" cy="3606800"/>
+            <a:ext cx="5493385" cy="3607435"/>
           </a:xfrm>
           <a:prstGeom prst="rect"/>
         </p:spPr>
@@ -1711,7 +1568,7 @@
         <p:spPr>
           <a:xfrm rot="0">
             <a:off x="3884930" y="8685530"/>
-            <a:ext cx="2978150" cy="464820"/>
+            <a:ext cx="2978785" cy="465455"/>
           </a:xfrm>
           <a:prstGeom prst="rect"/>
         </p:spPr>
@@ -1784,7 +1641,7 @@
         <p:spPr>
           <a:xfrm rot="0">
             <a:off x="685800" y="1143000"/>
-            <a:ext cx="5493385" cy="3093085"/>
+            <a:ext cx="5494020" cy="3093720"/>
           </a:xfrm>
           <a:prstGeom prst="rect"/>
           <a:noFill/>
@@ -1823,7 +1680,7 @@
         <p:spPr>
           <a:xfrm rot="0">
             <a:off x="685800" y="4400550"/>
-            <a:ext cx="5493385" cy="3607435"/>
+            <a:ext cx="5494020" cy="3608070"/>
           </a:xfrm>
           <a:prstGeom prst="rect"/>
         </p:spPr>
@@ -1853,7 +1710,7 @@
         <p:spPr>
           <a:xfrm rot="0">
             <a:off x="3884930" y="8685530"/>
-            <a:ext cx="2978785" cy="465455"/>
+            <a:ext cx="2979420" cy="466090"/>
           </a:xfrm>
           <a:prstGeom prst="rect"/>
         </p:spPr>
@@ -7499,733 +7356,6 @@
 </p:sld>
 </file>
 
-<file path=ppt/slides/slide10.xml><?xml version="1.0" encoding="utf-8"?>
-<p:sld xmlns:a="http://schemas.openxmlformats.org/drawingml/2006/main" xmlns:r="http://schemas.openxmlformats.org/officeDocument/2006/relationships" xmlns:p="http://schemas.openxmlformats.org/presentationml/2006/main">
-  <p:cSld>
-    <p:spTree>
-      <p:nvGrpSpPr>
-        <p:cNvPr id="1" name=""/>
-        <p:cNvGrpSpPr/>
-        <p:nvPr/>
-      </p:nvGrpSpPr>
-      <p:grpSpPr>
-        <a:xfrm>
-          <a:off x="0" y="0"/>
-          <a:ext cx="0" cy="0"/>
-          <a:chOff x="0" y="0"/>
-          <a:chExt cx="0" cy="0"/>
-        </a:xfrm>
-      </p:grpSpPr>
-      <p:sp>
-        <p:nvSpPr>
-          <p:cNvPr id="29" name="Rect 0"/>
-          <p:cNvSpPr txBox="1">
-            <a:spLocks/>
-          </p:cNvSpPr>
-          <p:nvPr/>
-        </p:nvSpPr>
-        <p:spPr>
-          <a:xfrm rot="0">
-            <a:off x="1229995" y="1337310"/>
-            <a:ext cx="4039235" cy="370840"/>
-          </a:xfrm>
-          <a:prstGeom prst="rect"/>
-          <a:noFill/>
-          <a:ln w="0">
-            <a:noFill/>
-            <a:prstDash/>
-          </a:ln>
-        </p:spPr>
-        <p:txBody>
-          <a:bodyPr wrap="square" lIns="89535" tIns="46355" rIns="89535" bIns="46355" numCol="1" vert="horz" anchor="t">
-            <a:spAutoFit/>
-          </a:bodyPr>
-          <a:lstStyle/>
-          <a:p>
-            <a:pPr marL="0" indent="0" algn="l" latinLnBrk="0" hangingPunct="1">
-              <a:buFontTx/>
-              <a:buNone/>
-            </a:pPr>
-            <a:endParaRPr lang="ko-KR" altLang="en-US" sz="1800">
-              <a:latin typeface="맑은 고딕" charset="0"/>
-              <a:ea typeface="맑은 고딕" charset="0"/>
-            </a:endParaRPr>
-          </a:p>
-        </p:txBody>
-      </p:sp>
-      <p:sp>
-        <p:nvSpPr>
-          <p:cNvPr id="31" name="Rect 0"/>
-          <p:cNvSpPr txBox="1">
-            <a:spLocks/>
-          </p:cNvSpPr>
-          <p:nvPr/>
-        </p:nvSpPr>
-        <p:spPr>
-          <a:xfrm rot="0">
-            <a:off x="6801485" y="3204210"/>
-            <a:ext cx="4162425" cy="370840"/>
-          </a:xfrm>
-          <a:prstGeom prst="rect"/>
-          <a:noFill/>
-          <a:ln w="0">
-            <a:noFill/>
-            <a:prstDash/>
-          </a:ln>
-        </p:spPr>
-        <p:txBody>
-          <a:bodyPr wrap="square" lIns="89535" tIns="46355" rIns="89535" bIns="46355" numCol="1" vert="horz" anchor="t">
-            <a:spAutoFit/>
-          </a:bodyPr>
-          <a:lstStyle/>
-          <a:p>
-            <a:pPr marL="0" indent="0" algn="l" latinLnBrk="0" hangingPunct="1">
-              <a:buFontTx/>
-              <a:buNone/>
-            </a:pPr>
-            <a:endParaRPr lang="ko-KR" altLang="en-US" sz="1800">
-              <a:latin typeface="맑은 고딕" charset="0"/>
-              <a:ea typeface="맑은 고딕" charset="0"/>
-            </a:endParaRPr>
-          </a:p>
-        </p:txBody>
-      </p:sp>
-      <p:sp>
-        <p:nvSpPr>
-          <p:cNvPr id="35" name="Rect 0"/>
-          <p:cNvSpPr txBox="1">
-            <a:spLocks/>
-          </p:cNvSpPr>
-          <p:nvPr/>
-        </p:nvSpPr>
-        <p:spPr>
-          <a:xfrm rot="0">
-            <a:off x="4342765" y="467995"/>
-            <a:ext cx="3503930" cy="554990"/>
-          </a:xfrm>
-          <a:prstGeom prst="rect"/>
-          <a:noFill/>
-          <a:ln w="0">
-            <a:noFill/>
-            <a:prstDash/>
-          </a:ln>
-        </p:spPr>
-        <p:txBody>
-          <a:bodyPr wrap="square" lIns="89535" tIns="46355" rIns="89535" bIns="46355" numCol="1" vert="horz" anchor="t">
-            <a:spAutoFit/>
-          </a:bodyPr>
-          <a:lstStyle/>
-          <a:p>
-            <a:pPr marL="0" indent="0" rtl="0" algn="l" defTabSz="914400" eaLnBrk="1" latinLnBrk="0" hangingPunct="1">
-              <a:buFontTx/>
-              <a:buNone/>
-            </a:pPr>
-            <a:r>
-              <a:rPr lang="ko-KR" sz="3000" b="1">
-                <a:latin typeface="맑은 고딕" charset="0"/>
-                <a:ea typeface="맑은 고딕" charset="0"/>
-              </a:rPr>
-              <a:t>아홉</a:t>
-            </a:r>
-            <a:r>
-              <a:rPr lang="ko-KR" sz="3000" b="1">
-                <a:latin typeface="맑은 고딕" charset="0"/>
-                <a:ea typeface="맑은 고딕" charset="0"/>
-              </a:rPr>
-              <a:t> 번째 튜토리얼</a:t>
-            </a:r>
-            <a:r>
-              <a:rPr sz="3000" b="1">
-                <a:latin typeface="맑은 고딕" charset="0"/>
-                <a:ea typeface="맑은 고딕" charset="0"/>
-              </a:rPr>
-              <a:t> </a:t>
-            </a:r>
-            <a:endParaRPr lang="ko-KR" altLang="en-US" sz="3000" b="1">
-              <a:latin typeface="맑은 고딕" charset="0"/>
-              <a:ea typeface="맑은 고딕" charset="0"/>
-            </a:endParaRPr>
-          </a:p>
-        </p:txBody>
-      </p:sp>
-      <p:pic>
-        <p:nvPicPr>
-          <p:cNvPr id="36" name="그림 67" descr="C:/Users/Admin1/AppData/Roaming/PolarisOffice/ETemp/21612_20234488/fImage50442943281.png"/>
-          <p:cNvPicPr>
-            <a:picLocks noChangeAspect="1"/>
-          </p:cNvPicPr>
-          <p:nvPr/>
-        </p:nvPicPr>
-        <p:blipFill rotWithShape="1">
-          <a:blip r:embed="rId2" cstate="print">
-            <a:extLst>
-              <a:ext uri="{28A0092B-C50C-407E-A947-70E740481C1C}">
-                <a14:useLocalDpi xmlns:a14="http://schemas.microsoft.com/office/drawing/2010/main" val="0"/>
-              </a:ext>
-            </a:extLst>
-          </a:blip>
-          <a:stretch>
-            <a:fillRect/>
-          </a:stretch>
-        </p:blipFill>
-        <p:spPr>
-          <a:xfrm rot="0">
-            <a:off x="3000375" y="1537970"/>
-            <a:ext cx="2381885" cy="1301115"/>
-          </a:xfrm>
-          <a:prstGeom prst="roundRect"/>
-          <a:solidFill>
-            <a:srgbClr val="EDEDED"/>
-          </a:solidFill>
-        </p:spPr>
-      </p:pic>
-      <p:pic>
-        <p:nvPicPr>
-          <p:cNvPr id="37" name="그림 70" descr="C:/Users/Admin1/AppData/Roaming/PolarisOffice/ETemp/21612_20234488/fImage132672956827.png"/>
-          <p:cNvPicPr>
-            <a:picLocks noChangeAspect="1"/>
-          </p:cNvPicPr>
-          <p:nvPr/>
-        </p:nvPicPr>
-        <p:blipFill rotWithShape="1">
-          <a:blip r:embed="rId3" cstate="print">
-            <a:extLst>
-              <a:ext uri="{28A0092B-C50C-407E-A947-70E740481C1C}">
-                <a14:useLocalDpi xmlns:a14="http://schemas.microsoft.com/office/drawing/2010/main" val="0"/>
-              </a:ext>
-            </a:extLst>
-          </a:blip>
-          <a:stretch>
-            <a:fillRect/>
-          </a:stretch>
-        </p:blipFill>
-        <p:spPr>
-          <a:xfrm rot="0">
-            <a:off x="1466850" y="1537970"/>
-            <a:ext cx="1315085" cy="1301115"/>
-          </a:xfrm>
-          <a:prstGeom prst="roundRect"/>
-          <a:solidFill>
-            <a:srgbClr val="EDEDED"/>
-          </a:solidFill>
-        </p:spPr>
-      </p:pic>
-      <p:sp>
-        <p:nvSpPr>
-          <p:cNvPr id="38" name="텍스트 상자 73"/>
-          <p:cNvSpPr txBox="1">
-            <a:spLocks/>
-          </p:cNvSpPr>
-          <p:nvPr/>
-        </p:nvSpPr>
-        <p:spPr>
-          <a:xfrm rot="0">
-            <a:off x="1466850" y="2969260"/>
-            <a:ext cx="3915410" cy="923925"/>
-          </a:xfrm>
-          <a:prstGeom prst="rect"/>
-          <a:noFill/>
-          <a:ln w="0">
-            <a:noFill/>
-            <a:prstDash/>
-          </a:ln>
-        </p:spPr>
-        <p:txBody>
-          <a:bodyPr wrap="square" lIns="89535" tIns="46355" rIns="89535" bIns="46355" numCol="1" vert="horz" anchor="t">
-            <a:spAutoFit/>
-          </a:bodyPr>
-          <a:lstStyle/>
-          <a:p>
-            <a:pPr marL="0" indent="0" algn="l" latinLnBrk="0" hangingPunct="1">
-              <a:buFontTx/>
-              <a:buNone/>
-            </a:pPr>
-            <a:r>
-              <a:rPr sz="1800" b="1">
-                <a:solidFill>
-                  <a:srgbClr val="0611F2"/>
-                </a:solidFill>
-                <a:latin typeface="맑은 고딕" charset="0"/>
-                <a:ea typeface="맑은 고딕" charset="0"/>
-              </a:rPr>
-              <a:t>1</a:t>
-            </a:r>
-            <a:r>
-              <a:rPr lang="ko-KR" sz="1800" b="1">
-                <a:solidFill>
-                  <a:srgbClr val="0611F2"/>
-                </a:solidFill>
-                <a:latin typeface="맑은 고딕" charset="0"/>
-                <a:ea typeface="맑은 고딕" charset="0"/>
-              </a:rPr>
-              <a:t>4</a:t>
-            </a:r>
-            <a:r>
-              <a:rPr sz="1800" b="1">
-                <a:solidFill>
-                  <a:srgbClr val="0611F2"/>
-                </a:solidFill>
-                <a:latin typeface="맑은 고딕" charset="0"/>
-                <a:ea typeface="맑은 고딕" charset="0"/>
-              </a:rPr>
-              <a:t>.</a:t>
-            </a:r>
-            <a:r>
-              <a:rPr sz="1800">
-                <a:latin typeface="맑은 고딕" charset="0"/>
-                <a:ea typeface="맑은 고딕" charset="0"/>
-              </a:rPr>
-              <a:t> </a:t>
-            </a:r>
-            <a:r>
-              <a:rPr lang="ko-KR" sz="1800">
-                <a:latin typeface="맑은 고딕" charset="0"/>
-                <a:ea typeface="맑은 고딕" charset="0"/>
-              </a:rPr>
-              <a:t>그런 다음 Content 오브젝트를 선택하고 Content Size Fitter 컴포넌트를 추가합니다.</a:t>
-            </a:r>
-            <a:endParaRPr lang="ko-KR" altLang="en-US" sz="1800">
-              <a:latin typeface="맑은 고딕" charset="0"/>
-              <a:ea typeface="맑은 고딕" charset="0"/>
-            </a:endParaRPr>
-          </a:p>
-        </p:txBody>
-      </p:sp>
-      <p:pic>
-        <p:nvPicPr>
-          <p:cNvPr id="39" name="그림 74" descr="C:/Users/Admin1/AppData/Roaming/PolarisOffice/ETemp/21612_20234488/fImage129512979961.png"/>
-          <p:cNvPicPr>
-            <a:picLocks noChangeAspect="1"/>
-          </p:cNvPicPr>
-          <p:nvPr/>
-        </p:nvPicPr>
-        <p:blipFill rotWithShape="1">
-          <a:blip r:embed="rId4" cstate="print">
-            <a:extLst>
-              <a:ext uri="{28A0092B-C50C-407E-A947-70E740481C1C}">
-                <a14:useLocalDpi xmlns:a14="http://schemas.microsoft.com/office/drawing/2010/main" val="0"/>
-              </a:ext>
-            </a:extLst>
-          </a:blip>
-          <a:stretch>
-            <a:fillRect/>
-          </a:stretch>
-        </p:blipFill>
-        <p:spPr>
-          <a:xfrm rot="0">
-            <a:off x="6810375" y="1514475"/>
-            <a:ext cx="4161790" cy="1267460"/>
-          </a:xfrm>
-          <a:prstGeom prst="roundRect"/>
-          <a:solidFill>
-            <a:srgbClr val="EDEDED"/>
-          </a:solidFill>
-        </p:spPr>
-      </p:pic>
-      <p:pic>
-        <p:nvPicPr>
-          <p:cNvPr id="40" name="그림 77" descr="C:/Users/Admin1/AppData/Roaming/PolarisOffice/ETemp/21612_20234488/fImage11478298491.png"/>
-          <p:cNvPicPr>
-            <a:picLocks noChangeAspect="1"/>
-          </p:cNvPicPr>
-          <p:nvPr/>
-        </p:nvPicPr>
-        <p:blipFill rotWithShape="1">
-          <a:blip r:embed="rId5" cstate="print">
-            <a:extLst>
-              <a:ext uri="{28A0092B-C50C-407E-A947-70E740481C1C}">
-                <a14:useLocalDpi xmlns:a14="http://schemas.microsoft.com/office/drawing/2010/main" val="0"/>
-              </a:ext>
-            </a:extLst>
-          </a:blip>
-          <a:stretch>
-            <a:fillRect/>
-          </a:stretch>
-        </p:blipFill>
-        <p:spPr>
-          <a:xfrm rot="0">
-            <a:off x="6805295" y="2971800"/>
-            <a:ext cx="1501140" cy="1331595"/>
-          </a:xfrm>
-          <a:prstGeom prst="roundRect"/>
-          <a:solidFill>
-            <a:srgbClr val="EDEDED"/>
-          </a:solidFill>
-        </p:spPr>
-      </p:pic>
-      <p:pic>
-        <p:nvPicPr>
-          <p:cNvPr id="41" name="그림 80" descr="C:/Users/Admin1/AppData/Roaming/PolarisOffice/ETemp/21612_20234488/fImage54332992995.png"/>
-          <p:cNvPicPr>
-            <a:picLocks noChangeAspect="1"/>
-          </p:cNvPicPr>
-          <p:nvPr/>
-        </p:nvPicPr>
-        <p:blipFill rotWithShape="1">
-          <a:blip r:embed="rId6" cstate="print">
-            <a:extLst>
-              <a:ext uri="{28A0092B-C50C-407E-A947-70E740481C1C}">
-                <a14:useLocalDpi xmlns:a14="http://schemas.microsoft.com/office/drawing/2010/main" val="0"/>
-              </a:ext>
-            </a:extLst>
-          </a:blip>
-          <a:stretch>
-            <a:fillRect/>
-          </a:stretch>
-        </p:blipFill>
-        <p:spPr>
-          <a:xfrm rot="0">
-            <a:off x="8452485" y="2973705"/>
-            <a:ext cx="2553970" cy="1330325"/>
-          </a:xfrm>
-          <a:prstGeom prst="roundRect"/>
-          <a:solidFill>
-            <a:srgbClr val="EDEDED"/>
-          </a:solidFill>
-        </p:spPr>
-      </p:pic>
-      <p:cxnSp>
-        <p:nvCxnSpPr>
-          <p:cNvPr id="42" name="도형 81"/>
-          <p:cNvCxnSpPr/>
-          <p:nvPr/>
-        </p:nvCxnSpPr>
-        <p:spPr>
-          <a:xfrm rot="0" flipV="1">
-            <a:off x="7888605" y="2597785"/>
-            <a:ext cx="2996565" cy="1256030"/>
-          </a:xfrm>
-          <a:prstGeom prst="straightConnector1"/>
-          <a:ln w="6350" cap="flat" cmpd="sng">
-            <a:prstDash/>
-            <a:headEnd type="none" w="med" len="med"/>
-            <a:tailEnd type="triangle" w="med" len="med"/>
-          </a:ln>
-        </p:spPr>
-        <p:style>
-          <a:lnRef idx="1">
-            <a:schemeClr val="accent1"/>
-          </a:lnRef>
-          <a:fillRef idx="0">
-            <a:schemeClr val="accent1"/>
-          </a:fillRef>
-          <a:effectRef idx="0">
-            <a:schemeClr val="accent1"/>
-          </a:effectRef>
-          <a:fontRef idx="minor">
-            <a:schemeClr val="tx1"/>
-          </a:fontRef>
-        </p:style>
-      </p:cxnSp>
-      <p:cxnSp>
-        <p:nvCxnSpPr>
-          <p:cNvPr id="43" name="도형 82"/>
-          <p:cNvCxnSpPr/>
-          <p:nvPr/>
-        </p:nvCxnSpPr>
-        <p:spPr>
-          <a:xfrm rot="0" flipV="1">
-            <a:off x="7741285" y="2130425"/>
-            <a:ext cx="3152775" cy="1922780"/>
-          </a:xfrm>
-          <a:prstGeom prst="straightConnector1"/>
-          <a:ln w="6350" cap="flat" cmpd="sng">
-            <a:prstDash/>
-            <a:headEnd type="none" w="med" len="med"/>
-            <a:tailEnd type="triangle" w="med" len="med"/>
-          </a:ln>
-        </p:spPr>
-        <p:style>
-          <a:lnRef idx="1">
-            <a:schemeClr val="accent1"/>
-          </a:lnRef>
-          <a:fillRef idx="0">
-            <a:schemeClr val="accent1"/>
-          </a:fillRef>
-          <a:effectRef idx="0">
-            <a:schemeClr val="accent1"/>
-          </a:effectRef>
-          <a:fontRef idx="minor">
-            <a:schemeClr val="tx1"/>
-          </a:fontRef>
-        </p:style>
-      </p:cxnSp>
-      <p:cxnSp>
-        <p:nvCxnSpPr>
-          <p:cNvPr id="44" name="도형 83"/>
-          <p:cNvCxnSpPr/>
-          <p:nvPr/>
-        </p:nvCxnSpPr>
-        <p:spPr>
-          <a:xfrm rot="0" flipV="1">
-            <a:off x="10045065" y="2364105"/>
-            <a:ext cx="840105" cy="987425"/>
-          </a:xfrm>
-          <a:prstGeom prst="straightConnector1"/>
-          <a:ln w="6350" cap="flat" cmpd="sng">
-            <a:prstDash/>
-            <a:headEnd type="none" w="med" len="med"/>
-            <a:tailEnd type="triangle" w="med" len="med"/>
-          </a:ln>
-        </p:spPr>
-        <p:style>
-          <a:lnRef idx="1">
-            <a:schemeClr val="accent1"/>
-          </a:lnRef>
-          <a:fillRef idx="0">
-            <a:schemeClr val="accent1"/>
-          </a:fillRef>
-          <a:effectRef idx="0">
-            <a:schemeClr val="accent1"/>
-          </a:effectRef>
-          <a:fontRef idx="minor">
-            <a:schemeClr val="tx1"/>
-          </a:fontRef>
-        </p:style>
-      </p:cxnSp>
-      <p:sp>
-        <p:nvSpPr>
-          <p:cNvPr id="45" name="텍스트 상자 84"/>
-          <p:cNvSpPr txBox="1">
-            <a:spLocks/>
-          </p:cNvSpPr>
-          <p:nvPr/>
-        </p:nvSpPr>
-        <p:spPr>
-          <a:xfrm rot="0">
-            <a:off x="6794500" y="4425950"/>
-            <a:ext cx="4185920" cy="1754505"/>
-          </a:xfrm>
-          <a:prstGeom prst="rect"/>
-          <a:noFill/>
-          <a:ln w="0">
-            <a:noFill/>
-            <a:prstDash/>
-          </a:ln>
-        </p:spPr>
-        <p:txBody>
-          <a:bodyPr wrap="square" lIns="89535" tIns="46355" rIns="89535" bIns="46355" numCol="1" vert="horz" anchor="t">
-            <a:spAutoFit/>
-          </a:bodyPr>
-          <a:lstStyle/>
-          <a:p>
-            <a:pPr marL="0" indent="0" algn="l" latinLnBrk="0" hangingPunct="1">
-              <a:buFontTx/>
-              <a:buNone/>
-            </a:pPr>
-            <a:r>
-              <a:rPr sz="1800" b="1">
-                <a:solidFill>
-                  <a:srgbClr val="0611F2"/>
-                </a:solidFill>
-                <a:latin typeface="맑은 고딕" charset="0"/>
-                <a:ea typeface="맑은 고딕" charset="0"/>
-              </a:rPr>
-              <a:t>1</a:t>
-            </a:r>
-            <a:r>
-              <a:rPr lang="ko-KR" sz="1800" b="1">
-                <a:solidFill>
-                  <a:srgbClr val="0611F2"/>
-                </a:solidFill>
-                <a:latin typeface="맑은 고딕" charset="0"/>
-                <a:ea typeface="맑은 고딕" charset="0"/>
-              </a:rPr>
-              <a:t>6</a:t>
-            </a:r>
-            <a:r>
-              <a:rPr sz="1800" b="1">
-                <a:solidFill>
-                  <a:srgbClr val="0611F2"/>
-                </a:solidFill>
-                <a:latin typeface="맑은 고딕" charset="0"/>
-                <a:ea typeface="맑은 고딕" charset="0"/>
-              </a:rPr>
-              <a:t>.</a:t>
-            </a:r>
-            <a:r>
-              <a:rPr sz="1800">
-                <a:latin typeface="맑은 고딕" charset="0"/>
-                <a:ea typeface="맑은 고딕" charset="0"/>
-              </a:rPr>
-              <a:t> </a:t>
-            </a:r>
-            <a:r>
-              <a:rPr lang="ko-KR" sz="1800">
-                <a:latin typeface="맑은 고딕" charset="0"/>
-                <a:ea typeface="맑은 고딕" charset="0"/>
-              </a:rPr>
-              <a:t>이제 Chatting Manager 오브젝트를 선택합니다.</a:t>
-            </a:r>
-            <a:endParaRPr lang="ko-KR" altLang="en-US" sz="1800">
-              <a:latin typeface="맑은 고딕" charset="0"/>
-              <a:ea typeface="맑은 고딕" charset="0"/>
-            </a:endParaRPr>
-          </a:p>
-          <a:p>
-            <a:pPr marL="0" indent="0" algn="l" latinLnBrk="0" hangingPunct="1">
-              <a:buFontTx/>
-              <a:buNone/>
-            </a:pPr>
-            <a:endParaRPr lang="ko-KR" altLang="en-US" sz="1800">
-              <a:latin typeface="맑은 고딕" charset="0"/>
-              <a:ea typeface="맑은 고딕" charset="0"/>
-            </a:endParaRPr>
-          </a:p>
-          <a:p>
-            <a:pPr marL="0" indent="0" algn="l" latinLnBrk="0" hangingPunct="1">
-              <a:buFontTx/>
-              <a:buNone/>
-            </a:pPr>
-            <a:r>
-              <a:rPr lang="ko-KR" sz="1800">
-                <a:latin typeface="맑은 고딕" charset="0"/>
-                <a:ea typeface="맑은 고딕" charset="0"/>
-              </a:rPr>
-              <a:t>그다음 Chat Manager 스크립트에서 Input과 Chat Prefab 그리고 Chat Content를 넣어줍니다.</a:t>
-            </a:r>
-            <a:endParaRPr lang="ko-KR" altLang="en-US" sz="1800">
-              <a:latin typeface="맑은 고딕" charset="0"/>
-              <a:ea typeface="맑은 고딕" charset="0"/>
-            </a:endParaRPr>
-          </a:p>
-        </p:txBody>
-      </p:sp>
-      <p:pic>
-        <p:nvPicPr>
-          <p:cNvPr id="46" name="그림 85" descr="C:/Users/Admin1/AppData/Roaming/PolarisOffice/ETemp/21612_20234488/fImage126203041942.png"/>
-          <p:cNvPicPr>
-            <a:picLocks noChangeAspect="1"/>
-          </p:cNvPicPr>
-          <p:nvPr/>
-        </p:nvPicPr>
-        <p:blipFill rotWithShape="1">
-          <a:blip r:embed="rId7" cstate="print">
-            <a:extLst>
-              <a:ext uri="{28A0092B-C50C-407E-A947-70E740481C1C}">
-                <a14:useLocalDpi xmlns:a14="http://schemas.microsoft.com/office/drawing/2010/main" val="0"/>
-              </a:ext>
-            </a:extLst>
-          </a:blip>
-          <a:stretch>
-            <a:fillRect/>
-          </a:stretch>
-        </p:blipFill>
-        <p:spPr>
-          <a:xfrm rot="0">
-            <a:off x="1454785" y="4017645"/>
-            <a:ext cx="3931920" cy="1334135"/>
-          </a:xfrm>
-          <a:prstGeom prst="roundRect"/>
-          <a:solidFill>
-            <a:srgbClr val="EDEDED"/>
-          </a:solidFill>
-        </p:spPr>
-      </p:pic>
-      <p:sp>
-        <p:nvSpPr>
-          <p:cNvPr id="47" name="텍스트 상자 88"/>
-          <p:cNvSpPr txBox="1">
-            <a:spLocks/>
-          </p:cNvSpPr>
-          <p:nvPr/>
-        </p:nvSpPr>
-        <p:spPr>
-          <a:xfrm rot="0">
-            <a:off x="1451610" y="5508625"/>
-            <a:ext cx="3926205" cy="647065"/>
-          </a:xfrm>
-          <a:prstGeom prst="rect"/>
-          <a:noFill/>
-          <a:ln w="0">
-            <a:noFill/>
-            <a:prstDash/>
-          </a:ln>
-        </p:spPr>
-        <p:txBody>
-          <a:bodyPr wrap="square" lIns="89535" tIns="46355" rIns="89535" bIns="46355" numCol="1" vert="horz" anchor="t">
-            <a:spAutoFit/>
-          </a:bodyPr>
-          <a:lstStyle/>
-          <a:p>
-            <a:pPr marL="0" indent="0" algn="l" latinLnBrk="0" hangingPunct="1">
-              <a:buFontTx/>
-              <a:buNone/>
-            </a:pPr>
-            <a:r>
-              <a:rPr sz="1800" b="1">
-                <a:solidFill>
-                  <a:srgbClr val="0611F2"/>
-                </a:solidFill>
-                <a:latin typeface="맑은 고딕" charset="0"/>
-                <a:ea typeface="맑은 고딕" charset="0"/>
-              </a:rPr>
-              <a:t>1</a:t>
-            </a:r>
-            <a:r>
-              <a:rPr lang="ko-KR" sz="1800" b="1">
-                <a:solidFill>
-                  <a:srgbClr val="0611F2"/>
-                </a:solidFill>
-                <a:latin typeface="맑은 고딕" charset="0"/>
-                <a:ea typeface="맑은 고딕" charset="0"/>
-              </a:rPr>
-              <a:t>5</a:t>
-            </a:r>
-            <a:r>
-              <a:rPr sz="1800" b="1">
-                <a:solidFill>
-                  <a:srgbClr val="0611F2"/>
-                </a:solidFill>
-                <a:latin typeface="맑은 고딕" charset="0"/>
-                <a:ea typeface="맑은 고딕" charset="0"/>
-              </a:rPr>
-              <a:t>.</a:t>
-            </a:r>
-            <a:r>
-              <a:rPr sz="1800">
-                <a:latin typeface="맑은 고딕" charset="0"/>
-                <a:ea typeface="맑은 고딕" charset="0"/>
-              </a:rPr>
-              <a:t> </a:t>
-            </a:r>
-            <a:r>
-              <a:rPr lang="ko-KR" sz="1800">
-                <a:latin typeface="맑은 고딕" charset="0"/>
-                <a:ea typeface="맑은 고딕" charset="0"/>
-              </a:rPr>
-              <a:t>그다음으로 InputField의 위치와 앵커를 조정합니다.</a:t>
-            </a:r>
-            <a:endParaRPr lang="ko-KR" altLang="en-US" sz="1800">
-              <a:latin typeface="맑은 고딕" charset="0"/>
-              <a:ea typeface="맑은 고딕" charset="0"/>
-            </a:endParaRPr>
-          </a:p>
-        </p:txBody>
-      </p:sp>
-    </p:spTree>
-  </p:cSld>
-  <p:clrMapOvr>
-    <a:masterClrMapping/>
-  </p:clrMapOvr>
-  <mc:AlternateContent xmlns:mc="http://schemas.openxmlformats.org/markup-compatibility/2006">
-    <mc:Choice xmlns:p14="http://schemas.microsoft.com/office/powerpoint/2010/main" Requires="p14">
-      <p:transition spd="slow" p14:dur="2000"/>
-    </mc:Choice>
-    <mc:Fallback>
-      <p:transition spd="slow"/>
-    </mc:Fallback>
-  </mc:AlternateContent>
-  <p:timing>
-    <p:tnLst>
-      <p:par>
-        <p:cTn id="1" dur="indefinite" restart="never" nodeType="tmRoot"/>
-      </p:par>
-    </p:tnLst>
-  </p:timing>
-</p:sld>
-</file>
-
 <file path=ppt/slides/slide2.xml><?xml version="1.0" encoding="utf-8"?>
 <p:sld xmlns:a="http://schemas.openxmlformats.org/drawingml/2006/main" xmlns:r="http://schemas.openxmlformats.org/officeDocument/2006/relationships" xmlns:p="http://schemas.openxmlformats.org/presentationml/2006/main" xmlns:p14="http://schemas.microsoft.com/office/powerpoint/2010/main">
   <p:cSld>
@@ -10762,16 +9892,16 @@
       </p:grpSpPr>
       <p:sp>
         <p:nvSpPr>
-          <p:cNvPr id="2" name="텍스트 상자 13"/>
+          <p:cNvPr id="2" name="Rect 0"/>
           <p:cNvSpPr txBox="1">
             <a:spLocks/>
           </p:cNvSpPr>
           <p:nvPr/>
         </p:nvSpPr>
         <p:spPr>
-          <a:xfrm rot="0">
-            <a:off x="4356735" y="405765"/>
-            <a:ext cx="3560445" cy="554990"/>
+          <a:xfrm>
+            <a:off x="4307840" y="372110"/>
+            <a:ext cx="3576955" cy="554990"/>
           </a:xfrm>
           <a:prstGeom prst="rect"/>
           <a:noFill/>
@@ -10795,7 +9925,14 @@
                 <a:latin typeface="맑은 고딕" charset="0"/>
                 <a:ea typeface="맑은 고딕" charset="0"/>
               </a:rPr>
-              <a:t>다섯 번째 튜토리얼</a:t>
+              <a:t>다</a:t>
+            </a:r>
+            <a:r>
+              <a:rPr lang="ko-KR" sz="3000" b="1">
+                <a:latin typeface="맑은 고딕" charset="0"/>
+                <a:ea typeface="맑은 고딕" charset="0"/>
+              </a:rPr>
+              <a:t>섯 번째 튜토리얼</a:t>
             </a:r>
             <a:r>
               <a:rPr sz="3000" b="1">
@@ -10813,16 +9950,16 @@
       </p:sp>
       <p:sp>
         <p:nvSpPr>
-          <p:cNvPr id="3" name="텍스트 상자 14"/>
+          <p:cNvPr id="6" name="Rect 0"/>
           <p:cNvSpPr txBox="1">
             <a:spLocks/>
           </p:cNvSpPr>
           <p:nvPr/>
         </p:nvSpPr>
         <p:spPr>
-          <a:xfrm rot="0">
-            <a:off x="1292225" y="4253230"/>
-            <a:ext cx="4070350" cy="1754505"/>
+          <a:xfrm>
+            <a:off x="1189355" y="3961130"/>
+            <a:ext cx="4124325" cy="2031365"/>
           </a:xfrm>
           <a:prstGeom prst="rect"/>
           <a:noFill/>
@@ -10842,18 +9979,38 @@
               <a:buNone/>
             </a:pPr>
             <a:r>
+              <a:rPr lang="ko-KR" sz="1800" b="1">
+                <a:solidFill>
+                  <a:srgbClr val="0611F2"/>
+                </a:solidFill>
+                <a:latin typeface="맑은 고딕" charset="0"/>
+                <a:ea typeface="맑은 고딕" charset="0"/>
+              </a:rPr>
+              <a:t>8</a:t>
+            </a:r>
+            <a:r>
+              <a:rPr sz="1800" b="1">
+                <a:solidFill>
+                  <a:srgbClr val="0611F2"/>
+                </a:solidFill>
+                <a:latin typeface="맑은 고딕" charset="0"/>
+                <a:ea typeface="맑은 고딕" charset="0"/>
+              </a:rPr>
+              <a:t>.</a:t>
+            </a:r>
+            <a:r>
               <a:rPr sz="1800">
                 <a:latin typeface="맑은 고딕" charset="0"/>
                 <a:ea typeface="맑은 고딕" charset="0"/>
               </a:rPr>
-              <a:t>Min Size : LayOut Group 컴포넌트와 함께 사용</a:t>
+              <a:t> </a:t>
             </a:r>
             <a:r>
               <a:rPr lang="ko-KR" sz="1800">
                 <a:latin typeface="맑은 고딕" charset="0"/>
                 <a:ea typeface="맑은 고딕" charset="0"/>
               </a:rPr>
-              <a:t>해야 합니다.</a:t>
+              <a:t>빈 게임 오브젝트를 생성하고 이름은 Chatting Manager로 변경합니다.</a:t>
             </a:r>
             <a:endParaRPr lang="ko-KR" altLang="en-US" sz="1800">
               <a:latin typeface="맑은 고딕" charset="0"/>
@@ -10876,25 +10033,25 @@
               <a:buNone/>
             </a:pPr>
             <a:r>
-              <a:rPr sz="1800">
-                <a:latin typeface="맑은 고딕" charset="0"/>
-                <a:ea typeface="맑은 고딕" charset="0"/>
-              </a:rPr>
-              <a:t>Min Size</a:t>
-            </a:r>
-            <a:r>
               <a:rPr lang="ko-KR" sz="1800">
                 <a:latin typeface="맑은 고딕" charset="0"/>
                 <a:ea typeface="맑은 고딕" charset="0"/>
               </a:rPr>
-              <a:t>의 경우 </a:t>
-            </a:r>
-            <a:r>
-              <a:rPr sz="1800">
-                <a:latin typeface="맑은 고딕" charset="0"/>
-                <a:ea typeface="맑은 고딕" charset="0"/>
-              </a:rPr>
-              <a:t>레이아웃 요소의 최소 크기를 기준으로 UI의 크기를 맞추는 옵션입니다.  </a:t>
+              <a:t>그리고 ChatManager라는 스크립트를 </a:t>
+            </a:r>
+            <a:r>
+              <a:rPr lang="ko-KR" sz="1800">
+                <a:latin typeface="맑은 고딕" charset="0"/>
+                <a:ea typeface="맑은 고딕" charset="0"/>
+              </a:rPr>
+              <a:t>생성하고</a:t>
+            </a:r>
+            <a:r>
+              <a:rPr lang="ko-KR" sz="1800">
+                <a:latin typeface="맑은 고딕" charset="0"/>
+                <a:ea typeface="맑은 고딕" charset="0"/>
+              </a:rPr>
+              <a:t> Chatting Manager 오브젝트에 넣어줍니다.</a:t>
             </a:r>
             <a:endParaRPr lang="ko-KR" altLang="en-US" sz="1800">
               <a:latin typeface="맑은 고딕" charset="0"/>
@@ -10903,53 +10060,9 @@
           </a:p>
         </p:txBody>
       </p:sp>
-      <p:sp>
-        <p:nvSpPr>
-          <p:cNvPr id="4" name="텍스트 상자 15"/>
-          <p:cNvSpPr txBox="1">
-            <a:spLocks/>
-          </p:cNvSpPr>
-          <p:nvPr/>
-        </p:nvSpPr>
-        <p:spPr>
-          <a:xfrm rot="0">
-            <a:off x="6824980" y="4805680"/>
-            <a:ext cx="4150995" cy="1202055"/>
-          </a:xfrm>
-          <a:prstGeom prst="rect"/>
-          <a:noFill/>
-          <a:ln w="0">
-            <a:noFill/>
-            <a:prstDash/>
-          </a:ln>
-        </p:spPr>
-        <p:txBody>
-          <a:bodyPr wrap="square" lIns="89535" tIns="46355" rIns="89535" bIns="46355" numCol="1" vert="horz" anchor="t">
-            <a:spAutoFit/>
-          </a:bodyPr>
-          <a:lstStyle/>
-          <a:p>
-            <a:pPr marL="0" indent="0" rtl="0" algn="l" defTabSz="914400" eaLnBrk="1" latinLnBrk="0" hangingPunct="1">
-              <a:buFontTx/>
-              <a:buNone/>
-            </a:pPr>
-            <a:r>
-              <a:rPr sz="1800">
-                <a:latin typeface="맑은 고딕" charset="0"/>
-                <a:ea typeface="맑은 고딕" charset="0"/>
-              </a:rPr>
-              <a:t>스크롤 뷰에서 Content라는 게임 오브젝트의 하위 오브젝트로 UI 오브젝트가 생성될 때 생성된 수에 따라 스크롤바의 크기가 조절됩니다.</a:t>
-            </a:r>
-            <a:endParaRPr lang="ko-KR" altLang="en-US" sz="1800">
-              <a:latin typeface="맑은 고딕" charset="0"/>
-              <a:ea typeface="맑은 고딕" charset="0"/>
-            </a:endParaRPr>
-          </a:p>
-        </p:txBody>
-      </p:sp>
       <p:pic>
         <p:nvPicPr>
-          <p:cNvPr id="5" name="그림 16" descr="C:/Users/Admin1/AppData/Roaming/PolarisOffice/ETemp/21612_20234488/fImage25012479169.png"/>
+          <p:cNvPr id="16" name="그림 32"/>
           <p:cNvPicPr>
             <a:picLocks noChangeAspect="1"/>
           </p:cNvPicPr>
@@ -10969,16 +10082,18 @@
         </p:blipFill>
         <p:spPr>
           <a:xfrm rot="0">
-            <a:off x="1290955" y="1367790"/>
-            <a:ext cx="4055110" cy="2686050"/>
-          </a:xfrm>
-          <a:prstGeom prst="rect"/>
-          <a:noFill/>
+            <a:off x="4238625" y="3030220"/>
+            <a:ext cx="743585" cy="791845"/>
+          </a:xfrm>
+          <a:prstGeom prst="roundRect"/>
+          <a:solidFill>
+            <a:srgbClr val="EDEDED"/>
+          </a:solidFill>
         </p:spPr>
       </p:pic>
       <p:pic>
         <p:nvPicPr>
-          <p:cNvPr id="6" name="그림 17" descr="C:/Users/Admin1/AppData/Roaming/PolarisOffice/ETemp/21612_20234488/fImage76002485724.png"/>
+          <p:cNvPr id="17" name="그림 37"/>
           <p:cNvPicPr>
             <a:picLocks noChangeAspect="1"/>
           </p:cNvPicPr>
@@ -10998,8 +10113,8 @@
         </p:blipFill>
         <p:spPr>
           <a:xfrm rot="0">
-            <a:off x="1576705" y="1559560"/>
-            <a:ext cx="3124835" cy="2214880"/>
+            <a:off x="1252855" y="1322705"/>
+            <a:ext cx="2395855" cy="2494915"/>
           </a:xfrm>
           <a:prstGeom prst="roundRect"/>
           <a:solidFill>
@@ -11009,7 +10124,7 @@
       </p:pic>
       <p:sp>
         <p:nvSpPr>
-          <p:cNvPr id="7" name="텍스트 상자 18"/>
+          <p:cNvPr id="21" name="텍스트 상자 44"/>
           <p:cNvSpPr txBox="1">
             <a:spLocks/>
           </p:cNvSpPr>
@@ -11017,8 +10132,8 @@
         </p:nvSpPr>
         <p:spPr>
           <a:xfrm rot="0">
-            <a:off x="1889125" y="1860550"/>
-            <a:ext cx="831215" cy="323850"/>
+            <a:off x="6819900" y="4234180"/>
+            <a:ext cx="4029710" cy="1754505"/>
           </a:xfrm>
           <a:prstGeom prst="rect"/>
           <a:noFill/>
@@ -11038,158 +10153,93 @@
               <a:buNone/>
             </a:pPr>
             <a:r>
-              <a:rPr lang="ko-KR" sz="1500" b="1">
+              <a:rPr lang="ko-KR" sz="1800" b="1">
                 <a:solidFill>
-                  <a:srgbClr val="009900"/>
+                  <a:srgbClr val="0611F2"/>
                 </a:solidFill>
                 <a:latin typeface="맑은 고딕" charset="0"/>
                 <a:ea typeface="맑은 고딕" charset="0"/>
               </a:rPr>
-              <a:t>Layout</a:t>
-            </a:r>
-            <a:endParaRPr lang="ko-KR" altLang="en-US" sz="1500" b="1">
-              <a:solidFill>
-                <a:srgbClr val="009900"/>
-              </a:solidFill>
+              <a:t>9</a:t>
+            </a:r>
+            <a:r>
+              <a:rPr sz="1800" b="1">
+                <a:solidFill>
+                  <a:srgbClr val="0611F2"/>
+                </a:solidFill>
+                <a:latin typeface="맑은 고딕" charset="0"/>
+                <a:ea typeface="맑은 고딕" charset="0"/>
+              </a:rPr>
+              <a:t>.</a:t>
+            </a:r>
+            <a:r>
+              <a:rPr sz="1800">
+                <a:latin typeface="맑은 고딕" charset="0"/>
+                <a:ea typeface="맑은 고딕" charset="0"/>
+              </a:rPr>
+              <a:t> </a:t>
+            </a:r>
+            <a:r>
+              <a:rPr lang="ko-KR" sz="1800">
+                <a:latin typeface="맑은 고딕" charset="0"/>
+                <a:ea typeface="맑은 고딕" charset="0"/>
+              </a:rPr>
+              <a:t>이제</a:t>
+            </a:r>
+            <a:r>
+              <a:rPr lang="ko-KR" sz="1800">
+                <a:latin typeface="맑은 고딕" charset="0"/>
+                <a:ea typeface="맑은 고딕" charset="0"/>
+              </a:rPr>
+              <a:t> 텍스트를 입력할 InputField와 채팅 UI를 생성하기 위한 GameObject 선언합니다.</a:t>
+            </a:r>
+            <a:endParaRPr lang="ko-KR" altLang="en-US" sz="1800">
               <a:latin typeface="맑은 고딕" charset="0"/>
               <a:ea typeface="맑은 고딕" charset="0"/>
             </a:endParaRPr>
           </a:p>
-        </p:txBody>
-      </p:sp>
-      <p:sp>
-        <p:nvSpPr>
-          <p:cNvPr id="8" name="텍스트 상자 19"/>
-          <p:cNvSpPr txBox="1">
-            <a:spLocks/>
-          </p:cNvSpPr>
-          <p:nvPr/>
-        </p:nvSpPr>
-        <p:spPr>
-          <a:xfrm rot="0">
-            <a:off x="1801495" y="3166110"/>
-            <a:ext cx="1017270" cy="323850"/>
-          </a:xfrm>
-          <a:prstGeom prst="rect"/>
-          <a:noFill/>
-          <a:ln w="0">
-            <a:noFill/>
-            <a:prstDash/>
-          </a:ln>
-        </p:spPr>
-        <p:txBody>
-          <a:bodyPr wrap="square" lIns="89535" tIns="46355" rIns="89535" bIns="46355" numCol="1" vert="horz" anchor="t">
-            <a:spAutoFit/>
-          </a:bodyPr>
-          <a:lstStyle/>
           <a:p>
             <a:pPr marL="0" indent="0" rtl="0" algn="l" defTabSz="914400" eaLnBrk="1" latinLnBrk="0" hangingPunct="1">
               <a:buFontTx/>
               <a:buNone/>
             </a:pPr>
-            <a:endParaRPr lang="ko-KR" altLang="en-US" sz="1500" b="1">
-              <a:solidFill>
-                <a:srgbClr val="009900"/>
-              </a:solidFill>
+            <a:endParaRPr lang="ko-KR" altLang="en-US" sz="1800">
               <a:latin typeface="맑은 고딕" charset="0"/>
               <a:ea typeface="맑은 고딕" charset="0"/>
             </a:endParaRPr>
           </a:p>
-        </p:txBody>
-      </p:sp>
-      <p:sp>
-        <p:nvSpPr>
-          <p:cNvPr id="9" name="텍스트 상자 20"/>
-          <p:cNvSpPr txBox="1">
-            <a:spLocks/>
-          </p:cNvSpPr>
-          <p:nvPr/>
-        </p:nvSpPr>
-        <p:spPr>
-          <a:xfrm rot="0">
-            <a:off x="3384550" y="3173730"/>
-            <a:ext cx="1017270" cy="323850"/>
-          </a:xfrm>
-          <a:prstGeom prst="rect"/>
-          <a:noFill/>
-          <a:ln w="0">
-            <a:noFill/>
-            <a:prstDash/>
-          </a:ln>
-        </p:spPr>
-        <p:txBody>
-          <a:bodyPr wrap="square" lIns="89535" tIns="46355" rIns="89535" bIns="46355" numCol="1" vert="horz" anchor="t">
-            <a:spAutoFit/>
-          </a:bodyPr>
-          <a:lstStyle/>
           <a:p>
             <a:pPr marL="0" indent="0" rtl="0" algn="l" defTabSz="914400" eaLnBrk="1" latinLnBrk="0" hangingPunct="1">
               <a:buFontTx/>
               <a:buNone/>
             </a:pPr>
-            <a:endParaRPr lang="ko-KR" altLang="en-US" sz="1500" b="1">
-              <a:solidFill>
-                <a:srgbClr val="009900"/>
-              </a:solidFill>
+            <a:r>
+              <a:rPr lang="ko-KR" sz="1800">
+                <a:latin typeface="맑은 고딕" charset="0"/>
+                <a:ea typeface="맑은 고딕" charset="0"/>
+              </a:rPr>
+              <a:t>마지막으로 텍스트의 위치를 조정할 Transform 변수를 선언합니다.</a:t>
+            </a:r>
+            <a:endParaRPr lang="ko-KR" altLang="en-US" sz="1800">
               <a:latin typeface="맑은 고딕" charset="0"/>
               <a:ea typeface="맑은 고딕" charset="0"/>
             </a:endParaRPr>
           </a:p>
         </p:txBody>
       </p:sp>
-      <p:sp>
-        <p:nvSpPr>
-          <p:cNvPr id="10" name="텍스트 상자 21"/>
-          <p:cNvSpPr txBox="1">
-            <a:spLocks/>
-          </p:cNvSpPr>
-          <p:nvPr/>
-        </p:nvSpPr>
-        <p:spPr>
-          <a:xfrm rot="0">
-            <a:off x="3370580" y="1932305"/>
-            <a:ext cx="1017270" cy="323850"/>
-          </a:xfrm>
-          <a:prstGeom prst="rect"/>
-          <a:noFill/>
-          <a:ln w="0">
-            <a:noFill/>
-            <a:prstDash/>
-          </a:ln>
-        </p:spPr>
-        <p:txBody>
-          <a:bodyPr wrap="square" lIns="89535" tIns="46355" rIns="89535" bIns="46355" numCol="1" vert="horz" anchor="t">
-            <a:spAutoFit/>
-          </a:bodyPr>
-          <a:lstStyle/>
-          <a:p>
-            <a:pPr marL="0" indent="0" rtl="0" algn="l" defTabSz="914400" eaLnBrk="1" latinLnBrk="0" hangingPunct="1">
-              <a:buFontTx/>
-              <a:buNone/>
-            </a:pPr>
-            <a:endParaRPr lang="ko-KR" altLang="en-US" sz="1500" b="1">
-              <a:solidFill>
-                <a:srgbClr val="009900"/>
-              </a:solidFill>
-              <a:latin typeface="맑은 고딕" charset="0"/>
-              <a:ea typeface="맑은 고딕" charset="0"/>
-            </a:endParaRPr>
-          </a:p>
-        </p:txBody>
-      </p:sp>
       <p:pic>
         <p:nvPicPr>
-          <p:cNvPr id="11" name="그림 22"/>
+          <p:cNvPr id="26" name="그림 51"/>
           <p:cNvPicPr>
             <a:picLocks noChangeAspect="1"/>
           </p:cNvPicPr>
           <p:nvPr/>
         </p:nvPicPr>
         <p:blipFill rotWithShape="1">
-          <a:blip r:embed="rId4" cstate="hqprint">
+          <a:blip r:embed="rId9" cstate="print">
             <a:extLst>
               <a:ext uri="{28A0092B-C50C-407E-A947-70E740481C1C}">
-                <a14:useLocalDpi xmlns:a14="http://schemas.microsoft.com/office/drawing/2010/main"/>
+                <a14:useLocalDpi xmlns:a14="http://schemas.microsoft.com/office/drawing/2010/main" val="0"/>
               </a:ext>
             </a:extLst>
           </a:blip>
@@ -11199,8 +10249,8 @@
         </p:blipFill>
         <p:spPr>
           <a:xfrm rot="0">
-            <a:off x="6824980" y="1374775"/>
-            <a:ext cx="4149725" cy="3206750"/>
+            <a:off x="3841750" y="1333500"/>
+            <a:ext cx="1530985" cy="1418590"/>
           </a:xfrm>
           <a:prstGeom prst="roundRect"/>
           <a:solidFill>
@@ -11208,156 +10258,72 @@
           </a:solidFill>
         </p:spPr>
       </p:pic>
-      <p:sp>
-        <p:nvSpPr>
-          <p:cNvPr id="12" name="텍스트 상자 48"/>
-          <p:cNvSpPr txBox="1">
-            <a:spLocks/>
-          </p:cNvSpPr>
+      <p:cxnSp>
+        <p:nvCxnSpPr>
+          <p:cNvPr id="19" name="도형 39"/>
+          <p:cNvCxnSpPr>
+            <a:stCxn id="16" idx="0"/>
+            <a:endCxn id="26" idx="2"/>
+          </p:cNvCxnSpPr>
           <p:nvPr/>
-        </p:nvSpPr>
-        <p:spPr>
-          <a:xfrm rot="0">
-            <a:off x="1897380" y="3001010"/>
-            <a:ext cx="831215" cy="323850"/>
-          </a:xfrm>
-          <a:prstGeom prst="rect"/>
-          <a:noFill/>
-          <a:ln w="0">
-            <a:noFill/>
+        </p:nvCxnSpPr>
+        <p:spPr>
+          <a:xfrm rot="0" flipH="1" flipV="1">
+            <a:off x="4606925" y="2751455"/>
+            <a:ext cx="3810" cy="279400"/>
+          </a:xfrm>
+          <a:prstGeom prst="straightConnector1"/>
+          <a:ln w="6350" cap="flat" cmpd="sng">
             <a:prstDash/>
+            <a:tailEnd type="triangle" w="med" len="med"/>
           </a:ln>
         </p:spPr>
-        <p:txBody>
-          <a:bodyPr wrap="square" lIns="89535" tIns="46355" rIns="89535" bIns="46355" numCol="1" vert="horz" anchor="t">
-            <a:spAutoFit/>
-          </a:bodyPr>
-          <a:lstStyle/>
-          <a:p>
-            <a:pPr marL="0" indent="0" rtl="0" algn="l" defTabSz="914400" eaLnBrk="1" latinLnBrk="0" hangingPunct="1">
-              <a:buFontTx/>
-              <a:buNone/>
-            </a:pPr>
-            <a:r>
-              <a:rPr lang="ko-KR" sz="1500" b="1">
-                <a:solidFill>
-                  <a:srgbClr val="009900"/>
-                </a:solidFill>
-                <a:latin typeface="맑은 고딕" charset="0"/>
-                <a:ea typeface="맑은 고딕" charset="0"/>
-              </a:rPr>
-              <a:t>Layout</a:t>
-            </a:r>
-            <a:endParaRPr lang="ko-KR" altLang="en-US" sz="1500" b="1">
-              <a:solidFill>
-                <a:srgbClr val="009900"/>
-              </a:solidFill>
-              <a:latin typeface="맑은 고딕" charset="0"/>
-              <a:ea typeface="맑은 고딕" charset="0"/>
-            </a:endParaRPr>
-          </a:p>
-        </p:txBody>
-      </p:sp>
-      <p:sp>
-        <p:nvSpPr>
-          <p:cNvPr id="13" name="텍스트 상자 49"/>
-          <p:cNvSpPr txBox="1">
-            <a:spLocks/>
-          </p:cNvSpPr>
+        <p:style>
+          <a:lnRef idx="1">
+            <a:schemeClr val="accent1"/>
+          </a:lnRef>
+          <a:fillRef idx="0">
+            <a:schemeClr val="accent1"/>
+          </a:fillRef>
+          <a:effectRef idx="0">
+            <a:schemeClr val="accent1"/>
+          </a:effectRef>
+          <a:fontRef idx="minor">
+            <a:schemeClr val="tx1"/>
+          </a:fontRef>
+        </p:style>
+      </p:cxnSp>
+      <p:pic>
+        <p:nvPicPr>
+          <p:cNvPr id="27" name="그림 54"/>
+          <p:cNvPicPr>
+            <a:picLocks noChangeAspect="1"/>
+          </p:cNvPicPr>
           <p:nvPr/>
-        </p:nvSpPr>
-        <p:spPr>
-          <a:xfrm rot="0">
-            <a:off x="3463925" y="3001010"/>
-            <a:ext cx="831215" cy="323850"/>
-          </a:xfrm>
-          <a:prstGeom prst="rect"/>
-          <a:noFill/>
-          <a:ln w="0">
-            <a:noFill/>
-            <a:prstDash/>
-          </a:ln>
-        </p:spPr>
-        <p:txBody>
-          <a:bodyPr wrap="square" lIns="89535" tIns="46355" rIns="89535" bIns="46355" numCol="1" vert="horz" anchor="t">
-            <a:spAutoFit/>
-          </a:bodyPr>
-          <a:lstStyle/>
-          <a:p>
-            <a:pPr marL="0" indent="0" rtl="0" algn="l" defTabSz="914400" eaLnBrk="1" latinLnBrk="0" hangingPunct="1">
-              <a:buFontTx/>
-              <a:buNone/>
-            </a:pPr>
-            <a:r>
-              <a:rPr lang="ko-KR" sz="1500" b="1">
-                <a:solidFill>
-                  <a:srgbClr val="009900"/>
-                </a:solidFill>
-                <a:latin typeface="맑은 고딕" charset="0"/>
-                <a:ea typeface="맑은 고딕" charset="0"/>
-              </a:rPr>
-              <a:t>Layout</a:t>
-            </a:r>
-            <a:endParaRPr lang="ko-KR" altLang="en-US" sz="1500" b="1">
-              <a:solidFill>
-                <a:srgbClr val="009900"/>
-              </a:solidFill>
-              <a:latin typeface="맑은 고딕" charset="0"/>
-              <a:ea typeface="맑은 고딕" charset="0"/>
-            </a:endParaRPr>
-          </a:p>
-        </p:txBody>
-      </p:sp>
-      <p:sp>
-        <p:nvSpPr>
-          <p:cNvPr id="14" name="텍스트 상자 50"/>
-          <p:cNvSpPr txBox="1">
-            <a:spLocks/>
-          </p:cNvSpPr>
-          <p:nvPr/>
-        </p:nvSpPr>
-        <p:spPr>
-          <a:xfrm rot="0">
-            <a:off x="3453130" y="1858010"/>
-            <a:ext cx="831215" cy="323850"/>
-          </a:xfrm>
-          <a:prstGeom prst="rect"/>
-          <a:noFill/>
-          <a:ln w="0">
-            <a:noFill/>
-            <a:prstDash/>
-          </a:ln>
-        </p:spPr>
-        <p:txBody>
-          <a:bodyPr wrap="square" lIns="89535" tIns="46355" rIns="89535" bIns="46355" numCol="1" vert="horz" anchor="t">
-            <a:spAutoFit/>
-          </a:bodyPr>
-          <a:lstStyle/>
-          <a:p>
-            <a:pPr marL="0" indent="0" rtl="0" algn="l" defTabSz="914400" eaLnBrk="1" latinLnBrk="0" hangingPunct="1">
-              <a:buFontTx/>
-              <a:buNone/>
-            </a:pPr>
-            <a:r>
-              <a:rPr lang="ko-KR" sz="1500" b="1">
-                <a:solidFill>
-                  <a:srgbClr val="009900"/>
-                </a:solidFill>
-                <a:latin typeface="맑은 고딕" charset="0"/>
-                <a:ea typeface="맑은 고딕" charset="0"/>
-              </a:rPr>
-              <a:t>Layout</a:t>
-            </a:r>
-            <a:endParaRPr lang="ko-KR" altLang="en-US" sz="1500" b="1">
-              <a:solidFill>
-                <a:srgbClr val="009900"/>
-              </a:solidFill>
-              <a:latin typeface="맑은 고딕" charset="0"/>
-              <a:ea typeface="맑은 고딕" charset="0"/>
-            </a:endParaRPr>
-          </a:p>
-        </p:txBody>
-      </p:sp>
+        </p:nvPicPr>
+        <p:blipFill rotWithShape="1">
+          <a:blip r:embed="rId10" cstate="print">
+            <a:extLst>
+              <a:ext uri="{28A0092B-C50C-407E-A947-70E740481C1C}">
+                <a14:useLocalDpi xmlns:a14="http://schemas.microsoft.com/office/drawing/2010/main" val="0"/>
+              </a:ext>
+            </a:extLst>
+          </a:blip>
+          <a:stretch>
+            <a:fillRect/>
+          </a:stretch>
+        </p:blipFill>
+        <p:spPr>
+          <a:xfrm rot="0">
+            <a:off x="6819900" y="1323975"/>
+            <a:ext cx="4020185" cy="2724150"/>
+          </a:xfrm>
+          <a:prstGeom prst="roundRect"/>
+          <a:solidFill>
+            <a:srgbClr val="EDEDED"/>
+          </a:solidFill>
+        </p:spPr>
+      </p:pic>
     </p:spTree>
   </p:cSld>
   <p:clrMapOvr>
@@ -11400,7 +10366,7 @@
       </p:grpSpPr>
       <p:sp>
         <p:nvSpPr>
-          <p:cNvPr id="2" name="Rect 0"/>
+          <p:cNvPr id="25" name="Rect 0"/>
           <p:cNvSpPr txBox="1">
             <a:spLocks/>
           </p:cNvSpPr>
@@ -11408,8 +10374,8 @@
         </p:nvSpPr>
         <p:spPr>
           <a:xfrm rot="0">
-            <a:off x="4307840" y="372110"/>
-            <a:ext cx="3576320" cy="554990"/>
+            <a:off x="1229995" y="4312920"/>
+            <a:ext cx="4133850" cy="1754505"/>
           </a:xfrm>
           <a:prstGeom prst="rect"/>
           <a:noFill/>
@@ -11424,50 +10390,146 @@
           </a:bodyPr>
           <a:lstStyle/>
           <a:p>
-            <a:pPr marL="0" indent="0" rtl="0" algn="l" defTabSz="914400" eaLnBrk="1" latinLnBrk="0" hangingPunct="1">
-              <a:buFontTx/>
-              <a:buNone/>
-            </a:pPr>
-            <a:r>
-              <a:rPr lang="ko-KR" sz="3000" b="1">
-                <a:latin typeface="맑은 고딕" charset="0"/>
-                <a:ea typeface="맑은 고딕" charset="0"/>
-              </a:rPr>
-              <a:t>여섯</a:t>
-            </a:r>
-            <a:r>
-              <a:rPr lang="ko-KR" sz="3000" b="1">
-                <a:latin typeface="맑은 고딕" charset="0"/>
-                <a:ea typeface="맑은 고딕" charset="0"/>
-              </a:rPr>
-              <a:t> 번째 튜토리얼</a:t>
-            </a:r>
-            <a:r>
-              <a:rPr sz="3000" b="1">
+            <a:pPr marL="0" indent="0" algn="l" latinLnBrk="0" hangingPunct="1">
+              <a:buFontTx/>
+              <a:buNone/>
+            </a:pPr>
+            <a:r>
+              <a:rPr lang="ko-KR" sz="1800" b="1">
+                <a:solidFill>
+                  <a:srgbClr val="0611F2"/>
+                </a:solidFill>
+                <a:latin typeface="맑은 고딕" charset="0"/>
+                <a:ea typeface="맑은 고딕" charset="0"/>
+              </a:rPr>
+              <a:t>10</a:t>
+            </a:r>
+            <a:r>
+              <a:rPr sz="1800" b="1">
+                <a:solidFill>
+                  <a:srgbClr val="0611F2"/>
+                </a:solidFill>
+                <a:latin typeface="맑은 고딕" charset="0"/>
+                <a:ea typeface="맑은 고딕" charset="0"/>
+              </a:rPr>
+              <a:t>.</a:t>
+            </a:r>
+            <a:r>
+              <a:rPr sz="1800">
                 <a:latin typeface="맑은 고딕" charset="0"/>
                 <a:ea typeface="맑은 고딕" charset="0"/>
               </a:rPr>
               <a:t> </a:t>
             </a:r>
-            <a:endParaRPr lang="ko-KR" altLang="en-US" sz="3000" b="1">
+            <a:r>
+              <a:rPr lang="ko-KR" sz="1800">
+                <a:latin typeface="맑은 고딕" charset="0"/>
+                <a:ea typeface="맑은 고딕" charset="0"/>
+              </a:rPr>
+              <a:t>이제 </a:t>
+            </a:r>
+            <a:r>
+              <a:rPr lang="ko-KR" sz="1800">
+                <a:latin typeface="맑은 고딕" charset="0"/>
+                <a:ea typeface="맑은 고딕" charset="0"/>
+              </a:rPr>
+              <a:t>채팅 UI를 생성하도록 설정</a:t>
+            </a:r>
+            <a:r>
+              <a:rPr lang="ko-KR" sz="1800">
+                <a:latin typeface="맑은 고딕" charset="0"/>
+                <a:ea typeface="맑은 고딕" charset="0"/>
+              </a:rPr>
+              <a:t>합니다.</a:t>
+            </a:r>
+            <a:endParaRPr lang="ko-KR" altLang="en-US" sz="1800">
               <a:latin typeface="맑은 고딕" charset="0"/>
               <a:ea typeface="맑은 고딕" charset="0"/>
             </a:endParaRPr>
           </a:p>
-        </p:txBody>
-      </p:sp>
-      <p:sp>
-        <p:nvSpPr>
-          <p:cNvPr id="6" name="Rect 0"/>
+          <a:p>
+            <a:pPr marL="0" indent="0" algn="l" latinLnBrk="0" hangingPunct="1">
+              <a:buFontTx/>
+              <a:buNone/>
+            </a:pPr>
+            <a:endParaRPr lang="ko-KR" altLang="en-US" sz="1800">
+              <a:latin typeface="맑은 고딕" charset="0"/>
+              <a:ea typeface="맑은 고딕" charset="0"/>
+            </a:endParaRPr>
+          </a:p>
+          <a:p>
+            <a:pPr marL="0" indent="0" algn="l" latinLnBrk="0" hangingPunct="1">
+              <a:buFontTx/>
+              <a:buNone/>
+            </a:pPr>
+            <a:r>
+              <a:rPr lang="ko-KR" sz="1800">
+                <a:latin typeface="맑은 고딕" charset="0"/>
+                <a:ea typeface="맑은 고딕" charset="0"/>
+              </a:rPr>
+              <a:t>그리고</a:t>
+            </a:r>
+            <a:r>
+              <a:rPr lang="ko-KR" sz="1800">
+                <a:latin typeface="맑은 고딕" charset="0"/>
+                <a:ea typeface="맑은 고딕" charset="0"/>
+              </a:rPr>
+              <a:t> 채팅 UI의 위치를 </a:t>
+            </a:r>
+            <a:r>
+              <a:rPr lang="ko-KR" sz="1800">
+                <a:latin typeface="맑은 고딕" charset="0"/>
+                <a:ea typeface="맑은 고딕" charset="0"/>
+              </a:rPr>
+              <a:t>content</a:t>
+            </a:r>
+            <a:r>
+              <a:rPr lang="ko-KR" sz="1800">
+                <a:latin typeface="맑은 고딕" charset="0"/>
+                <a:ea typeface="맑은 고딕" charset="0"/>
+              </a:rPr>
+              <a:t> 오브젝트의 하위 오브젝트로 설정</a:t>
+            </a:r>
+            <a:r>
+              <a:rPr lang="ko-KR" sz="1800">
+                <a:latin typeface="맑은 고딕" charset="0"/>
+                <a:ea typeface="맑은 고딕" charset="0"/>
+              </a:rPr>
+              <a:t>하고</a:t>
+            </a:r>
+            <a:r>
+              <a:rPr lang="ko-KR" sz="1800">
+                <a:latin typeface="맑은 고딕" charset="0"/>
+                <a:ea typeface="맑은 고딕" charset="0"/>
+              </a:rPr>
+              <a:t> PunRPC 함수로 </a:t>
+            </a:r>
+            <a:r>
+              <a:rPr lang="ko-KR" sz="1800">
+                <a:latin typeface="맑은 고딕" charset="0"/>
+                <a:ea typeface="맑은 고딕" charset="0"/>
+              </a:rPr>
+              <a:t>설정합니다.</a:t>
+            </a:r>
+            <a:endParaRPr lang="ko-KR" altLang="en-US" sz="1800">
+              <a:latin typeface="맑은 고딕" charset="0"/>
+              <a:ea typeface="맑은 고딕" charset="0"/>
+            </a:endParaRPr>
+          </a:p>
+        </p:txBody>
+      </p:sp>
+      <p:sp>
+        <p:nvSpPr>
+          <p:cNvPr id="31" name="텍스트 상자 24"/>
           <p:cNvSpPr txBox="1">
             <a:spLocks/>
           </p:cNvSpPr>
           <p:nvPr/>
         </p:nvSpPr>
         <p:spPr>
-          <a:xfrm>
-            <a:off x="1189355" y="3961130"/>
-            <a:ext cx="4124325" cy="2031365"/>
+          <a:xfrm rot="0">
+            <a:off x="6791325" y="4315460"/>
+            <a:ext cx="4324985" cy="1754505"/>
           </a:xfrm>
           <a:prstGeom prst="rect"/>
           <a:noFill/>
@@ -11482,7 +10544,7 @@
           </a:bodyPr>
           <a:lstStyle/>
           <a:p>
-            <a:pPr marL="0" indent="0" rtl="0" algn="l" defTabSz="914400" eaLnBrk="1" latinLnBrk="0" hangingPunct="1">
+            <a:pPr marL="0" indent="0" algn="l" latinLnBrk="0" hangingPunct="1">
               <a:buFontTx/>
               <a:buNone/>
             </a:pPr>
@@ -11494,7 +10556,7 @@
                 <a:latin typeface="맑은 고딕" charset="0"/>
                 <a:ea typeface="맑은 고딕" charset="0"/>
               </a:rPr>
-              <a:t>8</a:t>
+              <a:t>11</a:t>
             </a:r>
             <a:r>
               <a:rPr sz="1800" b="1">
@@ -11518,7 +10580,7 @@
                 <a:latin typeface="맑은 고딕" charset="0"/>
                 <a:ea typeface="맑은 고딕" charset="0"/>
               </a:rPr>
-              <a:t>빈 게임 오브젝트를 생성하고 이름은 Chatting Manager로 변경합니다.</a:t>
+              <a:t>그다음 InputField에 입력한 값을 string 변수에 저장합니다.</a:t>
             </a:r>
             <a:endParaRPr lang="ko-KR" altLang="en-US" sz="1800">
               <a:latin typeface="맑은 고딕" charset="0"/>
@@ -11526,7 +10588,7 @@
             </a:endParaRPr>
           </a:p>
           <a:p>
-            <a:pPr marL="0" indent="0" rtl="0" algn="l" defTabSz="914400" eaLnBrk="1" latinLnBrk="0" hangingPunct="1">
+            <a:pPr marL="0" indent="0" algn="l" latinLnBrk="0" hangingPunct="1">
               <a:buFontTx/>
               <a:buNone/>
             </a:pPr>
@@ -11536,7 +10598,7 @@
             </a:endParaRPr>
           </a:p>
           <a:p>
-            <a:pPr marL="0" indent="0" rtl="0" algn="l" defTabSz="914400" eaLnBrk="1" latinLnBrk="0" hangingPunct="1">
+            <a:pPr marL="0" indent="0" algn="l" latinLnBrk="0" hangingPunct="1">
               <a:buFontTx/>
               <a:buNone/>
             </a:pPr>
@@ -11545,21 +10607,21 @@
                 <a:latin typeface="맑은 고딕" charset="0"/>
                 <a:ea typeface="맑은 고딕" charset="0"/>
               </a:rPr>
-              <a:t>그리고 ChatManager라는 스크립트를 </a:t>
+              <a:t>마지막으로 채팅을 입력하고 Enter Key를 누르는 순간 RPC 함수를 호출</a:t>
             </a:r>
             <a:r>
               <a:rPr lang="ko-KR" sz="1800">
                 <a:latin typeface="맑은 고딕" charset="0"/>
                 <a:ea typeface="맑은 고딕" charset="0"/>
               </a:rPr>
-              <a:t>생성하고</a:t>
+              <a:t>합니다</a:t>
             </a:r>
             <a:r>
               <a:rPr lang="ko-KR" sz="1800">
                 <a:latin typeface="맑은 고딕" charset="0"/>
                 <a:ea typeface="맑은 고딕" charset="0"/>
               </a:rPr>
-              <a:t> Chatting Manager 오브젝트에 넣어줍니다.</a:t>
+              <a:t>.</a:t>
             </a:r>
             <a:endParaRPr lang="ko-KR" altLang="en-US" sz="1800">
               <a:latin typeface="맑은 고딕" charset="0"/>
@@ -11570,14 +10632,14 @@
       </p:sp>
       <p:pic>
         <p:nvPicPr>
-          <p:cNvPr id="16" name="그림 32" descr="C:/Users/Admin1/AppData/Roaming/PolarisOffice/ETemp/21612_20234488/fImage21692074464.png"/>
+          <p:cNvPr id="34" name="그림 32"/>
           <p:cNvPicPr>
             <a:picLocks noChangeAspect="1"/>
           </p:cNvPicPr>
           <p:nvPr/>
         </p:nvPicPr>
         <p:blipFill rotWithShape="1">
-          <a:blip r:embed="rId2" cstate="hqprint">
+          <a:blip r:embed="rId7" cstate="hqprint">
             <a:extLst>
               <a:ext uri="{28A0092B-C50C-407E-A947-70E740481C1C}">
                 <a14:useLocalDpi xmlns:a14="http://schemas.microsoft.com/office/drawing/2010/main"/>
@@ -11590,25 +10652,81 @@
         </p:blipFill>
         <p:spPr>
           <a:xfrm rot="0">
-            <a:off x="4238625" y="3030220"/>
-            <a:ext cx="743585" cy="791845"/>
-          </a:xfrm>
-          <a:prstGeom prst="roundRect"/>
-          <a:solidFill>
-            <a:srgbClr val="EDEDED"/>
-          </a:solidFill>
+            <a:off x="6800850" y="1337945"/>
+            <a:ext cx="4315460" cy="2834640"/>
+          </a:xfrm>
+          <a:prstGeom prst="rect"/>
+          <a:noFill/>
         </p:spPr>
       </p:pic>
+      <p:sp>
+        <p:nvSpPr>
+          <p:cNvPr id="35" name="텍스트 상자 45"/>
+          <p:cNvSpPr txBox="1">
+            <a:spLocks/>
+          </p:cNvSpPr>
+          <p:nvPr/>
+        </p:nvSpPr>
+        <p:spPr>
+          <a:xfrm>
+            <a:off x="4323715" y="476885"/>
+            <a:ext cx="3554730" cy="554990"/>
+          </a:xfrm>
+          <a:prstGeom prst="rect"/>
+          <a:noFill/>
+          <a:ln w="0">
+            <a:noFill/>
+            <a:prstDash/>
+          </a:ln>
+        </p:spPr>
+        <p:txBody>
+          <a:bodyPr wrap="square" lIns="89535" tIns="46355" rIns="89535" bIns="46355" numCol="1" vert="horz" anchor="t">
+            <a:spAutoFit/>
+          </a:bodyPr>
+          <a:lstStyle/>
+          <a:p>
+            <a:pPr marL="0" indent="0" rtl="0" algn="l" defTabSz="914400" eaLnBrk="1" latinLnBrk="0" hangingPunct="1">
+              <a:buFontTx/>
+              <a:buNone/>
+            </a:pPr>
+            <a:r>
+              <a:rPr lang="ko-KR" sz="3000" b="1">
+                <a:latin typeface="맑은 고딕" charset="0"/>
+                <a:ea typeface="맑은 고딕" charset="0"/>
+              </a:rPr>
+              <a:t>여섯</a:t>
+            </a:r>
+            <a:r>
+              <a:rPr lang="ko-KR" sz="3000" b="1">
+                <a:latin typeface="맑은 고딕" charset="0"/>
+                <a:ea typeface="맑은 고딕" charset="0"/>
+              </a:rPr>
+              <a:t> 번째 튜토리얼</a:t>
+            </a:r>
+            <a:r>
+              <a:rPr sz="3000" b="1">
+                <a:latin typeface="맑은 고딕" charset="0"/>
+                <a:ea typeface="맑은 고딕" charset="0"/>
+              </a:rPr>
+              <a:t> </a:t>
+            </a:r>
+            <a:endParaRPr lang="ko-KR" altLang="en-US" sz="3000" b="1">
+              <a:latin typeface="맑은 고딕" charset="0"/>
+              <a:ea typeface="맑은 고딕" charset="0"/>
+            </a:endParaRPr>
+          </a:p>
+        </p:txBody>
+      </p:sp>
       <p:pic>
         <p:nvPicPr>
-          <p:cNvPr id="17" name="그림 37" descr="C:/Users/Admin1/AppData/Roaming/PolarisOffice/ETemp/21612_20234488/fImage330252115705.png"/>
+          <p:cNvPr id="36" name="그림 2"/>
           <p:cNvPicPr>
             <a:picLocks noChangeAspect="1"/>
           </p:cNvPicPr>
           <p:nvPr/>
         </p:nvPicPr>
         <p:blipFill rotWithShape="1">
-          <a:blip r:embed="rId3" cstate="hqprint">
+          <a:blip r:embed="rId8" cstate="hqprint">
             <a:extLst>
               <a:ext uri="{28A0092B-C50C-407E-A947-70E740481C1C}">
                 <a14:useLocalDpi xmlns:a14="http://schemas.microsoft.com/office/drawing/2010/main"/>
@@ -11621,215 +10739,11 @@
         </p:blipFill>
         <p:spPr>
           <a:xfrm rot="0">
-            <a:off x="1252855" y="1322705"/>
-            <a:ext cx="2395855" cy="2494915"/>
-          </a:xfrm>
-          <a:prstGeom prst="roundRect"/>
-          <a:solidFill>
-            <a:srgbClr val="EDEDED"/>
-          </a:solidFill>
-        </p:spPr>
-      </p:pic>
-      <p:sp>
-        <p:nvSpPr>
-          <p:cNvPr id="21" name="텍스트 상자 44"/>
-          <p:cNvSpPr txBox="1">
-            <a:spLocks/>
-          </p:cNvSpPr>
-          <p:nvPr/>
-        </p:nvSpPr>
-        <p:spPr>
-          <a:xfrm rot="0">
-            <a:off x="6819900" y="4234180"/>
-            <a:ext cx="4029710" cy="1754505"/>
+            <a:off x="1231265" y="1356995"/>
+            <a:ext cx="4124325" cy="2806065"/>
           </a:xfrm>
           <a:prstGeom prst="rect"/>
           <a:noFill/>
-          <a:ln w="0">
-            <a:noFill/>
-            <a:prstDash/>
-          </a:ln>
-        </p:spPr>
-        <p:txBody>
-          <a:bodyPr wrap="square" lIns="89535" tIns="46355" rIns="89535" bIns="46355" numCol="1" vert="horz" anchor="t">
-            <a:spAutoFit/>
-          </a:bodyPr>
-          <a:lstStyle/>
-          <a:p>
-            <a:pPr marL="0" indent="0" rtl="0" algn="l" defTabSz="914400" eaLnBrk="1" latinLnBrk="0" hangingPunct="1">
-              <a:buFontTx/>
-              <a:buNone/>
-            </a:pPr>
-            <a:r>
-              <a:rPr lang="ko-KR" sz="1800" b="1">
-                <a:solidFill>
-                  <a:srgbClr val="0611F2"/>
-                </a:solidFill>
-                <a:latin typeface="맑은 고딕" charset="0"/>
-                <a:ea typeface="맑은 고딕" charset="0"/>
-              </a:rPr>
-              <a:t>9</a:t>
-            </a:r>
-            <a:r>
-              <a:rPr sz="1800" b="1">
-                <a:solidFill>
-                  <a:srgbClr val="0611F2"/>
-                </a:solidFill>
-                <a:latin typeface="맑은 고딕" charset="0"/>
-                <a:ea typeface="맑은 고딕" charset="0"/>
-              </a:rPr>
-              <a:t>.</a:t>
-            </a:r>
-            <a:r>
-              <a:rPr sz="1800">
-                <a:latin typeface="맑은 고딕" charset="0"/>
-                <a:ea typeface="맑은 고딕" charset="0"/>
-              </a:rPr>
-              <a:t> </a:t>
-            </a:r>
-            <a:r>
-              <a:rPr lang="ko-KR" sz="1800">
-                <a:latin typeface="맑은 고딕" charset="0"/>
-                <a:ea typeface="맑은 고딕" charset="0"/>
-              </a:rPr>
-              <a:t>이제</a:t>
-            </a:r>
-            <a:r>
-              <a:rPr lang="ko-KR" sz="1800">
-                <a:latin typeface="맑은 고딕" charset="0"/>
-                <a:ea typeface="맑은 고딕" charset="0"/>
-              </a:rPr>
-              <a:t> 텍스트를 입력할 InputField와 채팅 UI를 생성하기 위한 GameObject 선언합니다.</a:t>
-            </a:r>
-            <a:endParaRPr lang="ko-KR" altLang="en-US" sz="1800">
-              <a:latin typeface="맑은 고딕" charset="0"/>
-              <a:ea typeface="맑은 고딕" charset="0"/>
-            </a:endParaRPr>
-          </a:p>
-          <a:p>
-            <a:pPr marL="0" indent="0" rtl="0" algn="l" defTabSz="914400" eaLnBrk="1" latinLnBrk="0" hangingPunct="1">
-              <a:buFontTx/>
-              <a:buNone/>
-            </a:pPr>
-            <a:endParaRPr lang="ko-KR" altLang="en-US" sz="1800">
-              <a:latin typeface="맑은 고딕" charset="0"/>
-              <a:ea typeface="맑은 고딕" charset="0"/>
-            </a:endParaRPr>
-          </a:p>
-          <a:p>
-            <a:pPr marL="0" indent="0" rtl="0" algn="l" defTabSz="914400" eaLnBrk="1" latinLnBrk="0" hangingPunct="1">
-              <a:buFontTx/>
-              <a:buNone/>
-            </a:pPr>
-            <a:r>
-              <a:rPr lang="ko-KR" sz="1800">
-                <a:latin typeface="맑은 고딕" charset="0"/>
-                <a:ea typeface="맑은 고딕" charset="0"/>
-              </a:rPr>
-              <a:t>마지막으로 텍스트의 위치를 조정할 Transform 변수를 선언합니다.</a:t>
-            </a:r>
-            <a:endParaRPr lang="ko-KR" altLang="en-US" sz="1800">
-              <a:latin typeface="맑은 고딕" charset="0"/>
-              <a:ea typeface="맑은 고딕" charset="0"/>
-            </a:endParaRPr>
-          </a:p>
-        </p:txBody>
-      </p:sp>
-      <p:pic>
-        <p:nvPicPr>
-          <p:cNvPr id="26" name="그림 51" descr="C:/Users/Admin1/AppData/Roaming/PolarisOffice/ETemp/21612_20234488/fImage94852004464.png"/>
-          <p:cNvPicPr>
-            <a:picLocks noChangeAspect="1"/>
-          </p:cNvPicPr>
-          <p:nvPr/>
-        </p:nvPicPr>
-        <p:blipFill rotWithShape="1">
-          <a:blip r:embed="rId9" cstate="print">
-            <a:extLst>
-              <a:ext uri="{28A0092B-C50C-407E-A947-70E740481C1C}">
-                <a14:useLocalDpi xmlns:a14="http://schemas.microsoft.com/office/drawing/2010/main" val="0"/>
-              </a:ext>
-            </a:extLst>
-          </a:blip>
-          <a:stretch>
-            <a:fillRect/>
-          </a:stretch>
-        </p:blipFill>
-        <p:spPr>
-          <a:xfrm rot="0">
-            <a:off x="3841750" y="1333500"/>
-            <a:ext cx="1530985" cy="1418590"/>
-          </a:xfrm>
-          <a:prstGeom prst="roundRect"/>
-          <a:solidFill>
-            <a:srgbClr val="EDEDED"/>
-          </a:solidFill>
-        </p:spPr>
-      </p:pic>
-      <p:cxnSp>
-        <p:nvCxnSpPr>
-          <p:cNvPr id="19" name="도형 39"/>
-          <p:cNvCxnSpPr>
-            <a:stCxn id="16" idx="0"/>
-            <a:endCxn id="26" idx="2"/>
-          </p:cNvCxnSpPr>
-          <p:nvPr/>
-        </p:nvCxnSpPr>
-        <p:spPr>
-          <a:xfrm rot="0" flipH="1" flipV="1">
-            <a:off x="4606925" y="2751455"/>
-            <a:ext cx="3810" cy="279400"/>
-          </a:xfrm>
-          <a:prstGeom prst="straightConnector1"/>
-          <a:ln w="6350" cap="flat" cmpd="sng">
-            <a:prstDash/>
-            <a:tailEnd type="triangle" w="med" len="med"/>
-          </a:ln>
-        </p:spPr>
-        <p:style>
-          <a:lnRef idx="1">
-            <a:schemeClr val="accent1"/>
-          </a:lnRef>
-          <a:fillRef idx="0">
-            <a:schemeClr val="accent1"/>
-          </a:fillRef>
-          <a:effectRef idx="0">
-            <a:schemeClr val="accent1"/>
-          </a:effectRef>
-          <a:fontRef idx="minor">
-            <a:schemeClr val="tx1"/>
-          </a:fontRef>
-        </p:style>
-      </p:cxnSp>
-      <p:pic>
-        <p:nvPicPr>
-          <p:cNvPr id="27" name="그림 54" descr="C:/Users/Admin1/AppData/Roaming/PolarisOffice/ETemp/21612_20234488/fImage97142015705.png"/>
-          <p:cNvPicPr>
-            <a:picLocks noChangeAspect="1"/>
-          </p:cNvPicPr>
-          <p:nvPr/>
-        </p:nvPicPr>
-        <p:blipFill rotWithShape="1">
-          <a:blip r:embed="rId10" cstate="print">
-            <a:extLst>
-              <a:ext uri="{28A0092B-C50C-407E-A947-70E740481C1C}">
-                <a14:useLocalDpi xmlns:a14="http://schemas.microsoft.com/office/drawing/2010/main" val="0"/>
-              </a:ext>
-            </a:extLst>
-          </a:blip>
-          <a:stretch>
-            <a:fillRect/>
-          </a:stretch>
-        </p:blipFill>
-        <p:spPr>
-          <a:xfrm rot="0">
-            <a:off x="6819900" y="1323975"/>
-            <a:ext cx="4020185" cy="2724150"/>
-          </a:xfrm>
-          <a:prstGeom prst="roundRect"/>
-          <a:solidFill>
-            <a:srgbClr val="EDEDED"/>
-          </a:solidFill>
         </p:spPr>
       </p:pic>
     </p:spTree>
@@ -11874,7 +10788,7 @@
       </p:grpSpPr>
       <p:sp>
         <p:nvSpPr>
-          <p:cNvPr id="25" name="Rect 0"/>
+          <p:cNvPr id="29" name="Rect 0"/>
           <p:cNvSpPr txBox="1">
             <a:spLocks/>
           </p:cNvSpPr>
@@ -11882,8 +10796,8 @@
         </p:nvSpPr>
         <p:spPr>
           <a:xfrm rot="0">
-            <a:off x="1229995" y="4312920"/>
-            <a:ext cx="4133850" cy="1754505"/>
+            <a:off x="1229995" y="1337310"/>
+            <a:ext cx="4038600" cy="370205"/>
           </a:xfrm>
           <a:prstGeom prst="rect"/>
           <a:noFill/>
@@ -11902,142 +10816,25 @@
               <a:buFontTx/>
               <a:buNone/>
             </a:pPr>
-            <a:r>
-              <a:rPr lang="ko-KR" sz="1800" b="1">
-                <a:solidFill>
-                  <a:srgbClr val="0611F2"/>
-                </a:solidFill>
-                <a:latin typeface="맑은 고딕" charset="0"/>
-                <a:ea typeface="맑은 고딕" charset="0"/>
-              </a:rPr>
-              <a:t>10</a:t>
-            </a:r>
-            <a:r>
-              <a:rPr sz="1800" b="1">
-                <a:solidFill>
-                  <a:srgbClr val="0611F2"/>
-                </a:solidFill>
-                <a:latin typeface="맑은 고딕" charset="0"/>
-                <a:ea typeface="맑은 고딕" charset="0"/>
-              </a:rPr>
-              <a:t>.</a:t>
-            </a:r>
-            <a:r>
-              <a:rPr sz="1800">
-                <a:latin typeface="맑은 고딕" charset="0"/>
-                <a:ea typeface="맑은 고딕" charset="0"/>
-              </a:rPr>
-              <a:t> </a:t>
-            </a:r>
-            <a:r>
-              <a:rPr lang="ko-KR" sz="1800">
-                <a:latin typeface="맑은 고딕" charset="0"/>
-                <a:ea typeface="맑은 고딕" charset="0"/>
-              </a:rPr>
-              <a:t>이제 </a:t>
-            </a:r>
-            <a:r>
-              <a:rPr lang="ko-KR" sz="1800">
-                <a:latin typeface="맑은 고딕" charset="0"/>
-                <a:ea typeface="맑은 고딕" charset="0"/>
-              </a:rPr>
-              <a:t>채팅 UI를 생성하도록 설정</a:t>
-            </a:r>
-            <a:r>
-              <a:rPr lang="ko-KR" sz="1800">
-                <a:latin typeface="맑은 고딕" charset="0"/>
-                <a:ea typeface="맑은 고딕" charset="0"/>
-              </a:rPr>
-              <a:t>합니다.</a:t>
-            </a:r>
             <a:endParaRPr lang="ko-KR" altLang="en-US" sz="1800">
               <a:latin typeface="맑은 고딕" charset="0"/>
               <a:ea typeface="맑은 고딕" charset="0"/>
             </a:endParaRPr>
           </a:p>
-          <a:p>
-            <a:pPr marL="0" indent="0" algn="l" latinLnBrk="0" hangingPunct="1">
-              <a:buFontTx/>
-              <a:buNone/>
-            </a:pPr>
-            <a:endParaRPr lang="ko-KR" altLang="en-US" sz="1800">
-              <a:latin typeface="맑은 고딕" charset="0"/>
-              <a:ea typeface="맑은 고딕" charset="0"/>
-            </a:endParaRPr>
-          </a:p>
-          <a:p>
-            <a:pPr marL="0" indent="0" algn="l" latinLnBrk="0" hangingPunct="1">
-              <a:buFontTx/>
-              <a:buNone/>
-            </a:pPr>
-            <a:r>
-              <a:rPr lang="ko-KR" sz="1800">
-                <a:latin typeface="맑은 고딕" charset="0"/>
-                <a:ea typeface="맑은 고딕" charset="0"/>
-              </a:rPr>
-              <a:t>그리고</a:t>
-            </a:r>
-            <a:r>
-              <a:rPr lang="ko-KR" sz="1800">
-                <a:latin typeface="맑은 고딕" charset="0"/>
-                <a:ea typeface="맑은 고딕" charset="0"/>
-              </a:rPr>
-              <a:t> 채팅 UI의 위치를 </a:t>
-            </a:r>
-            <a:r>
-              <a:rPr lang="ko-KR" sz="1800">
-                <a:latin typeface="맑은 고딕" charset="0"/>
-                <a:ea typeface="맑은 고딕" charset="0"/>
-              </a:rPr>
-              <a:t>content</a:t>
-            </a:r>
-            <a:r>
-              <a:rPr lang="ko-KR" sz="1800">
-                <a:latin typeface="맑은 고딕" charset="0"/>
-                <a:ea typeface="맑은 고딕" charset="0"/>
-              </a:rPr>
-              <a:t> 오브젝트의 하위 오브젝트로 설정</a:t>
-            </a:r>
-            <a:r>
-              <a:rPr lang="ko-KR" sz="1800">
-                <a:latin typeface="맑은 고딕" charset="0"/>
-                <a:ea typeface="맑은 고딕" charset="0"/>
-              </a:rPr>
-              <a:t>하고</a:t>
-            </a:r>
-            <a:r>
-              <a:rPr lang="ko-KR" sz="1800">
-                <a:latin typeface="맑은 고딕" charset="0"/>
-                <a:ea typeface="맑은 고딕" charset="0"/>
-              </a:rPr>
-              <a:t> PunRPC 함수로 </a:t>
-            </a:r>
-            <a:r>
-              <a:rPr lang="ko-KR" sz="1800">
-                <a:latin typeface="맑은 고딕" charset="0"/>
-                <a:ea typeface="맑은 고딕" charset="0"/>
-              </a:rPr>
-              <a:t>설정합니다.</a:t>
-            </a:r>
-            <a:endParaRPr lang="ko-KR" altLang="en-US" sz="1800">
-              <a:latin typeface="맑은 고딕" charset="0"/>
-              <a:ea typeface="맑은 고딕" charset="0"/>
-            </a:endParaRPr>
-          </a:p>
-        </p:txBody>
-      </p:sp>
-      <p:sp>
-        <p:nvSpPr>
-          <p:cNvPr id="31" name="텍스트 상자 24"/>
+        </p:txBody>
+      </p:sp>
+      <p:sp>
+        <p:nvSpPr>
+          <p:cNvPr id="35" name="Rect 0"/>
           <p:cNvSpPr txBox="1">
             <a:spLocks/>
           </p:cNvSpPr>
           <p:nvPr/>
         </p:nvSpPr>
         <p:spPr>
-          <a:xfrm rot="0">
-            <a:off x="6791325" y="4315460"/>
-            <a:ext cx="4324985" cy="1754505"/>
+          <a:xfrm>
+            <a:off x="4342765" y="467995"/>
+            <a:ext cx="3504565" cy="554990"/>
           </a:xfrm>
           <a:prstGeom prst="rect"/>
           <a:noFill/>
@@ -12052,20 +10849,68 @@
           </a:bodyPr>
           <a:lstStyle/>
           <a:p>
+            <a:pPr marL="0" indent="0" rtl="0" algn="l" defTabSz="914400" eaLnBrk="1" latinLnBrk="0" hangingPunct="1">
+              <a:buFontTx/>
+              <a:buNone/>
+            </a:pPr>
+            <a:r>
+              <a:rPr lang="ko-KR" sz="3000" b="1">
+                <a:latin typeface="맑은 고딕" charset="0"/>
+                <a:ea typeface="맑은 고딕" charset="0"/>
+              </a:rPr>
+              <a:t>일곱</a:t>
+            </a:r>
+            <a:r>
+              <a:rPr lang="ko-KR" sz="3000" b="1">
+                <a:latin typeface="맑은 고딕" charset="0"/>
+                <a:ea typeface="맑은 고딕" charset="0"/>
+              </a:rPr>
+              <a:t> 번째 튜토리얼</a:t>
+            </a:r>
+            <a:r>
+              <a:rPr sz="3000" b="1">
+                <a:latin typeface="맑은 고딕" charset="0"/>
+                <a:ea typeface="맑은 고딕" charset="0"/>
+              </a:rPr>
+              <a:t> </a:t>
+            </a:r>
+            <a:endParaRPr lang="ko-KR" altLang="en-US" sz="3000" b="1">
+              <a:latin typeface="맑은 고딕" charset="0"/>
+              <a:ea typeface="맑은 고딕" charset="0"/>
+            </a:endParaRPr>
+          </a:p>
+        </p:txBody>
+      </p:sp>
+      <p:sp>
+        <p:nvSpPr>
+          <p:cNvPr id="36" name="텍스트 상자 59"/>
+          <p:cNvSpPr txBox="1">
+            <a:spLocks/>
+          </p:cNvSpPr>
+          <p:nvPr/>
+        </p:nvSpPr>
+        <p:spPr>
+          <a:xfrm rot="0">
+            <a:off x="1228725" y="5160010"/>
+            <a:ext cx="4191635" cy="923925"/>
+          </a:xfrm>
+          <a:prstGeom prst="rect"/>
+          <a:noFill/>
+          <a:ln w="0">
+            <a:noFill/>
+            <a:prstDash/>
+          </a:ln>
+        </p:spPr>
+        <p:txBody>
+          <a:bodyPr wrap="square" lIns="89535" tIns="46355" rIns="89535" bIns="46355" numCol="1" vert="horz" anchor="t">
+            <a:spAutoFit/>
+          </a:bodyPr>
+          <a:lstStyle/>
+          <a:p>
             <a:pPr marL="0" indent="0" algn="l" latinLnBrk="0" hangingPunct="1">
               <a:buFontTx/>
               <a:buNone/>
             </a:pPr>
-            <a:r>
-              <a:rPr lang="ko-KR" sz="1800" b="1">
-                <a:solidFill>
-                  <a:srgbClr val="0611F2"/>
-                </a:solidFill>
-                <a:latin typeface="맑은 고딕" charset="0"/>
-                <a:ea typeface="맑은 고딕" charset="0"/>
-              </a:rPr>
-              <a:t>11</a:t>
-            </a:r>
             <a:r>
               <a:rPr sz="1800" b="1">
                 <a:solidFill>
@@ -12074,6 +10919,26 @@
                 <a:latin typeface="맑은 고딕" charset="0"/>
                 <a:ea typeface="맑은 고딕" charset="0"/>
               </a:rPr>
+              <a:t>1</a:t>
+            </a:r>
+            <a:r>
+              <a:rPr sz="1800" b="1">
+                <a:solidFill>
+                  <a:srgbClr val="0611F2"/>
+                </a:solidFill>
+                <a:latin typeface="맑은 고딕" charset="0"/>
+                <a:ea typeface="맑은 고딕" charset="0"/>
+              </a:rPr>
+              <a:t>2</a:t>
+            </a:r>
+            <a:r>
+              <a:rPr sz="1800" b="1">
+                <a:solidFill>
+                  <a:srgbClr val="0611F2"/>
+                </a:solidFill>
+                <a:latin typeface="맑은 고딕" charset="0"/>
+                <a:ea typeface="맑은 고딕" charset="0"/>
+              </a:rPr>
               <a:t>.</a:t>
             </a:r>
             <a:r>
@@ -12088,66 +10953,25 @@
                 <a:latin typeface="맑은 고딕" charset="0"/>
                 <a:ea typeface="맑은 고딕" charset="0"/>
               </a:rPr>
-              <a:t>그다음 InputField에 입력한 값을 string 변수에 저장합니다.</a:t>
+              <a:t>그리고 Scroll Rect 옵션에 수직으로 이동만 하므로 Horizontal을 비활성화합니다.</a:t>
             </a:r>
             <a:endParaRPr lang="ko-KR" altLang="en-US" sz="1800">
               <a:latin typeface="맑은 고딕" charset="0"/>
               <a:ea typeface="맑은 고딕" charset="0"/>
             </a:endParaRPr>
           </a:p>
-          <a:p>
-            <a:pPr marL="0" indent="0" algn="l" latinLnBrk="0" hangingPunct="1">
-              <a:buFontTx/>
-              <a:buNone/>
-            </a:pPr>
-            <a:endParaRPr lang="ko-KR" altLang="en-US" sz="1800">
-              <a:latin typeface="맑은 고딕" charset="0"/>
-              <a:ea typeface="맑은 고딕" charset="0"/>
-            </a:endParaRPr>
-          </a:p>
-          <a:p>
-            <a:pPr marL="0" indent="0" algn="l" latinLnBrk="0" hangingPunct="1">
-              <a:buFontTx/>
-              <a:buNone/>
-            </a:pPr>
-            <a:r>
-              <a:rPr lang="ko-KR" sz="1800">
-                <a:latin typeface="맑은 고딕" charset="0"/>
-                <a:ea typeface="맑은 고딕" charset="0"/>
-              </a:rPr>
-              <a:t>마지막으로 채팅을 입력하고 Enter Key를 누르는 순간 RPC 함수를 호출</a:t>
-            </a:r>
-            <a:r>
-              <a:rPr lang="ko-KR" sz="1800">
-                <a:latin typeface="맑은 고딕" charset="0"/>
-                <a:ea typeface="맑은 고딕" charset="0"/>
-              </a:rPr>
-              <a:t>합니다</a:t>
-            </a:r>
-            <a:r>
-              <a:rPr lang="ko-KR" sz="1800">
-                <a:latin typeface="맑은 고딕" charset="0"/>
-                <a:ea typeface="맑은 고딕" charset="0"/>
-              </a:rPr>
-              <a:t>.</a:t>
-            </a:r>
-            <a:endParaRPr lang="ko-KR" altLang="en-US" sz="1800">
-              <a:latin typeface="맑은 고딕" charset="0"/>
-              <a:ea typeface="맑은 고딕" charset="0"/>
-            </a:endParaRPr>
-          </a:p>
         </p:txBody>
       </p:sp>
       <p:pic>
         <p:nvPicPr>
-          <p:cNvPr id="34" name="그림 32" descr="C:/Users/Admin1/AppData/Roaming/PolarisOffice/ETemp/21612_20234488/fImage115431423281.png"/>
+          <p:cNvPr id="37" name="그림 60"/>
           <p:cNvPicPr>
             <a:picLocks noChangeAspect="1"/>
           </p:cNvPicPr>
           <p:nvPr/>
         </p:nvPicPr>
         <p:blipFill rotWithShape="1">
-          <a:blip r:embed="rId7" cstate="hqprint">
+          <a:blip r:embed="rId5" cstate="hqprint">
             <a:extLst>
               <a:ext uri="{28A0092B-C50C-407E-A947-70E740481C1C}">
                 <a14:useLocalDpi xmlns:a14="http://schemas.microsoft.com/office/drawing/2010/main"/>
@@ -12160,8 +10984,8 @@
         </p:blipFill>
         <p:spPr>
           <a:xfrm rot="0">
-            <a:off x="6800850" y="1337945"/>
-            <a:ext cx="4315460" cy="2834640"/>
+            <a:off x="1174115" y="1504950"/>
+            <a:ext cx="4198620" cy="3486785"/>
           </a:xfrm>
           <a:prstGeom prst="rect"/>
           <a:noFill/>
@@ -12169,7 +10993,7 @@
       </p:pic>
       <p:sp>
         <p:nvSpPr>
-          <p:cNvPr id="35" name="텍스트 상자 45"/>
+          <p:cNvPr id="38" name="텍스트 상자 64"/>
           <p:cNvSpPr txBox="1">
             <a:spLocks/>
           </p:cNvSpPr>
@@ -12177,8 +11001,8 @@
         </p:nvSpPr>
         <p:spPr>
           <a:xfrm rot="0">
-            <a:off x="4323715" y="476885"/>
-            <a:ext cx="3554095" cy="554990"/>
+            <a:off x="6798310" y="5496560"/>
+            <a:ext cx="4079875" cy="647065"/>
           </a:xfrm>
           <a:prstGeom prst="rect"/>
           <a:noFill/>
@@ -12193,32 +11017,69 @@
           </a:bodyPr>
           <a:lstStyle/>
           <a:p>
-            <a:pPr marL="0" indent="0" rtl="0" algn="l" defTabSz="914400" eaLnBrk="1" latinLnBrk="0" hangingPunct="1">
-              <a:buFontTx/>
-              <a:buNone/>
-            </a:pPr>
-            <a:r>
-              <a:rPr lang="ko-KR" sz="3000" b="1">
-                <a:latin typeface="맑은 고딕" charset="0"/>
-                <a:ea typeface="맑은 고딕" charset="0"/>
-              </a:rPr>
-              <a:t>일곱</a:t>
-            </a:r>
-            <a:r>
-              <a:rPr lang="ko-KR" sz="3000" b="1">
-                <a:latin typeface="맑은 고딕" charset="0"/>
-                <a:ea typeface="맑은 고딕" charset="0"/>
-              </a:rPr>
-              <a:t> 번째 튜토리얼</a:t>
-            </a:r>
-            <a:r>
-              <a:rPr sz="3000" b="1">
+            <a:pPr marL="0" indent="0" algn="l" latinLnBrk="0" hangingPunct="1">
+              <a:buFontTx/>
+              <a:buNone/>
+            </a:pPr>
+            <a:r>
+              <a:rPr sz="1800" b="1">
+                <a:solidFill>
+                  <a:srgbClr val="0611F2"/>
+                </a:solidFill>
+                <a:latin typeface="맑은 고딕" charset="0"/>
+                <a:ea typeface="맑은 고딕" charset="0"/>
+              </a:rPr>
+              <a:t>1</a:t>
+            </a:r>
+            <a:r>
+              <a:rPr sz="1800" b="1">
+                <a:solidFill>
+                  <a:srgbClr val="0611F2"/>
+                </a:solidFill>
+                <a:latin typeface="맑은 고딕" charset="0"/>
+                <a:ea typeface="맑은 고딕" charset="0"/>
+              </a:rPr>
+              <a:t>3</a:t>
+            </a:r>
+            <a:r>
+              <a:rPr sz="1800" b="1">
+                <a:solidFill>
+                  <a:srgbClr val="0611F2"/>
+                </a:solidFill>
+                <a:latin typeface="맑은 고딕" charset="0"/>
+                <a:ea typeface="맑은 고딕" charset="0"/>
+              </a:rPr>
+              <a:t>.</a:t>
+            </a:r>
+            <a:r>
+              <a:rPr sz="1800">
                 <a:latin typeface="맑은 고딕" charset="0"/>
                 <a:ea typeface="맑은 고딕" charset="0"/>
               </a:rPr>
               <a:t> </a:t>
             </a:r>
-            <a:endParaRPr lang="ko-KR" altLang="en-US" sz="3000" b="1">
+            <a:r>
+              <a:rPr lang="ko-KR" sz="1800">
+                <a:latin typeface="맑은 고딕" charset="0"/>
+                <a:ea typeface="맑은 고딕" charset="0"/>
+              </a:rPr>
+              <a:t>마지막으로 Chatting Manager에</a:t>
+            </a:r>
+            <a:r>
+              <a:rPr lang="ko-KR" sz="1800">
+                <a:latin typeface="맑은 고딕" charset="0"/>
+                <a:ea typeface="맑은 고딕" charset="0"/>
+              </a:rPr>
+              <a:t> Photon View 컴포넌트를</a:t>
+            </a:r>
+            <a:r>
+              <a:rPr lang="ko-KR" sz="1800">
+                <a:latin typeface="맑은 고딕" charset="0"/>
+                <a:ea typeface="맑은 고딕" charset="0"/>
+              </a:rPr>
+              <a:t> 추가합니다.</a:t>
+            </a:r>
+            <a:endParaRPr lang="ko-KR" altLang="en-US" sz="1800">
               <a:latin typeface="맑은 고딕" charset="0"/>
               <a:ea typeface="맑은 고딕" charset="0"/>
             </a:endParaRPr>
@@ -12227,14 +11088,14 @@
       </p:sp>
       <p:pic>
         <p:nvPicPr>
-          <p:cNvPr id="36" name="그림 2" descr="C:/Users/Admin1/AppData/Roaming/PolarisOffice/ETemp/21612_20234488/fImage1486913841.png"/>
+          <p:cNvPr id="39" name="그림 65"/>
           <p:cNvPicPr>
             <a:picLocks noChangeAspect="1"/>
           </p:cNvPicPr>
           <p:nvPr/>
         </p:nvPicPr>
         <p:blipFill rotWithShape="1">
-          <a:blip r:embed="rId8" cstate="hqprint">
+          <a:blip r:embed="rId2" cstate="hqprint">
             <a:extLst>
               <a:ext uri="{28A0092B-C50C-407E-A947-70E740481C1C}">
                 <a14:useLocalDpi xmlns:a14="http://schemas.microsoft.com/office/drawing/2010/main"/>
@@ -12247,11 +11108,44 @@
         </p:blipFill>
         <p:spPr>
           <a:xfrm rot="0">
-            <a:off x="1231265" y="1356995"/>
-            <a:ext cx="4124325" cy="2806065"/>
-          </a:xfrm>
-          <a:prstGeom prst="rect"/>
-          <a:noFill/>
+            <a:off x="9153525" y="2095500"/>
+            <a:ext cx="1721485" cy="2677160"/>
+          </a:xfrm>
+          <a:prstGeom prst="roundRect"/>
+          <a:solidFill>
+            <a:srgbClr val="EDEDED"/>
+          </a:solidFill>
+        </p:spPr>
+      </p:pic>
+      <p:pic>
+        <p:nvPicPr>
+          <p:cNvPr id="40" name="그림 66"/>
+          <p:cNvPicPr>
+            <a:picLocks noChangeAspect="1"/>
+          </p:cNvPicPr>
+          <p:nvPr/>
+        </p:nvPicPr>
+        <p:blipFill rotWithShape="1">
+          <a:blip r:embed="rId7" cstate="print">
+            <a:extLst>
+              <a:ext uri="{28A0092B-C50C-407E-A947-70E740481C1C}">
+                <a14:useLocalDpi xmlns:a14="http://schemas.microsoft.com/office/drawing/2010/main" val="0"/>
+              </a:ext>
+            </a:extLst>
+          </a:blip>
+          <a:stretch>
+            <a:fillRect/>
+          </a:stretch>
+        </p:blipFill>
+        <p:spPr>
+          <a:xfrm rot="0">
+            <a:off x="6810375" y="1495425"/>
+            <a:ext cx="2200910" cy="3791585"/>
+          </a:xfrm>
+          <a:prstGeom prst="roundRect"/>
+          <a:solidFill>
+            <a:srgbClr val="EDEDED"/>
+          </a:solidFill>
         </p:spPr>
       </p:pic>
     </p:spTree>
@@ -12305,7 +11199,7 @@
         <p:spPr>
           <a:xfrm rot="0">
             <a:off x="1229995" y="1337310"/>
-            <a:ext cx="4038600" cy="370205"/>
+            <a:ext cx="4039235" cy="370840"/>
           </a:xfrm>
           <a:prstGeom prst="rect"/>
           <a:noFill/>
@@ -12333,16 +11227,16 @@
       </p:sp>
       <p:sp>
         <p:nvSpPr>
-          <p:cNvPr id="35" name="Rect 0"/>
+          <p:cNvPr id="31" name="Rect 0"/>
           <p:cNvSpPr txBox="1">
             <a:spLocks/>
           </p:cNvSpPr>
           <p:nvPr/>
         </p:nvSpPr>
         <p:spPr>
-          <a:xfrm>
-            <a:off x="4342765" y="467995"/>
-            <a:ext cx="3503930" cy="554990"/>
+          <a:xfrm rot="0">
+            <a:off x="6801485" y="3204210"/>
+            <a:ext cx="4162425" cy="370840"/>
           </a:xfrm>
           <a:prstGeom prst="rect"/>
           <a:noFill/>
@@ -12357,32 +11251,11 @@
           </a:bodyPr>
           <a:lstStyle/>
           <a:p>
-            <a:pPr marL="0" indent="0" rtl="0" algn="l" defTabSz="914400" eaLnBrk="1" latinLnBrk="0" hangingPunct="1">
-              <a:buFontTx/>
-              <a:buNone/>
-            </a:pPr>
-            <a:r>
-              <a:rPr lang="ko-KR" sz="3000" b="1">
-                <a:latin typeface="맑은 고딕" charset="0"/>
-                <a:ea typeface="맑은 고딕" charset="0"/>
-              </a:rPr>
-              <a:t>여덟</a:t>
-            </a:r>
-            <a:r>
-              <a:rPr lang="ko-KR" sz="3000" b="1">
-                <a:latin typeface="맑은 고딕" charset="0"/>
-                <a:ea typeface="맑은 고딕" charset="0"/>
-              </a:rPr>
-              <a:t> 번째 튜토리얼</a:t>
-            </a:r>
-            <a:r>
-              <a:rPr sz="3000" b="1">
-                <a:latin typeface="맑은 고딕" charset="0"/>
-                <a:ea typeface="맑은 고딕" charset="0"/>
-              </a:rPr>
-              <a:t> </a:t>
-            </a:r>
-            <a:endParaRPr lang="ko-KR" altLang="en-US" sz="3000" b="1">
+            <a:pPr marL="0" indent="0" algn="l" latinLnBrk="0" hangingPunct="1">
+              <a:buFontTx/>
+              <a:buNone/>
+            </a:pPr>
+            <a:endParaRPr lang="ko-KR" altLang="en-US" sz="1800">
               <a:latin typeface="맑은 고딕" charset="0"/>
               <a:ea typeface="맑은 고딕" charset="0"/>
             </a:endParaRPr>
@@ -12391,16 +11264,16 @@
       </p:sp>
       <p:sp>
         <p:nvSpPr>
-          <p:cNvPr id="36" name="텍스트 상자 59"/>
+          <p:cNvPr id="35" name="Rect 0"/>
           <p:cNvSpPr txBox="1">
             <a:spLocks/>
           </p:cNvSpPr>
           <p:nvPr/>
         </p:nvSpPr>
         <p:spPr>
-          <a:xfrm rot="0">
-            <a:off x="1228725" y="5160010"/>
-            <a:ext cx="4191635" cy="923925"/>
+          <a:xfrm>
+            <a:off x="4342765" y="467995"/>
+            <a:ext cx="3504565" cy="554990"/>
           </a:xfrm>
           <a:prstGeom prst="rect"/>
           <a:noFill/>
@@ -12415,55 +11288,32 @@
           </a:bodyPr>
           <a:lstStyle/>
           <a:p>
-            <a:pPr marL="0" indent="0" algn="l" latinLnBrk="0" hangingPunct="1">
-              <a:buFontTx/>
-              <a:buNone/>
-            </a:pPr>
-            <a:r>
-              <a:rPr sz="1800" b="1">
-                <a:solidFill>
-                  <a:srgbClr val="0611F2"/>
-                </a:solidFill>
-                <a:latin typeface="맑은 고딕" charset="0"/>
-                <a:ea typeface="맑은 고딕" charset="0"/>
-              </a:rPr>
-              <a:t>1</a:t>
-            </a:r>
-            <a:r>
-              <a:rPr sz="1800" b="1">
-                <a:solidFill>
-                  <a:srgbClr val="0611F2"/>
-                </a:solidFill>
-                <a:latin typeface="맑은 고딕" charset="0"/>
-                <a:ea typeface="맑은 고딕" charset="0"/>
-              </a:rPr>
-              <a:t>2</a:t>
-            </a:r>
-            <a:r>
-              <a:rPr sz="1800" b="1">
-                <a:solidFill>
-                  <a:srgbClr val="0611F2"/>
-                </a:solidFill>
-                <a:latin typeface="맑은 고딕" charset="0"/>
-                <a:ea typeface="맑은 고딕" charset="0"/>
-              </a:rPr>
-              <a:t>.</a:t>
-            </a:r>
-            <a:r>
-              <a:rPr sz="1800">
+            <a:pPr marL="0" indent="0" rtl="0" algn="l" defTabSz="914400" eaLnBrk="1" latinLnBrk="0" hangingPunct="1">
+              <a:buFontTx/>
+              <a:buNone/>
+            </a:pPr>
+            <a:r>
+              <a:rPr lang="ko-KR" sz="3000" b="1">
+                <a:latin typeface="맑은 고딕" charset="0"/>
+                <a:ea typeface="맑은 고딕" charset="0"/>
+              </a:rPr>
+              <a:t>여덟</a:t>
+            </a:r>
+            <a:r>
+              <a:rPr lang="ko-KR" sz="3000" b="1">
+                <a:latin typeface="맑은 고딕" charset="0"/>
+                <a:ea typeface="맑은 고딕" charset="0"/>
+              </a:rPr>
+              <a:t> 번째 튜토리얼</a:t>
+            </a:r>
+            <a:r>
+              <a:rPr sz="3000" b="1">
                 <a:latin typeface="맑은 고딕" charset="0"/>
                 <a:ea typeface="맑은 고딕" charset="0"/>
               </a:rPr>
               <a:t> </a:t>
             </a:r>
-            <a:r>
-              <a:rPr lang="ko-KR" sz="1800">
-                <a:latin typeface="맑은 고딕" charset="0"/>
-                <a:ea typeface="맑은 고딕" charset="0"/>
-              </a:rPr>
-              <a:t>그리고 Scroll Rect 옵션에 수직으로 이동만 하므로 Horizontal을 비활성화합니다.</a:t>
-            </a:r>
-            <a:endParaRPr lang="ko-KR" altLang="en-US" sz="1800">
+            <a:endParaRPr lang="ko-KR" altLang="en-US" sz="3000" b="1">
               <a:latin typeface="맑은 고딕" charset="0"/>
               <a:ea typeface="맑은 고딕" charset="0"/>
             </a:endParaRPr>
@@ -12472,17 +11322,17 @@
       </p:sp>
       <p:pic>
         <p:nvPicPr>
-          <p:cNvPr id="37" name="그림 60" descr="C:/Users/Admin1/AppData/Roaming/PolarisOffice/ETemp/21612_20234488/fImage251202414827.png"/>
+          <p:cNvPr id="36" name="그림 67"/>
           <p:cNvPicPr>
             <a:picLocks noChangeAspect="1"/>
           </p:cNvPicPr>
           <p:nvPr/>
         </p:nvPicPr>
         <p:blipFill rotWithShape="1">
-          <a:blip r:embed="rId5" cstate="hqprint">
+          <a:blip r:embed="rId2" cstate="print">
             <a:extLst>
               <a:ext uri="{28A0092B-C50C-407E-A947-70E740481C1C}">
-                <a14:useLocalDpi xmlns:a14="http://schemas.microsoft.com/office/drawing/2010/main"/>
+                <a14:useLocalDpi xmlns:a14="http://schemas.microsoft.com/office/drawing/2010/main" val="0"/>
               </a:ext>
             </a:extLst>
           </a:blip>
@@ -12492,121 +11342,28 @@
         </p:blipFill>
         <p:spPr>
           <a:xfrm rot="0">
-            <a:off x="1174115" y="1504950"/>
-            <a:ext cx="4198620" cy="3486785"/>
-          </a:xfrm>
-          <a:prstGeom prst="rect"/>
-          <a:noFill/>
+            <a:off x="3000375" y="1537970"/>
+            <a:ext cx="2381885" cy="1301115"/>
+          </a:xfrm>
+          <a:prstGeom prst="roundRect"/>
+          <a:solidFill>
+            <a:srgbClr val="EDEDED"/>
+          </a:solidFill>
         </p:spPr>
       </p:pic>
-      <p:sp>
-        <p:nvSpPr>
-          <p:cNvPr id="38" name="텍스트 상자 64"/>
-          <p:cNvSpPr txBox="1">
-            <a:spLocks/>
-          </p:cNvSpPr>
-          <p:nvPr/>
-        </p:nvSpPr>
-        <p:spPr>
-          <a:xfrm rot="0">
-            <a:off x="6798310" y="5496560"/>
-            <a:ext cx="4079875" cy="647065"/>
-          </a:xfrm>
-          <a:prstGeom prst="rect"/>
-          <a:noFill/>
-          <a:ln w="0">
-            <a:noFill/>
-            <a:prstDash/>
-          </a:ln>
-        </p:spPr>
-        <p:txBody>
-          <a:bodyPr wrap="square" lIns="89535" tIns="46355" rIns="89535" bIns="46355" numCol="1" vert="horz" anchor="t">
-            <a:spAutoFit/>
-          </a:bodyPr>
-          <a:lstStyle/>
-          <a:p>
-            <a:pPr marL="0" indent="0" algn="l" latinLnBrk="0" hangingPunct="1">
-              <a:buFontTx/>
-              <a:buNone/>
-            </a:pPr>
-            <a:r>
-              <a:rPr sz="1800" b="1">
-                <a:solidFill>
-                  <a:srgbClr val="0611F2"/>
-                </a:solidFill>
-                <a:latin typeface="맑은 고딕" charset="0"/>
-                <a:ea typeface="맑은 고딕" charset="0"/>
-              </a:rPr>
-              <a:t>1</a:t>
-            </a:r>
-            <a:r>
-              <a:rPr sz="1800" b="1">
-                <a:solidFill>
-                  <a:srgbClr val="0611F2"/>
-                </a:solidFill>
-                <a:latin typeface="맑은 고딕" charset="0"/>
-                <a:ea typeface="맑은 고딕" charset="0"/>
-              </a:rPr>
-              <a:t>3</a:t>
-            </a:r>
-            <a:r>
-              <a:rPr sz="1800" b="1">
-                <a:solidFill>
-                  <a:srgbClr val="0611F2"/>
-                </a:solidFill>
-                <a:latin typeface="맑은 고딕" charset="0"/>
-                <a:ea typeface="맑은 고딕" charset="0"/>
-              </a:rPr>
-              <a:t>.</a:t>
-            </a:r>
-            <a:r>
-              <a:rPr sz="1800">
-                <a:latin typeface="맑은 고딕" charset="0"/>
-                <a:ea typeface="맑은 고딕" charset="0"/>
-              </a:rPr>
-              <a:t> </a:t>
-            </a:r>
-            <a:r>
-              <a:rPr lang="ko-KR" sz="1800">
-                <a:latin typeface="맑은 고딕" charset="0"/>
-                <a:ea typeface="맑은 고딕" charset="0"/>
-              </a:rPr>
-              <a:t>마지막으로 Chatting Manager에</a:t>
-            </a:r>
-            <a:r>
-              <a:rPr lang="ko-KR" sz="1800">
-                <a:latin typeface="맑은 고딕" charset="0"/>
-                <a:ea typeface="맑은 고딕" charset="0"/>
-              </a:rPr>
-              <a:t> Photon View 컴포넌트를</a:t>
-            </a:r>
-            <a:r>
-              <a:rPr lang="ko-KR" sz="1800">
-                <a:latin typeface="맑은 고딕" charset="0"/>
-                <a:ea typeface="맑은 고딕" charset="0"/>
-              </a:rPr>
-              <a:t> 추가합니다.</a:t>
-            </a:r>
-            <a:endParaRPr lang="ko-KR" altLang="en-US" sz="1800">
-              <a:latin typeface="맑은 고딕" charset="0"/>
-              <a:ea typeface="맑은 고딕" charset="0"/>
-            </a:endParaRPr>
-          </a:p>
-        </p:txBody>
-      </p:sp>
       <p:pic>
         <p:nvPicPr>
-          <p:cNvPr id="39" name="그림 65" descr="C:/Users/Admin1/AppData/Roaming/PolarisOffice/ETemp/21612_20234488/fImage8792234491.png"/>
+          <p:cNvPr id="37" name="그림 70"/>
           <p:cNvPicPr>
             <a:picLocks noChangeAspect="1"/>
           </p:cNvPicPr>
           <p:nvPr/>
         </p:nvPicPr>
         <p:blipFill rotWithShape="1">
-          <a:blip r:embed="rId2" cstate="hqprint">
+          <a:blip r:embed="rId3" cstate="print">
             <a:extLst>
               <a:ext uri="{28A0092B-C50C-407E-A947-70E740481C1C}">
-                <a14:useLocalDpi xmlns:a14="http://schemas.microsoft.com/office/drawing/2010/main"/>
+                <a14:useLocalDpi xmlns:a14="http://schemas.microsoft.com/office/drawing/2010/main" val="0"/>
               </a:ext>
             </a:extLst>
           </a:blip>
@@ -12616,8 +11373,8 @@
         </p:blipFill>
         <p:spPr>
           <a:xfrm rot="0">
-            <a:off x="9153525" y="2095500"/>
-            <a:ext cx="1721485" cy="2677160"/>
+            <a:off x="1466850" y="1537970"/>
+            <a:ext cx="1315085" cy="1301115"/>
           </a:xfrm>
           <a:prstGeom prst="roundRect"/>
           <a:solidFill>
@@ -12625,9 +11382,390 @@
           </a:solidFill>
         </p:spPr>
       </p:pic>
+      <p:sp>
+        <p:nvSpPr>
+          <p:cNvPr id="38" name="텍스트 상자 73"/>
+          <p:cNvSpPr txBox="1">
+            <a:spLocks/>
+          </p:cNvSpPr>
+          <p:nvPr/>
+        </p:nvSpPr>
+        <p:spPr>
+          <a:xfrm rot="0">
+            <a:off x="1466850" y="2969260"/>
+            <a:ext cx="3915410" cy="923925"/>
+          </a:xfrm>
+          <a:prstGeom prst="rect"/>
+          <a:noFill/>
+          <a:ln w="0">
+            <a:noFill/>
+            <a:prstDash/>
+          </a:ln>
+        </p:spPr>
+        <p:txBody>
+          <a:bodyPr wrap="square" lIns="89535" tIns="46355" rIns="89535" bIns="46355" numCol="1" vert="horz" anchor="t">
+            <a:spAutoFit/>
+          </a:bodyPr>
+          <a:lstStyle/>
+          <a:p>
+            <a:pPr marL="0" indent="0" algn="l" latinLnBrk="0" hangingPunct="1">
+              <a:buFontTx/>
+              <a:buNone/>
+            </a:pPr>
+            <a:r>
+              <a:rPr sz="1800" b="1">
+                <a:solidFill>
+                  <a:srgbClr val="0611F2"/>
+                </a:solidFill>
+                <a:latin typeface="맑은 고딕" charset="0"/>
+                <a:ea typeface="맑은 고딕" charset="0"/>
+              </a:rPr>
+              <a:t>1</a:t>
+            </a:r>
+            <a:r>
+              <a:rPr lang="ko-KR" sz="1800" b="1">
+                <a:solidFill>
+                  <a:srgbClr val="0611F2"/>
+                </a:solidFill>
+                <a:latin typeface="맑은 고딕" charset="0"/>
+                <a:ea typeface="맑은 고딕" charset="0"/>
+              </a:rPr>
+              <a:t>4</a:t>
+            </a:r>
+            <a:r>
+              <a:rPr sz="1800" b="1">
+                <a:solidFill>
+                  <a:srgbClr val="0611F2"/>
+                </a:solidFill>
+                <a:latin typeface="맑은 고딕" charset="0"/>
+                <a:ea typeface="맑은 고딕" charset="0"/>
+              </a:rPr>
+              <a:t>.</a:t>
+            </a:r>
+            <a:r>
+              <a:rPr sz="1800">
+                <a:latin typeface="맑은 고딕" charset="0"/>
+                <a:ea typeface="맑은 고딕" charset="0"/>
+              </a:rPr>
+              <a:t> </a:t>
+            </a:r>
+            <a:r>
+              <a:rPr lang="ko-KR" sz="1800">
+                <a:latin typeface="맑은 고딕" charset="0"/>
+                <a:ea typeface="맑은 고딕" charset="0"/>
+              </a:rPr>
+              <a:t>그런 다음 Content 오브젝트를 선택하고 Content Size Fitter 컴포넌트를 추가합니다.</a:t>
+            </a:r>
+            <a:endParaRPr lang="ko-KR" altLang="en-US" sz="1800">
+              <a:latin typeface="맑은 고딕" charset="0"/>
+              <a:ea typeface="맑은 고딕" charset="0"/>
+            </a:endParaRPr>
+          </a:p>
+        </p:txBody>
+      </p:sp>
       <p:pic>
         <p:nvPicPr>
-          <p:cNvPr id="40" name="그림 66" descr="C:/Users/Admin1/AppData/Roaming/PolarisOffice/ETemp/21612_20234488/fImage94852938145.png"/>
+          <p:cNvPr id="39" name="그림 74"/>
+          <p:cNvPicPr>
+            <a:picLocks noChangeAspect="1"/>
+          </p:cNvPicPr>
+          <p:nvPr/>
+        </p:nvPicPr>
+        <p:blipFill rotWithShape="1">
+          <a:blip r:embed="rId4" cstate="print">
+            <a:extLst>
+              <a:ext uri="{28A0092B-C50C-407E-A947-70E740481C1C}">
+                <a14:useLocalDpi xmlns:a14="http://schemas.microsoft.com/office/drawing/2010/main" val="0"/>
+              </a:ext>
+            </a:extLst>
+          </a:blip>
+          <a:stretch>
+            <a:fillRect/>
+          </a:stretch>
+        </p:blipFill>
+        <p:spPr>
+          <a:xfrm rot="0">
+            <a:off x="6810375" y="1514475"/>
+            <a:ext cx="4161790" cy="1267460"/>
+          </a:xfrm>
+          <a:prstGeom prst="roundRect"/>
+          <a:solidFill>
+            <a:srgbClr val="EDEDED"/>
+          </a:solidFill>
+        </p:spPr>
+      </p:pic>
+      <p:pic>
+        <p:nvPicPr>
+          <p:cNvPr id="40" name="그림 77"/>
+          <p:cNvPicPr>
+            <a:picLocks noChangeAspect="1"/>
+          </p:cNvPicPr>
+          <p:nvPr/>
+        </p:nvPicPr>
+        <p:blipFill rotWithShape="1">
+          <a:blip r:embed="rId5" cstate="print">
+            <a:extLst>
+              <a:ext uri="{28A0092B-C50C-407E-A947-70E740481C1C}">
+                <a14:useLocalDpi xmlns:a14="http://schemas.microsoft.com/office/drawing/2010/main" val="0"/>
+              </a:ext>
+            </a:extLst>
+          </a:blip>
+          <a:stretch>
+            <a:fillRect/>
+          </a:stretch>
+        </p:blipFill>
+        <p:spPr>
+          <a:xfrm rot="0">
+            <a:off x="6805295" y="2971800"/>
+            <a:ext cx="1501140" cy="1331595"/>
+          </a:xfrm>
+          <a:prstGeom prst="roundRect"/>
+          <a:solidFill>
+            <a:srgbClr val="EDEDED"/>
+          </a:solidFill>
+        </p:spPr>
+      </p:pic>
+      <p:pic>
+        <p:nvPicPr>
+          <p:cNvPr id="41" name="그림 80"/>
+          <p:cNvPicPr>
+            <a:picLocks noChangeAspect="1"/>
+          </p:cNvPicPr>
+          <p:nvPr/>
+        </p:nvPicPr>
+        <p:blipFill rotWithShape="1">
+          <a:blip r:embed="rId6" cstate="print">
+            <a:extLst>
+              <a:ext uri="{28A0092B-C50C-407E-A947-70E740481C1C}">
+                <a14:useLocalDpi xmlns:a14="http://schemas.microsoft.com/office/drawing/2010/main" val="0"/>
+              </a:ext>
+            </a:extLst>
+          </a:blip>
+          <a:stretch>
+            <a:fillRect/>
+          </a:stretch>
+        </p:blipFill>
+        <p:spPr>
+          <a:xfrm rot="0">
+            <a:off x="8452485" y="2973705"/>
+            <a:ext cx="2553970" cy="1330325"/>
+          </a:xfrm>
+          <a:prstGeom prst="roundRect"/>
+          <a:solidFill>
+            <a:srgbClr val="EDEDED"/>
+          </a:solidFill>
+        </p:spPr>
+      </p:pic>
+      <p:cxnSp>
+        <p:nvCxnSpPr>
+          <p:cNvPr id="42" name="도형 81"/>
+          <p:cNvCxnSpPr/>
+          <p:nvPr/>
+        </p:nvCxnSpPr>
+        <p:spPr>
+          <a:xfrm rot="0" flipV="1">
+            <a:off x="7888605" y="2597785"/>
+            <a:ext cx="2996565" cy="1256030"/>
+          </a:xfrm>
+          <a:prstGeom prst="straightConnector1"/>
+          <a:ln w="6350" cap="flat" cmpd="sng">
+            <a:prstDash/>
+            <a:headEnd type="none" w="med" len="med"/>
+            <a:tailEnd type="triangle" w="med" len="med"/>
+          </a:ln>
+        </p:spPr>
+        <p:style>
+          <a:lnRef idx="1">
+            <a:schemeClr val="accent1"/>
+          </a:lnRef>
+          <a:fillRef idx="0">
+            <a:schemeClr val="accent1"/>
+          </a:fillRef>
+          <a:effectRef idx="0">
+            <a:schemeClr val="accent1"/>
+          </a:effectRef>
+          <a:fontRef idx="minor">
+            <a:schemeClr val="tx1"/>
+          </a:fontRef>
+        </p:style>
+      </p:cxnSp>
+      <p:cxnSp>
+        <p:nvCxnSpPr>
+          <p:cNvPr id="43" name="도형 82"/>
+          <p:cNvCxnSpPr/>
+          <p:nvPr/>
+        </p:nvCxnSpPr>
+        <p:spPr>
+          <a:xfrm rot="0" flipV="1">
+            <a:off x="7741285" y="2130425"/>
+            <a:ext cx="3152775" cy="1922780"/>
+          </a:xfrm>
+          <a:prstGeom prst="straightConnector1"/>
+          <a:ln w="6350" cap="flat" cmpd="sng">
+            <a:prstDash/>
+            <a:headEnd type="none" w="med" len="med"/>
+            <a:tailEnd type="triangle" w="med" len="med"/>
+          </a:ln>
+        </p:spPr>
+        <p:style>
+          <a:lnRef idx="1">
+            <a:schemeClr val="accent1"/>
+          </a:lnRef>
+          <a:fillRef idx="0">
+            <a:schemeClr val="accent1"/>
+          </a:fillRef>
+          <a:effectRef idx="0">
+            <a:schemeClr val="accent1"/>
+          </a:effectRef>
+          <a:fontRef idx="minor">
+            <a:schemeClr val="tx1"/>
+          </a:fontRef>
+        </p:style>
+      </p:cxnSp>
+      <p:cxnSp>
+        <p:nvCxnSpPr>
+          <p:cNvPr id="44" name="도형 83"/>
+          <p:cNvCxnSpPr/>
+          <p:nvPr/>
+        </p:nvCxnSpPr>
+        <p:spPr>
+          <a:xfrm rot="0" flipV="1">
+            <a:off x="10045065" y="2364105"/>
+            <a:ext cx="840105" cy="987425"/>
+          </a:xfrm>
+          <a:prstGeom prst="straightConnector1"/>
+          <a:ln w="6350" cap="flat" cmpd="sng">
+            <a:prstDash/>
+            <a:headEnd type="none" w="med" len="med"/>
+            <a:tailEnd type="triangle" w="med" len="med"/>
+          </a:ln>
+        </p:spPr>
+        <p:style>
+          <a:lnRef idx="1">
+            <a:schemeClr val="accent1"/>
+          </a:lnRef>
+          <a:fillRef idx="0">
+            <a:schemeClr val="accent1"/>
+          </a:fillRef>
+          <a:effectRef idx="0">
+            <a:schemeClr val="accent1"/>
+          </a:effectRef>
+          <a:fontRef idx="minor">
+            <a:schemeClr val="tx1"/>
+          </a:fontRef>
+        </p:style>
+      </p:cxnSp>
+      <p:sp>
+        <p:nvSpPr>
+          <p:cNvPr id="45" name="텍스트 상자 84"/>
+          <p:cNvSpPr txBox="1">
+            <a:spLocks/>
+          </p:cNvSpPr>
+          <p:nvPr/>
+        </p:nvSpPr>
+        <p:spPr>
+          <a:xfrm rot="0">
+            <a:off x="6794500" y="4425950"/>
+            <a:ext cx="4185920" cy="1754505"/>
+          </a:xfrm>
+          <a:prstGeom prst="rect"/>
+          <a:noFill/>
+          <a:ln w="0">
+            <a:noFill/>
+            <a:prstDash/>
+          </a:ln>
+        </p:spPr>
+        <p:txBody>
+          <a:bodyPr wrap="square" lIns="89535" tIns="46355" rIns="89535" bIns="46355" numCol="1" vert="horz" anchor="t">
+            <a:spAutoFit/>
+          </a:bodyPr>
+          <a:lstStyle/>
+          <a:p>
+            <a:pPr marL="0" indent="0" algn="l" latinLnBrk="0" hangingPunct="1">
+              <a:buFontTx/>
+              <a:buNone/>
+            </a:pPr>
+            <a:r>
+              <a:rPr sz="1800" b="1">
+                <a:solidFill>
+                  <a:srgbClr val="0611F2"/>
+                </a:solidFill>
+                <a:latin typeface="맑은 고딕" charset="0"/>
+                <a:ea typeface="맑은 고딕" charset="0"/>
+              </a:rPr>
+              <a:t>1</a:t>
+            </a:r>
+            <a:r>
+              <a:rPr lang="ko-KR" sz="1800" b="1">
+                <a:solidFill>
+                  <a:srgbClr val="0611F2"/>
+                </a:solidFill>
+                <a:latin typeface="맑은 고딕" charset="0"/>
+                <a:ea typeface="맑은 고딕" charset="0"/>
+              </a:rPr>
+              <a:t>6</a:t>
+            </a:r>
+            <a:r>
+              <a:rPr sz="1800" b="1">
+                <a:solidFill>
+                  <a:srgbClr val="0611F2"/>
+                </a:solidFill>
+                <a:latin typeface="맑은 고딕" charset="0"/>
+                <a:ea typeface="맑은 고딕" charset="0"/>
+              </a:rPr>
+              <a:t>.</a:t>
+            </a:r>
+            <a:r>
+              <a:rPr sz="1800">
+                <a:latin typeface="맑은 고딕" charset="0"/>
+                <a:ea typeface="맑은 고딕" charset="0"/>
+              </a:rPr>
+              <a:t> </a:t>
+            </a:r>
+            <a:r>
+              <a:rPr lang="ko-KR" sz="1800">
+                <a:latin typeface="맑은 고딕" charset="0"/>
+                <a:ea typeface="맑은 고딕" charset="0"/>
+              </a:rPr>
+              <a:t>이제 Chatting Manager 오브젝트를 선택합니다.</a:t>
+            </a:r>
+            <a:endParaRPr lang="ko-KR" altLang="en-US" sz="1800">
+              <a:latin typeface="맑은 고딕" charset="0"/>
+              <a:ea typeface="맑은 고딕" charset="0"/>
+            </a:endParaRPr>
+          </a:p>
+          <a:p>
+            <a:pPr marL="0" indent="0" algn="l" latinLnBrk="0" hangingPunct="1">
+              <a:buFontTx/>
+              <a:buNone/>
+            </a:pPr>
+            <a:endParaRPr lang="ko-KR" altLang="en-US" sz="1800">
+              <a:latin typeface="맑은 고딕" charset="0"/>
+              <a:ea typeface="맑은 고딕" charset="0"/>
+            </a:endParaRPr>
+          </a:p>
+          <a:p>
+            <a:pPr marL="0" indent="0" algn="l" latinLnBrk="0" hangingPunct="1">
+              <a:buFontTx/>
+              <a:buNone/>
+            </a:pPr>
+            <a:r>
+              <a:rPr lang="ko-KR" sz="1800">
+                <a:latin typeface="맑은 고딕" charset="0"/>
+                <a:ea typeface="맑은 고딕" charset="0"/>
+              </a:rPr>
+              <a:t>그다음 Chat Manager 스크립트에서 Input과 Chat Prefab 그리고 Chat Content를 넣어줍니다.</a:t>
+            </a:r>
+            <a:endParaRPr lang="ko-KR" altLang="en-US" sz="1800">
+              <a:latin typeface="맑은 고딕" charset="0"/>
+              <a:ea typeface="맑은 고딕" charset="0"/>
+            </a:endParaRPr>
+          </a:p>
+        </p:txBody>
+      </p:sp>
+      <p:pic>
+        <p:nvPicPr>
+          <p:cNvPr id="46" name="그림 85"/>
           <p:cNvPicPr>
             <a:picLocks noChangeAspect="1"/>
           </p:cNvPicPr>
@@ -12647,8 +11785,8 @@
         </p:blipFill>
         <p:spPr>
           <a:xfrm rot="0">
-            <a:off x="6810375" y="1495425"/>
-            <a:ext cx="2200910" cy="3791585"/>
+            <a:off x="1454785" y="4017645"/>
+            <a:ext cx="3931920" cy="1334135"/>
           </a:xfrm>
           <a:prstGeom prst="roundRect"/>
           <a:solidFill>
@@ -12656,6 +11794,87 @@
           </a:solidFill>
         </p:spPr>
       </p:pic>
+      <p:sp>
+        <p:nvSpPr>
+          <p:cNvPr id="47" name="텍스트 상자 88"/>
+          <p:cNvSpPr txBox="1">
+            <a:spLocks/>
+          </p:cNvSpPr>
+          <p:nvPr/>
+        </p:nvSpPr>
+        <p:spPr>
+          <a:xfrm rot="0">
+            <a:off x="1451610" y="5508625"/>
+            <a:ext cx="3926205" cy="647065"/>
+          </a:xfrm>
+          <a:prstGeom prst="rect"/>
+          <a:noFill/>
+          <a:ln w="0">
+            <a:noFill/>
+            <a:prstDash/>
+          </a:ln>
+        </p:spPr>
+        <p:txBody>
+          <a:bodyPr wrap="square" lIns="89535" tIns="46355" rIns="89535" bIns="46355" numCol="1" vert="horz" anchor="t">
+            <a:spAutoFit/>
+          </a:bodyPr>
+          <a:lstStyle/>
+          <a:p>
+            <a:pPr marL="0" indent="0" algn="l" latinLnBrk="0" hangingPunct="1">
+              <a:buFontTx/>
+              <a:buNone/>
+            </a:pPr>
+            <a:r>
+              <a:rPr sz="1800" b="1">
+                <a:solidFill>
+                  <a:srgbClr val="0611F2"/>
+                </a:solidFill>
+                <a:latin typeface="맑은 고딕" charset="0"/>
+                <a:ea typeface="맑은 고딕" charset="0"/>
+              </a:rPr>
+              <a:t>1</a:t>
+            </a:r>
+            <a:r>
+              <a:rPr lang="ko-KR" sz="1800" b="1">
+                <a:solidFill>
+                  <a:srgbClr val="0611F2"/>
+                </a:solidFill>
+                <a:latin typeface="맑은 고딕" charset="0"/>
+                <a:ea typeface="맑은 고딕" charset="0"/>
+              </a:rPr>
+              <a:t>5</a:t>
+            </a:r>
+            <a:r>
+              <a:rPr sz="1800" b="1">
+                <a:solidFill>
+                  <a:srgbClr val="0611F2"/>
+                </a:solidFill>
+                <a:latin typeface="맑은 고딕" charset="0"/>
+                <a:ea typeface="맑은 고딕" charset="0"/>
+              </a:rPr>
+              <a:t>.</a:t>
+            </a:r>
+            <a:r>
+              <a:rPr sz="1800">
+                <a:latin typeface="맑은 고딕" charset="0"/>
+                <a:ea typeface="맑은 고딕" charset="0"/>
+              </a:rPr>
+              <a:t> </a:t>
+            </a:r>
+            <a:r>
+              <a:rPr lang="ko-KR" sz="1800">
+                <a:latin typeface="맑은 고딕" charset="0"/>
+                <a:ea typeface="맑은 고딕" charset="0"/>
+              </a:rPr>
+              <a:t>그다음으로 InputField의 위치와 앵커를 조정합니다.</a:t>
+            </a:r>
+            <a:endParaRPr lang="ko-KR" altLang="en-US" sz="1800">
+              <a:latin typeface="맑은 고딕" charset="0"/>
+              <a:ea typeface="맑은 고딕" charset="0"/>
+            </a:endParaRPr>
+          </a:p>
+        </p:txBody>
+      </p:sp>
     </p:spTree>
   </p:cSld>
   <p:clrMapOvr>

</xml_diff>

<commit_message>
Implementation of Playfab leaderboard system
- Set to load leaderboard data from
  Playfab database

- Add and deploy user interfaces

- Add and delete resource data
</commit_message>
<xml_diff>
--- a/Assets/Class/Photon Server/PPT Data/Photon RPC.pptx
+++ b/Assets/Class/Photon Server/PPT Data/Photon RPC.pptx
@@ -2,7 +2,7 @@
 <file path=ppt/presentation.xml><?xml version="1.0" encoding="utf-8"?>
 <p:presentation xmlns:a="http://schemas.openxmlformats.org/drawingml/2006/main" xmlns:r="http://schemas.openxmlformats.org/officeDocument/2006/relationships" xmlns:p="http://schemas.openxmlformats.org/presentationml/2006/main" xmlns:p14="http://schemas.microsoft.com/office/powerpoint/2010/main" saveSubsetFonts="1" firstSlideNum="0">
   <p:sldMasterIdLst>
-    <p:sldMasterId id="2147486862" r:id="rId12"/>
+    <p:sldMasterId id="2147486866" r:id="rId12"/>
   </p:sldMasterIdLst>
   <p:notesMasterIdLst>
     <p:notesMasterId r:id="rId14"/>
@@ -23,7 +23,6 @@
     <p:sldId id="326" r:id="rId28"/>
     <p:sldId id="327" r:id="rId29"/>
     <p:sldId id="329" r:id="rId30"/>
-    <p:sldId id="328" r:id="rId31"/>
   </p:sldIdLst>
   <p:sldSz cx="12192000" cy="6858000"/>
   <p:notesSz cx="6858000" cy="9144000"/>
@@ -1476,148 +1475,6 @@
 </p:notes>
 </file>
 
-<file path=ppt/notesSlides/notesSlide16.xml><?xml version="1.0" encoding="utf-8"?>
-<p:notes xmlns:a="http://schemas.openxmlformats.org/drawingml/2006/main" xmlns:r="http://schemas.openxmlformats.org/officeDocument/2006/relationships" xmlns:p="http://schemas.openxmlformats.org/presentationml/2006/main">
-  <p:cSld>
-    <p:spTree>
-      <p:nvGrpSpPr>
-        <p:cNvPr id="1" name=""/>
-        <p:cNvGrpSpPr/>
-        <p:nvPr/>
-      </p:nvGrpSpPr>
-      <p:grpSpPr>
-        <a:xfrm>
-          <a:off x="0" y="0"/>
-          <a:ext cx="0" cy="0"/>
-          <a:chOff x="0" y="0"/>
-          <a:chExt cx="0" cy="0"/>
-        </a:xfrm>
-      </p:grpSpPr>
-      <p:sp>
-        <p:nvSpPr>
-          <p:cNvPr id="2" name="슬라이드 이미지 개체 틀 3"/>
-          <p:cNvSpPr>
-            <a:spLocks noChangeAspect="1"/>
-          </p:cNvSpPr>
-          <p:nvPr>
-            <p:ph type="sldImg" idx="2"/>
-          </p:nvPr>
-        </p:nvSpPr>
-        <p:spPr>
-          <a:xfrm rot="0">
-            <a:off x="685800" y="1143000"/>
-            <a:ext cx="5494655" cy="3094355"/>
-          </a:xfrm>
-          <a:prstGeom prst="rect"/>
-          <a:noFill/>
-          <a:ln w="12700" cap="flat" cmpd="sng">
-            <a:solidFill>
-              <a:srgbClr val="000000">
-                <a:alpha val="100000"/>
-              </a:srgbClr>
-            </a:solidFill>
-            <a:prstDash val="solid"/>
-          </a:ln>
-        </p:spPr>
-        <p:txBody>
-          <a:bodyPr wrap="square" lIns="91440" tIns="45720" rIns="91440" bIns="45720" numCol="1" vert="horz" anchor="ctr">
-            <a:noAutofit/>
-          </a:bodyPr>
-          <a:lstStyle/>
-          <a:p>
-            <a:pPr marL="0" indent="0" latinLnBrk="0">
-              <a:buFontTx/>
-              <a:buNone/>
-            </a:pPr>
-          </a:p>
-        </p:txBody>
-      </p:sp>
-      <p:sp>
-        <p:nvSpPr>
-          <p:cNvPr id="3" name="슬라이드 노트 개체 틀 4"/>
-          <p:cNvSpPr txBox="1">
-            <a:spLocks/>
-          </p:cNvSpPr>
-          <p:nvPr>
-            <p:ph type="body" idx="3"/>
-          </p:nvPr>
-        </p:nvSpPr>
-        <p:spPr>
-          <a:xfrm rot="0">
-            <a:off x="685800" y="4400550"/>
-            <a:ext cx="5494655" cy="3608705"/>
-          </a:xfrm>
-          <a:prstGeom prst="rect"/>
-        </p:spPr>
-        <p:txBody>
-          <a:bodyPr wrap="square" lIns="91440" tIns="45720" rIns="91440" bIns="45720" numCol="1" vert="horz" anchor="t">
-            <a:noAutofit/>
-          </a:bodyPr>
-          <a:lstStyle/>
-          <a:p>
-            <a:pPr marL="0" indent="0" latinLnBrk="0">
-              <a:buFontTx/>
-              <a:buNone/>
-            </a:pPr>
-          </a:p>
-        </p:txBody>
-      </p:sp>
-      <p:sp>
-        <p:nvSpPr>
-          <p:cNvPr id="4" name="슬라이드 번호 개체 틀 6"/>
-          <p:cNvSpPr txBox="1">
-            <a:spLocks/>
-          </p:cNvSpPr>
-          <p:nvPr>
-            <p:ph type="sldNum" idx="5"/>
-          </p:nvPr>
-        </p:nvSpPr>
-        <p:spPr>
-          <a:xfrm rot="0">
-            <a:off x="3884930" y="8685530"/>
-            <a:ext cx="2980055" cy="466725"/>
-          </a:xfrm>
-          <a:prstGeom prst="rect"/>
-        </p:spPr>
-        <p:txBody>
-          <a:bodyPr wrap="square" lIns="91440" tIns="45720" rIns="91440" bIns="45720" numCol="1" vert="horz" anchor="b">
-            <a:noAutofit/>
-          </a:bodyPr>
-          <a:lstStyle>
-            <a:lvl1pPr marL="0" indent="0" algn="r" latinLnBrk="0">
-              <a:buFontTx/>
-              <a:buNone/>
-              <a:defRPr lang="en-GB" altLang="en-US" sz="1200"/>
-            </a:lvl1pPr>
-          </a:lstStyle>
-          <a:p>
-            <a:pPr marL="0" indent="0" latinLnBrk="0">
-              <a:buFontTx/>
-              <a:buNone/>
-            </a:pPr>
-            <a:fld id="{B9320F77-B9A0-41C5-862A-B4B631284C64}" type="slidenum">
-              <a:rPr lang="ko-KR" altLang="en-US"/>
-              <a:t>‹#›</a:t>
-            </a:fld>
-          </a:p>
-        </p:txBody>
-      </p:sp>
-    </p:spTree>
-  </p:cSld>
-  <p:clrMapOvr>
-    <a:masterClrMapping/>
-  </p:clrMapOvr>
-  <mc:AlternateContent xmlns:mc="http://schemas.openxmlformats.org/markup-compatibility/2006">
-    <mc:Choice xmlns:p14="http://schemas.microsoft.com/office/powerpoint/2010/main" Requires="p14">
-      <p:transition spd="slow" p14:dur="0"/>
-    </mc:Choice>
-    <mc:Fallback>
-      <p:transition spd="slow"/>
-    </mc:Fallback>
-  </mc:AlternateContent>
-</p:notes>
-</file>
-
 <file path=ppt/notesSlides/notesSlide2.xml><?xml version="1.0" encoding="utf-8"?>
 <p:notes xmlns:a="http://schemas.openxmlformats.org/drawingml/2006/main" xmlns:r="http://schemas.openxmlformats.org/officeDocument/2006/relationships" xmlns:p="http://schemas.openxmlformats.org/presentationml/2006/main">
   <p:cSld>
@@ -8358,7 +8215,7 @@
 </file>
 
 <file path=ppt/slides/slide10.xml><?xml version="1.0" encoding="utf-8"?>
-<p:sld xmlns:a="http://schemas.openxmlformats.org/drawingml/2006/main" xmlns:r="http://schemas.openxmlformats.org/officeDocument/2006/relationships" xmlns:p="http://schemas.openxmlformats.org/presentationml/2006/main">
+<p:sld xmlns:a="http://schemas.openxmlformats.org/drawingml/2006/main" xmlns:r="http://schemas.openxmlformats.org/officeDocument/2006/relationships" xmlns:p="http://schemas.openxmlformats.org/presentationml/2006/main" xmlns:p14="http://schemas.microsoft.com/office/powerpoint/2010/main">
   <p:cSld>
     <p:spTree>
       <p:nvGrpSpPr>
@@ -8771,7 +8628,7 @@
       </p:sp>
       <p:pic>
         <p:nvPicPr>
-          <p:cNvPr id="48" name="그림 2" descr="C:/Users/Admin1/AppData/Roaming/PolarisOffice/ETemp/8940_18798640/fImage191382596962.png"/>
+          <p:cNvPr id="48" name="그림 2"/>
           <p:cNvPicPr>
             <a:picLocks noChangeAspect="1"/>
           </p:cNvPicPr>
@@ -8802,7 +8659,7 @@
       </p:pic>
       <p:pic>
         <p:nvPicPr>
-          <p:cNvPr id="49" name="그림 39" descr="C:/Users/Admin1/AppData/Roaming/PolarisOffice/ETemp/8940_18798640/fImage128912794464.png"/>
+          <p:cNvPr id="49" name="그림 39"/>
           <p:cNvPicPr>
             <a:picLocks noChangeAspect="1"/>
           </p:cNvPicPr>
@@ -8833,7 +8690,7 @@
       </p:pic>
       <p:pic>
         <p:nvPicPr>
-          <p:cNvPr id="50" name="그림 43" descr="C:/Users/Admin1/AppData/Roaming/PolarisOffice/ETemp/8940_18798640/fImage30172825705.png"/>
+          <p:cNvPr id="50" name="그림 43"/>
           <p:cNvPicPr>
             <a:picLocks noChangeAspect="1"/>
           </p:cNvPicPr>
@@ -8864,7 +8721,7 @@
       </p:pic>
       <p:pic>
         <p:nvPicPr>
-          <p:cNvPr id="51" name="그림 44" descr="C:/Users/Admin1/AppData/Roaming/PolarisOffice/ETemp/8940_18798640/fImage55662838145.png"/>
+          <p:cNvPr id="51" name="그림 44"/>
           <p:cNvPicPr>
             <a:picLocks noChangeAspect="1"/>
           </p:cNvPicPr>
@@ -8895,7 +8752,7 @@
       </p:pic>
       <p:pic>
         <p:nvPicPr>
-          <p:cNvPr id="52" name="그림 45" descr="C:/Users/Admin1/AppData/Roaming/PolarisOffice/ETemp/8940_18798640/fImage94582843281.png"/>
+          <p:cNvPr id="52" name="그림 45"/>
           <p:cNvPicPr>
             <a:picLocks noChangeAspect="1"/>
           </p:cNvPicPr>
@@ -8981,7 +8838,7 @@
 </file>
 
 <file path=ppt/slides/slide11.xml><?xml version="1.0" encoding="utf-8"?>
-<p:sld xmlns:a="http://schemas.openxmlformats.org/drawingml/2006/main" xmlns:r="http://schemas.openxmlformats.org/officeDocument/2006/relationships" xmlns:p="http://schemas.openxmlformats.org/presentationml/2006/main">
+<p:sld xmlns:a="http://schemas.openxmlformats.org/drawingml/2006/main" xmlns:r="http://schemas.openxmlformats.org/officeDocument/2006/relationships" xmlns:p="http://schemas.openxmlformats.org/presentationml/2006/main" xmlns:p14="http://schemas.microsoft.com/office/powerpoint/2010/main">
   <p:cSld>
     <p:spTree>
       <p:nvGrpSpPr>
@@ -9353,7 +9210,7 @@
       </p:sp>
       <p:pic>
         <p:nvPicPr>
-          <p:cNvPr id="54" name="그림 49" descr="C:/Users/Admin1/AppData/Roaming/PolarisOffice/ETemp/8940_18798640/fImage58223006827.png"/>
+          <p:cNvPr id="54" name="그림 49"/>
           <p:cNvPicPr>
             <a:picLocks noChangeAspect="1"/>
           </p:cNvPicPr>
@@ -9384,7 +9241,7 @@
       </p:pic>
       <p:pic>
         <p:nvPicPr>
-          <p:cNvPr id="55" name="그림 52" descr="C:/Users/Admin1/AppData/Roaming/PolarisOffice/ETemp/8940_18798640/fImage114453019961.png"/>
+          <p:cNvPr id="55" name="그림 52"/>
           <p:cNvPicPr>
             <a:picLocks noChangeAspect="1"/>
           </p:cNvPicPr>
@@ -9524,7 +9381,7 @@
       </p:sp>
       <p:pic>
         <p:nvPicPr>
-          <p:cNvPr id="57" name="그림 56" descr="C:/Users/Admin1/AppData/Roaming/PolarisOffice/ETemp/8940_18798640/fImage16075303491.png"/>
+          <p:cNvPr id="57" name="그림 56"/>
           <p:cNvPicPr>
             <a:picLocks noChangeAspect="1"/>
           </p:cNvPicPr>
@@ -9555,7 +9412,7 @@
       </p:pic>
       <p:pic>
         <p:nvPicPr>
-          <p:cNvPr id="58" name="그림 59" descr="C:/Users/Admin1/AppData/Roaming/PolarisOffice/ETemp/8940_18798640/fImage195603042995.png"/>
+          <p:cNvPr id="58" name="그림 59"/>
           <p:cNvPicPr>
             <a:picLocks noChangeAspect="1"/>
           </p:cNvPicPr>
@@ -9641,7 +9498,7 @@
 </file>
 
 <file path=ppt/slides/slide12.xml><?xml version="1.0" encoding="utf-8"?>
-<p:sld xmlns:a="http://schemas.openxmlformats.org/drawingml/2006/main" xmlns:r="http://schemas.openxmlformats.org/officeDocument/2006/relationships" xmlns:p="http://schemas.openxmlformats.org/presentationml/2006/main">
+<p:sld xmlns:a="http://schemas.openxmlformats.org/drawingml/2006/main" xmlns:r="http://schemas.openxmlformats.org/officeDocument/2006/relationships" xmlns:p="http://schemas.openxmlformats.org/presentationml/2006/main" xmlns:p14="http://schemas.microsoft.com/office/powerpoint/2010/main">
   <p:cSld>
     <p:spTree>
       <p:nvGrpSpPr>
@@ -9923,7 +9780,7 @@
       </p:sp>
       <p:pic>
         <p:nvPicPr>
-          <p:cNvPr id="60" name="그림 63" descr="C:/Users/Admin1/AppData/Roaming/PolarisOffice/ETemp/8940_18798640/fImage330252115705.png"/>
+          <p:cNvPr id="60" name="그림 63"/>
           <p:cNvPicPr>
             <a:picLocks noChangeAspect="1"/>
           </p:cNvPicPr>
@@ -9954,7 +9811,7 @@
       </p:pic>
       <p:pic>
         <p:nvPicPr>
-          <p:cNvPr id="61" name="그림 64" descr="C:/Users/Admin1/AppData/Roaming/PolarisOffice/ETemp/8940_18798640/fImage121203211942.png"/>
+          <p:cNvPr id="61" name="그림 64"/>
           <p:cNvPicPr>
             <a:picLocks noChangeAspect="1"/>
           </p:cNvPicPr>
@@ -9985,7 +9842,7 @@
       </p:pic>
       <p:pic>
         <p:nvPicPr>
-          <p:cNvPr id="62" name="그림 67" descr="C:/Users/Admin1/AppData/Roaming/PolarisOffice/ETemp/8940_18798640/fImage22353224827.png"/>
+          <p:cNvPr id="62" name="그림 67"/>
           <p:cNvPicPr>
             <a:picLocks noChangeAspect="1"/>
           </p:cNvPicPr>
@@ -10052,7 +9909,7 @@
       </p:cxnSp>
       <p:pic>
         <p:nvPicPr>
-          <p:cNvPr id="64" name="그림 71" descr="C:/Users/Admin1/AppData/Roaming/PolarisOffice/ETemp/8940_18798640/fImage74723245436.png"/>
+          <p:cNvPr id="64" name="그림 71"/>
           <p:cNvPicPr>
             <a:picLocks noChangeAspect="1"/>
           </p:cNvPicPr>
@@ -10083,7 +9940,7 @@
       </p:pic>
       <p:pic>
         <p:nvPicPr>
-          <p:cNvPr id="65" name="그림 77" descr="C:/Users/Admin1/AppData/Roaming/PolarisOffice/ETemp/8940_18798640/fImage113133272391.png"/>
+          <p:cNvPr id="65" name="그림 77"/>
           <p:cNvPicPr>
             <a:picLocks noChangeAspect="1"/>
           </p:cNvPicPr>
@@ -10207,7 +10064,7 @@
 </file>
 
 <file path=ppt/slides/slide13.xml><?xml version="1.0" encoding="utf-8"?>
-<p:sld xmlns:a="http://schemas.openxmlformats.org/drawingml/2006/main" xmlns:r="http://schemas.openxmlformats.org/officeDocument/2006/relationships" xmlns:p="http://schemas.openxmlformats.org/presentationml/2006/main">
+<p:sld xmlns:a="http://schemas.openxmlformats.org/drawingml/2006/main" xmlns:r="http://schemas.openxmlformats.org/officeDocument/2006/relationships" xmlns:p="http://schemas.openxmlformats.org/presentationml/2006/main" xmlns:p14="http://schemas.microsoft.com/office/powerpoint/2010/main">
   <p:cSld>
     <p:spTree>
       <p:nvGrpSpPr>
@@ -10499,7 +10356,7 @@
       </p:sp>
       <p:pic>
         <p:nvPicPr>
-          <p:cNvPr id="67" name="그림 81" descr="C:/Users/Admin1/AppData/Roaming/PolarisOffice/ETemp/8940_18798640/fImage121983434604.png"/>
+          <p:cNvPr id="67" name="그림 81"/>
           <p:cNvPicPr>
             <a:picLocks noChangeAspect="1"/>
           </p:cNvPicPr>
@@ -10528,7 +10385,7 @@
       </p:pic>
       <p:pic>
         <p:nvPicPr>
-          <p:cNvPr id="69" name="그림 86" descr="C:/Users/Admin1/AppData/Roaming/PolarisOffice/ETemp/8940_18798640/fImage330252115705.png"/>
+          <p:cNvPr id="69" name="그림 86"/>
           <p:cNvPicPr>
             <a:picLocks noChangeAspect="1"/>
           </p:cNvPicPr>
@@ -10559,7 +10416,7 @@
       </p:pic>
       <p:pic>
         <p:nvPicPr>
-          <p:cNvPr id="70" name="그림 87" descr="C:/Users/Admin1/AppData/Roaming/PolarisOffice/ETemp/8940_18798640/fImage142403463902.png"/>
+          <p:cNvPr id="70" name="그림 87"/>
           <p:cNvPicPr>
             <a:picLocks noChangeAspect="1"/>
           </p:cNvPicPr>
@@ -10612,7 +10469,7 @@
 </file>
 
 <file path=ppt/slides/slide14.xml><?xml version="1.0" encoding="utf-8"?>
-<p:sld xmlns:a="http://schemas.openxmlformats.org/drawingml/2006/main" xmlns:r="http://schemas.openxmlformats.org/officeDocument/2006/relationships" xmlns:p="http://schemas.openxmlformats.org/presentationml/2006/main">
+<p:sld xmlns:a="http://schemas.openxmlformats.org/drawingml/2006/main" xmlns:r="http://schemas.openxmlformats.org/officeDocument/2006/relationships" xmlns:p="http://schemas.openxmlformats.org/presentationml/2006/main" xmlns:p14="http://schemas.microsoft.com/office/powerpoint/2010/main">
   <p:cSld>
     <p:spTree>
       <p:nvGrpSpPr>
@@ -10931,7 +10788,7 @@
       </p:sp>
       <p:pic>
         <p:nvPicPr>
-          <p:cNvPr id="71" name="그림 90" descr="C:/Users/Admin1/AppData/Roaming/PolarisOffice/ETemp/8940_18798640/fImage7012357153.png"/>
+          <p:cNvPr id="71" name="그림 90"/>
           <p:cNvPicPr>
             <a:picLocks noChangeAspect="1"/>
           </p:cNvPicPr>
@@ -10962,7 +10819,7 @@
       </p:pic>
       <p:pic>
         <p:nvPicPr>
-          <p:cNvPr id="72" name="그림 93" descr="C:/Users/Admin1/AppData/Roaming/PolarisOffice/ETemp/8940_18798640/fImage14240358292.png"/>
+          <p:cNvPr id="72" name="그림 93"/>
           <p:cNvPicPr>
             <a:picLocks noChangeAspect="1"/>
           </p:cNvPicPr>
@@ -10993,7 +10850,7 @@
       </p:pic>
       <p:pic>
         <p:nvPicPr>
-          <p:cNvPr id="73" name="그림 94" descr="C:/Users/Admin1/AppData/Roaming/PolarisOffice/ETemp/8940_18798640/fImage164213592382.png"/>
+          <p:cNvPr id="73" name="그림 94"/>
           <p:cNvPicPr>
             <a:picLocks noChangeAspect="1"/>
           </p:cNvPicPr>
@@ -11024,7 +10881,7 @@
       </p:pic>
       <p:pic>
         <p:nvPicPr>
-          <p:cNvPr id="74" name="그림 97" descr="C:/Users/Admin1/AppData/Roaming/PolarisOffice/ETemp/8940_18798640/fImage118943607421.png"/>
+          <p:cNvPr id="74" name="그림 97"/>
           <p:cNvPicPr>
             <a:picLocks noChangeAspect="1"/>
           </p:cNvPicPr>
@@ -11209,7 +11066,7 @@
 </file>
 
 <file path=ppt/slides/slide15.xml><?xml version="1.0" encoding="utf-8"?>
-<p:sld xmlns:a="http://schemas.openxmlformats.org/drawingml/2006/main" xmlns:r="http://schemas.openxmlformats.org/officeDocument/2006/relationships" xmlns:p="http://schemas.openxmlformats.org/presentationml/2006/main">
+<p:sld xmlns:a="http://schemas.openxmlformats.org/drawingml/2006/main" xmlns:r="http://schemas.openxmlformats.org/officeDocument/2006/relationships" xmlns:p="http://schemas.openxmlformats.org/presentationml/2006/main" xmlns:p14="http://schemas.microsoft.com/office/powerpoint/2010/main">
   <p:cSld>
     <p:spTree>
       <p:nvGrpSpPr>
@@ -11420,7 +11277,7 @@
       </p:sp>
       <p:pic>
         <p:nvPicPr>
-          <p:cNvPr id="79" name="Picture " descr="C:/Users/Admin1/AppData/Roaming/PolarisOffice/ETemp/8940_18798640/fImage113413958716.png"/>
+          <p:cNvPr id="79" name="Picture "/>
           <p:cNvPicPr>
             <a:picLocks noChangeAspect="1"/>
           </p:cNvPicPr>
@@ -11451,7 +11308,7 @@
       </p:pic>
       <p:pic>
         <p:nvPicPr>
-          <p:cNvPr id="80" name="Picture " descr="C:/Users/Admin1/AppData/Roaming/PolarisOffice/ETemp/8940_18798640/fImage114143969718.png"/>
+          <p:cNvPr id="80" name="Picture "/>
           <p:cNvPicPr>
             <a:picLocks noChangeAspect="1"/>
           </p:cNvPicPr>
@@ -11482,7 +11339,7 @@
       </p:pic>
       <p:pic>
         <p:nvPicPr>
-          <p:cNvPr id="81" name="Picture " descr="C:/Users/Admin1/AppData/Roaming/PolarisOffice/ETemp/8940_18798640/fImage113473979895.png"/>
+          <p:cNvPr id="81" name="Picture "/>
           <p:cNvPicPr>
             <a:picLocks noChangeAspect="1"/>
           </p:cNvPicPr>
@@ -11513,7 +11370,7 @@
       </p:pic>
       <p:pic>
         <p:nvPicPr>
-          <p:cNvPr id="82" name="Picture " descr="C:/Users/Admin1/AppData/Roaming/PolarisOffice/ETemp/8940_18798640/fImage113053985447.png"/>
+          <p:cNvPr id="82" name="Picture "/>
           <p:cNvPicPr>
             <a:picLocks noChangeAspect="1"/>
           </p:cNvPicPr>
@@ -11552,8 +11409,8 @@
         </p:nvSpPr>
         <p:spPr>
           <a:xfrm rot="0">
-            <a:off x="6807835" y="5544820"/>
-            <a:ext cx="4149090" cy="647065"/>
+            <a:off x="6807835" y="3608070"/>
+            <a:ext cx="4157980" cy="2585085"/>
           </a:xfrm>
           <a:prstGeom prst="rect"/>
           <a:noFill/>
@@ -11580,7 +11437,17 @@
                 <a:latin typeface="맑은 고딕" charset="0"/>
                 <a:ea typeface="맑은 고딕" charset="0"/>
               </a:rPr>
-              <a:t>32</a:t>
+              <a:t>3</a:t>
+            </a:r>
+            <a:r>
+              <a:rPr lang="ko-KR" sz="1800" b="1">
+                <a:solidFill>
+                  <a:srgbClr val="0611F2"/>
+                </a:solidFill>
+                <a:latin typeface="맑은 고딕" charset="0"/>
+                <a:ea typeface="맑은 고딕" charset="0"/>
+              </a:rPr>
+              <a:t>1</a:t>
             </a:r>
             <a:r>
               <a:rPr sz="1800" b="1">
@@ -11604,225 +11471,49 @@
                 <a:latin typeface="맑은 고딕" charset="0"/>
                 <a:ea typeface="맑은 고딕" charset="0"/>
               </a:rPr>
-              <a:t>이제 PlayFab 사이트에 접속하여 PlayFab에 로그인합니다.</a:t>
+              <a:t>마지막으로</a:t>
+            </a:r>
+            <a:r>
+              <a:rPr lang="ko-KR" sz="1800">
+                <a:latin typeface="맑은 고딕" charset="0"/>
+                <a:ea typeface="맑은 고딕" charset="0"/>
+              </a:rPr>
+              <a:t> </a:t>
+            </a:r>
+            <a:r>
+              <a:rPr lang="ko-KR" sz="1800">
+                <a:latin typeface="맑은 고딕" charset="0"/>
+                <a:ea typeface="맑은 고딕" charset="0"/>
+              </a:rPr>
+              <a:t>CharacterSystem 스크립트에서 OnTriggerEnter( ) 함수를 선언합니다.</a:t>
             </a:r>
             <a:endParaRPr lang="ko-KR" altLang="en-US" sz="1800">
               <a:latin typeface="맑은 고딕" charset="0"/>
               <a:ea typeface="맑은 고딕" charset="0"/>
             </a:endParaRPr>
           </a:p>
-        </p:txBody>
-      </p:sp>
-      <p:pic>
-        <p:nvPicPr>
-          <p:cNvPr id="86" name="그림 129" descr="C:/Users/Admin1/AppData/Roaming/PolarisOffice/ETemp/8940_18798640/fImage2063954071726.png"/>
-          <p:cNvPicPr>
-            <a:picLocks noChangeAspect="1"/>
-          </p:cNvPicPr>
-          <p:nvPr/>
-        </p:nvPicPr>
-        <p:blipFill rotWithShape="1">
-          <a:blip r:embed="rId6" cstate="hqprint">
-            <a:extLst>
-              <a:ext uri="{28A0092B-C50C-407E-A947-70E740481C1C}">
-                <a14:useLocalDpi xmlns:a14="http://schemas.microsoft.com/office/drawing/2010/main"/>
-              </a:ext>
-            </a:extLst>
-          </a:blip>
-          <a:stretch>
-            <a:fillRect/>
-          </a:stretch>
-        </p:blipFill>
-        <p:spPr>
-          <a:xfrm rot="0">
-            <a:off x="6808470" y="3840480"/>
-            <a:ext cx="4140200" cy="1597025"/>
-          </a:xfrm>
-          <a:prstGeom prst="roundRect"/>
-          <a:solidFill>
-            <a:srgbClr val="EDEDED"/>
-          </a:solidFill>
-        </p:spPr>
-      </p:pic>
-      <p:sp>
-        <p:nvSpPr>
-          <p:cNvPr id="87" name="텍스트 상자 131"/>
-          <p:cNvSpPr txBox="1">
-            <a:spLocks/>
-          </p:cNvSpPr>
-          <p:nvPr/>
-        </p:nvSpPr>
-        <p:spPr>
-          <a:xfrm rot="0">
-            <a:off x="6816725" y="2788285"/>
-            <a:ext cx="4134485" cy="954405"/>
-          </a:xfrm>
-          <a:prstGeom prst="rect"/>
-          <a:noFill/>
-          <a:ln w="0">
-            <a:noFill/>
-            <a:prstDash/>
-          </a:ln>
-        </p:spPr>
-        <p:txBody>
-          <a:bodyPr wrap="square" lIns="89535" tIns="46355" rIns="89535" bIns="46355" vert="horz" anchor="t">
-            <a:spAutoFit/>
-          </a:bodyPr>
-          <a:lstStyle/>
           <a:p>
             <a:pPr marL="0" indent="0" rtl="0" algn="l" defTabSz="914400" eaLnBrk="1" latinLnBrk="0" hangingPunct="1">
               <a:buFontTx/>
               <a:buNone/>
             </a:pPr>
-            <a:r>
-              <a:rPr sz="2000" b="1">
-                <a:solidFill>
-                  <a:srgbClr val="0611F2"/>
-                </a:solidFill>
-                <a:latin typeface="맑은 고딕" charset="0"/>
-                <a:ea typeface="맑은 고딕" charset="0"/>
-              </a:rPr>
-              <a:t>3</a:t>
-            </a:r>
-            <a:r>
-              <a:rPr sz="2000" b="1">
-                <a:solidFill>
-                  <a:srgbClr val="0611F2"/>
-                </a:solidFill>
-                <a:latin typeface="맑은 고딕" charset="0"/>
-                <a:ea typeface="맑은 고딕" charset="0"/>
-              </a:rPr>
-              <a:t>1.</a:t>
-            </a:r>
-            <a:r>
-              <a:rPr sz="1800">
-                <a:latin typeface="맑은 고딕" charset="0"/>
-                <a:ea typeface="맑은 고딕" charset="0"/>
-              </a:rPr>
-              <a:t> </a:t>
-            </a:r>
-            <a:r>
-              <a:rPr lang="ko-KR" sz="1800">
-                <a:latin typeface="맑은 고딕" charset="0"/>
-                <a:ea typeface="맑은 고딕" charset="0"/>
-              </a:rPr>
-              <a:t>그런 다음</a:t>
-            </a:r>
-            <a:r>
-              <a:rPr sz="1800">
-                <a:latin typeface="맑은 고딕" charset="0"/>
-                <a:ea typeface="맑은 고딕" charset="0"/>
-              </a:rPr>
-              <a:t> Google에서 PlayFab을 입력하고 Azure PlayFab이라는 사이트에 접속합니다. </a:t>
-            </a:r>
             <a:endParaRPr lang="ko-KR" altLang="en-US" sz="1800">
               <a:latin typeface="맑은 고딕" charset="0"/>
               <a:ea typeface="맑은 고딕" charset="0"/>
             </a:endParaRPr>
           </a:p>
-        </p:txBody>
-      </p:sp>
-      <p:pic>
-        <p:nvPicPr>
-          <p:cNvPr id="88" name="그림 132" descr="C:/Users/Admin1/AppData/Roaming/PolarisOffice/ETemp/8940_18798640/fImage221224104771.png"/>
-          <p:cNvPicPr>
-            <a:picLocks noChangeAspect="1"/>
-          </p:cNvPicPr>
-          <p:nvPr/>
-        </p:nvPicPr>
-        <p:blipFill rotWithShape="1">
-          <a:blip r:embed="rId7" cstate="hqprint">
-            <a:extLst>
-              <a:ext uri="{28A0092B-C50C-407E-A947-70E740481C1C}">
-                <a14:useLocalDpi xmlns:a14="http://schemas.microsoft.com/office/drawing/2010/main"/>
-              </a:ext>
-            </a:extLst>
-          </a:blip>
-          <a:stretch>
-            <a:fillRect/>
-          </a:stretch>
-        </p:blipFill>
-        <p:spPr>
-          <a:xfrm rot="0">
-            <a:off x="6816725" y="1421765"/>
-            <a:ext cx="4133850" cy="1272540"/>
-          </a:xfrm>
-          <a:prstGeom prst="roundRect"/>
-          <a:solidFill>
-            <a:srgbClr val="EDEDED"/>
-          </a:solidFill>
-        </p:spPr>
-      </p:pic>
-    </p:spTree>
-  </p:cSld>
-  <p:clrMapOvr>
-    <a:masterClrMapping/>
-  </p:clrMapOvr>
-  <mc:AlternateContent xmlns:mc="http://schemas.openxmlformats.org/markup-compatibility/2006">
-    <mc:Choice xmlns:p14="http://schemas.microsoft.com/office/powerpoint/2010/main" Requires="p14">
-      <p:transition spd="slow" p14:dur="2000"/>
-    </mc:Choice>
-    <mc:Fallback>
-      <p:transition spd="slow"/>
-    </mc:Fallback>
-  </mc:AlternateContent>
-  <p:timing>
-    <p:tnLst>
-      <p:par>
-        <p:cTn id="1" dur="indefinite" restart="never" nodeType="tmRoot"/>
-      </p:par>
-    </p:tnLst>
-  </p:timing>
-</p:sld>
-</file>
-
-<file path=ppt/slides/slide16.xml><?xml version="1.0" encoding="utf-8"?>
-<p:sld xmlns:a="http://schemas.openxmlformats.org/drawingml/2006/main" xmlns:r="http://schemas.openxmlformats.org/officeDocument/2006/relationships" xmlns:p="http://schemas.openxmlformats.org/presentationml/2006/main">
-  <p:cSld>
-    <p:spTree>
-      <p:nvGrpSpPr>
-        <p:cNvPr id="1" name=""/>
-        <p:cNvGrpSpPr/>
-        <p:nvPr/>
-      </p:nvGrpSpPr>
-      <p:grpSpPr>
-        <a:xfrm>
-          <a:off x="0" y="0"/>
-          <a:ext cx="0" cy="0"/>
-          <a:chOff x="0" y="0"/>
-          <a:chExt cx="0" cy="0"/>
-        </a:xfrm>
-      </p:grpSpPr>
-      <p:sp>
-        <p:nvSpPr>
-          <p:cNvPr id="29" name="Rect 0"/>
-          <p:cNvSpPr txBox="1">
-            <a:spLocks/>
-          </p:cNvSpPr>
-          <p:nvPr/>
-        </p:nvSpPr>
-        <p:spPr>
-          <a:xfrm rot="0">
-            <a:off x="1229995" y="1337310"/>
-            <a:ext cx="4039870" cy="371475"/>
-          </a:xfrm>
-          <a:prstGeom prst="rect"/>
-          <a:noFill/>
-          <a:ln w="0">
-            <a:noFill/>
-            <a:prstDash/>
-          </a:ln>
-        </p:spPr>
-        <p:txBody>
-          <a:bodyPr wrap="square" lIns="89535" tIns="46355" rIns="89535" bIns="46355" numCol="1" vert="horz" anchor="t">
-            <a:spAutoFit/>
-          </a:bodyPr>
-          <a:lstStyle/>
-          <a:p>
-            <a:pPr marL="0" indent="0" algn="l" latinLnBrk="0" hangingPunct="1">
-              <a:buFontTx/>
-              <a:buNone/>
-            </a:pPr>
+          <a:p>
+            <a:pPr marL="0" indent="0" rtl="0" algn="l" defTabSz="914400" eaLnBrk="1" latinLnBrk="0" hangingPunct="1">
+              <a:buFontTx/>
+              <a:buNone/>
+            </a:pPr>
+            <a:r>
+              <a:rPr lang="ko-KR" sz="1800">
+                <a:latin typeface="맑은 고딕" charset="0"/>
+                <a:ea typeface="맑은 고딕" charset="0"/>
+              </a:rPr>
+              <a:t>그런 다음 Crystal(Clone)이라는 오브젝트와 충돌했을 때 PhotonView ID를 통해 충돌한 오브젝트가 자신이라면 캐릭터와 충돌한 오브젝트를 삭제하도록 설정합니다. </a:t>
+            </a:r>
             <a:endParaRPr lang="ko-KR" altLang="en-US" sz="1800">
               <a:latin typeface="맑은 고딕" charset="0"/>
               <a:ea typeface="맑은 고딕" charset="0"/>
@@ -11830,145 +11521,16 @@
           </a:p>
         </p:txBody>
       </p:sp>
-      <p:sp>
-        <p:nvSpPr>
-          <p:cNvPr id="35" name="Rect 0"/>
-          <p:cNvSpPr txBox="1">
-            <a:spLocks/>
-          </p:cNvSpPr>
-          <p:nvPr/>
-        </p:nvSpPr>
-        <p:spPr>
-          <a:xfrm rot="0">
-            <a:off x="4151630" y="467995"/>
-            <a:ext cx="3895725" cy="554990"/>
-          </a:xfrm>
-          <a:prstGeom prst="rect"/>
-          <a:noFill/>
-          <a:ln w="0">
-            <a:noFill/>
-            <a:prstDash/>
-          </a:ln>
-        </p:spPr>
-        <p:txBody>
-          <a:bodyPr wrap="square" lIns="89535" tIns="46355" rIns="89535" bIns="46355" numCol="1" vert="horz" anchor="t">
-            <a:spAutoFit/>
-          </a:bodyPr>
-          <a:lstStyle/>
-          <a:p>
-            <a:pPr marL="0" indent="0" rtl="0" algn="l" defTabSz="914400" eaLnBrk="1" latinLnBrk="0" hangingPunct="1">
-              <a:buFontTx/>
-              <a:buNone/>
-            </a:pPr>
-            <a:r>
-              <a:rPr lang="ko-KR" sz="3000" b="1">
-                <a:latin typeface="맑은 고딕" charset="0"/>
-                <a:ea typeface="맑은 고딕" charset="0"/>
-              </a:rPr>
-              <a:t>열다섯</a:t>
-            </a:r>
-            <a:r>
-              <a:rPr lang="ko-KR" sz="3000" b="1">
-                <a:latin typeface="맑은 고딕" charset="0"/>
-                <a:ea typeface="맑은 고딕" charset="0"/>
-              </a:rPr>
-              <a:t> 번째 튜토리얼</a:t>
-            </a:r>
-            <a:r>
-              <a:rPr sz="3000" b="1">
-                <a:latin typeface="맑은 고딕" charset="0"/>
-                <a:ea typeface="맑은 고딕" charset="0"/>
-              </a:rPr>
-              <a:t> </a:t>
-            </a:r>
-            <a:endParaRPr lang="ko-KR" altLang="en-US" sz="3000" b="1">
-              <a:latin typeface="맑은 고딕" charset="0"/>
-              <a:ea typeface="맑은 고딕" charset="0"/>
-            </a:endParaRPr>
-          </a:p>
-        </p:txBody>
-      </p:sp>
-      <p:sp>
-        <p:nvSpPr>
-          <p:cNvPr id="56" name="Rect 0"/>
-          <p:cNvSpPr txBox="1">
-            <a:spLocks/>
-          </p:cNvSpPr>
-          <p:nvPr/>
-        </p:nvSpPr>
-        <p:spPr>
-          <a:xfrm rot="0">
-            <a:off x="1230630" y="5281295"/>
-            <a:ext cx="4148455" cy="923925"/>
-          </a:xfrm>
-          <a:prstGeom prst="rect"/>
-          <a:noFill/>
-          <a:ln w="0">
-            <a:noFill/>
-            <a:prstDash/>
-          </a:ln>
-        </p:spPr>
-        <p:txBody>
-          <a:bodyPr wrap="square" lIns="89535" tIns="46355" rIns="89535" bIns="46355" numCol="1" vert="horz" anchor="t">
-            <a:spAutoFit/>
-          </a:bodyPr>
-          <a:lstStyle/>
-          <a:p>
-            <a:pPr marL="0" indent="0" rtl="0" algn="l" defTabSz="914400" eaLnBrk="1" latinLnBrk="0" hangingPunct="1">
-              <a:buFontTx/>
-              <a:buNone/>
-            </a:pPr>
-            <a:r>
-              <a:rPr lang="ko-KR" sz="1800" b="1">
-                <a:solidFill>
-                  <a:srgbClr val="0611F2"/>
-                </a:solidFill>
-                <a:latin typeface="맑은 고딕" charset="0"/>
-                <a:ea typeface="맑은 고딕" charset="0"/>
-              </a:rPr>
-              <a:t>33</a:t>
-            </a:r>
-            <a:r>
-              <a:rPr sz="1800" b="1">
-                <a:solidFill>
-                  <a:srgbClr val="0611F2"/>
-                </a:solidFill>
-                <a:latin typeface="맑은 고딕" charset="0"/>
-                <a:ea typeface="맑은 고딕" charset="0"/>
-              </a:rPr>
-              <a:t>.</a:t>
-            </a:r>
-            <a:r>
-              <a:rPr sz="1800">
-                <a:latin typeface="맑은 고딕" charset="0"/>
-                <a:ea typeface="맑은 고딕" charset="0"/>
-              </a:rPr>
-              <a:t> </a:t>
-            </a:r>
-            <a:r>
-              <a:rPr lang="ko-KR" sz="1800">
-                <a:latin typeface="맑은 고딕" charset="0"/>
-                <a:ea typeface="맑은 고딕" charset="0"/>
-              </a:rPr>
-              <a:t>그다음 PlayFab에 전자 메일 주소와 암호를 입력하고 로그인을 선택합니다.</a:t>
-            </a:r>
-            <a:endParaRPr lang="ko-KR" altLang="en-US" sz="1800">
-              <a:latin typeface="맑은 고딕" charset="0"/>
-              <a:ea typeface="맑은 고딕" charset="0"/>
-            </a:endParaRPr>
-          </a:p>
-        </p:txBody>
-      </p:sp>
       <p:pic>
         <p:nvPicPr>
-          <p:cNvPr id="83" name="그림 121" descr="C:/Users/Admin1/AppData/Roaming/PolarisOffice/ETemp/8940_18798640/fImage161373891538.png"/>
+          <p:cNvPr id="86" name="그림 1" descr="C:/Users/Admin1/AppData/Roaming/PolarisOffice/ETemp/23364_9930448/fImage974935641.png"/>
           <p:cNvPicPr>
             <a:picLocks noChangeAspect="1"/>
           </p:cNvPicPr>
           <p:nvPr/>
         </p:nvPicPr>
         <p:blipFill rotWithShape="1">
-          <a:blip r:embed="rId2" cstate="print">
+          <a:blip r:embed="rId9" cstate="print">
             <a:extLst>
               <a:ext uri="{28A0092B-C50C-407E-A947-70E740481C1C}">
                 <a14:useLocalDpi xmlns:a14="http://schemas.microsoft.com/office/drawing/2010/main" val="0"/>
@@ -11981,146 +11543,11 @@
         </p:blipFill>
         <p:spPr>
           <a:xfrm rot="0">
-            <a:off x="6808470" y="1404620"/>
-            <a:ext cx="2552700" cy="3650615"/>
-          </a:xfrm>
-          <a:prstGeom prst="roundRect"/>
-          <a:solidFill>
-            <a:srgbClr val="EDEDED"/>
-          </a:solidFill>
-        </p:spPr>
-      </p:pic>
-      <p:pic>
-        <p:nvPicPr>
-          <p:cNvPr id="84" name="그림 124" descr="C:/Users/Admin1/AppData/Roaming/PolarisOffice/ETemp/8940_18798640/fImage33013901869.png"/>
-          <p:cNvPicPr>
-            <a:picLocks noChangeAspect="1"/>
-          </p:cNvPicPr>
-          <p:nvPr/>
-        </p:nvPicPr>
-        <p:blipFill rotWithShape="1">
-          <a:blip r:embed="rId3" cstate="print">
-            <a:extLst>
-              <a:ext uri="{28A0092B-C50C-407E-A947-70E740481C1C}">
-                <a14:useLocalDpi xmlns:a14="http://schemas.microsoft.com/office/drawing/2010/main" val="0"/>
-              </a:ext>
-            </a:extLst>
-          </a:blip>
-          <a:stretch>
-            <a:fillRect/>
-          </a:stretch>
-        </p:blipFill>
-        <p:spPr>
-          <a:xfrm rot="0">
-            <a:off x="9526905" y="2045335"/>
-            <a:ext cx="1430655" cy="2386330"/>
-          </a:xfrm>
-          <a:prstGeom prst="roundRect"/>
-          <a:solidFill>
-            <a:srgbClr val="EDEDED"/>
-          </a:solidFill>
-        </p:spPr>
-      </p:pic>
-      <p:sp>
-        <p:nvSpPr>
-          <p:cNvPr id="85" name="텍스트 상자 127"/>
-          <p:cNvSpPr txBox="1">
-            <a:spLocks/>
-          </p:cNvSpPr>
-          <p:nvPr/>
-        </p:nvSpPr>
-        <p:spPr>
-          <a:xfrm rot="0">
-            <a:off x="6814185" y="5278755"/>
-            <a:ext cx="4148455" cy="923925"/>
+            <a:off x="6816725" y="1421765"/>
+            <a:ext cx="4140835" cy="2087245"/>
           </a:xfrm>
           <a:prstGeom prst="rect"/>
           <a:noFill/>
-          <a:ln w="0">
-            <a:noFill/>
-            <a:prstDash/>
-          </a:ln>
-        </p:spPr>
-        <p:txBody>
-          <a:bodyPr wrap="square" lIns="89535" tIns="46355" rIns="89535" bIns="46355" numCol="1" vert="horz" anchor="t">
-            <a:spAutoFit/>
-          </a:bodyPr>
-          <a:lstStyle/>
-          <a:p>
-            <a:pPr marL="0" indent="0" rtl="0" algn="l" defTabSz="914400" eaLnBrk="1" latinLnBrk="0" hangingPunct="1">
-              <a:buFontTx/>
-              <a:buNone/>
-            </a:pPr>
-            <a:r>
-              <a:rPr lang="ko-KR" sz="1800" b="1">
-                <a:solidFill>
-                  <a:srgbClr val="0611F2"/>
-                </a:solidFill>
-                <a:latin typeface="맑은 고딕" charset="0"/>
-                <a:ea typeface="맑은 고딕" charset="0"/>
-              </a:rPr>
-              <a:t>31</a:t>
-            </a:r>
-            <a:r>
-              <a:rPr sz="1800" b="1">
-                <a:solidFill>
-                  <a:srgbClr val="0611F2"/>
-                </a:solidFill>
-                <a:latin typeface="맑은 고딕" charset="0"/>
-                <a:ea typeface="맑은 고딕" charset="0"/>
-              </a:rPr>
-              <a:t>.</a:t>
-            </a:r>
-            <a:r>
-              <a:rPr sz="1800">
-                <a:latin typeface="맑은 고딕" charset="0"/>
-                <a:ea typeface="맑은 고딕" charset="0"/>
-              </a:rPr>
-              <a:t> </a:t>
-            </a:r>
-            <a:r>
-              <a:rPr lang="ko-KR" sz="1800">
-                <a:latin typeface="맑은 고딕" charset="0"/>
-                <a:ea typeface="맑은 고딕" charset="0"/>
-              </a:rPr>
-              <a:t>마지막으로 Game DB에 설정을 선택한 다음 타이틀 설정을 선택합니다.</a:t>
-            </a:r>
-            <a:endParaRPr lang="ko-KR" altLang="en-US" sz="1800">
-              <a:latin typeface="맑은 고딕" charset="0"/>
-              <a:ea typeface="맑은 고딕" charset="0"/>
-            </a:endParaRPr>
-          </a:p>
-        </p:txBody>
-      </p:sp>
-      <p:pic>
-        <p:nvPicPr>
-          <p:cNvPr id="86" name="그림 130" descr="C:/Users/Admin1/AppData/Roaming/PolarisOffice/ETemp/8940_18798640/fImage235094089912.png"/>
-          <p:cNvPicPr>
-            <a:picLocks noChangeAspect="1"/>
-          </p:cNvPicPr>
-          <p:nvPr/>
-        </p:nvPicPr>
-        <p:blipFill rotWithShape="1">
-          <a:blip r:embed="rId4" cstate="print">
-            <a:extLst>
-              <a:ext uri="{28A0092B-C50C-407E-A947-70E740481C1C}">
-                <a14:useLocalDpi xmlns:a14="http://schemas.microsoft.com/office/drawing/2010/main" val="0"/>
-              </a:ext>
-            </a:extLst>
-          </a:blip>
-          <a:stretch>
-            <a:fillRect/>
-          </a:stretch>
-        </p:blipFill>
-        <p:spPr>
-          <a:xfrm rot="0">
-            <a:off x="1230630" y="1404620"/>
-            <a:ext cx="4148455" cy="3750310"/>
-          </a:xfrm>
-          <a:prstGeom prst="roundRect"/>
-          <a:solidFill>
-            <a:srgbClr val="EDEDED"/>
-          </a:solidFill>
         </p:spPr>
       </p:pic>
     </p:spTree>
@@ -13075,7 +12502,7 @@
       </p:sp>
       <p:pic>
         <p:nvPicPr>
-          <p:cNvPr id="1055" name="그림 6" descr="C:/Users/Admin1/AppData/Roaming/PolarisOffice/ETemp/8940_18798640/fImage1928117041.png"/>
+          <p:cNvPr id="1055" name="그림 6"/>
           <p:cNvPicPr>
             <a:picLocks noChangeAspect="1"/>
           </p:cNvPicPr>
@@ -13167,7 +12594,7 @@
       </p:sp>
       <p:pic>
         <p:nvPicPr>
-          <p:cNvPr id="1057" name="그림 14" descr="C:/Users/Admin1/AppData/Roaming/PolarisOffice/ETemp/8940_18798640/fImage923426541.png"/>
+          <p:cNvPr id="1057" name="그림 14"/>
           <p:cNvPicPr>
             <a:picLocks noChangeAspect="1"/>
           </p:cNvPicPr>
@@ -13418,7 +12845,7 @@
       </p:sp>
       <p:pic>
         <p:nvPicPr>
-          <p:cNvPr id="14" name="그림 15" descr="C:/Users/Admin1/AppData/Roaming/PolarisOffice/ETemp/8940_18798640/fImage54331748467.png"/>
+          <p:cNvPr id="14" name="그림 15"/>
           <p:cNvPicPr>
             <a:picLocks noChangeAspect="1"/>
           </p:cNvPicPr>
@@ -13449,7 +12876,7 @@
       </p:pic>
       <p:pic>
         <p:nvPicPr>
-          <p:cNvPr id="18" name="그림 35" descr="C:/Users/Admin1/AppData/Roaming/PolarisOffice/ETemp/8940_18798640/fImage54801899169.png"/>
+          <p:cNvPr id="18" name="그림 35"/>
           <p:cNvPicPr>
             <a:picLocks noChangeAspect="1"/>
           </p:cNvPicPr>
@@ -13558,7 +12985,7 @@
       </p:sp>
       <p:pic>
         <p:nvPicPr>
-          <p:cNvPr id="20" name="그림 3" descr="C:/Users/Admin1/AppData/Roaming/PolarisOffice/ETemp/8940_18798640/fImage113352608467.png"/>
+          <p:cNvPr id="20" name="그림 3"/>
           <p:cNvPicPr>
             <a:picLocks noChangeAspect="1"/>
           </p:cNvPicPr>
@@ -13589,7 +13016,7 @@
       </p:pic>
       <p:pic>
         <p:nvPicPr>
-          <p:cNvPr id="21" name="그림 11" descr="C:/Users/Admin1/AppData/Roaming/PolarisOffice/ETemp/8940_18798640/fImage127332646334.png"/>
+          <p:cNvPr id="21" name="그림 11"/>
           <p:cNvPicPr>
             <a:picLocks noChangeAspect="1"/>
           </p:cNvPicPr>
@@ -13652,7 +13079,7 @@
       </p:cxnSp>
       <p:pic>
         <p:nvPicPr>
-          <p:cNvPr id="22" name="그림 24" descr="C:/Users/Admin1/AppData/Roaming/PolarisOffice/ETemp/8940_18798640/fImage119382726500.png"/>
+          <p:cNvPr id="22" name="그림 24"/>
           <p:cNvPicPr>
             <a:picLocks noChangeAspect="1"/>
           </p:cNvPicPr>
@@ -13683,7 +13110,7 @@
       </p:pic>
       <p:pic>
         <p:nvPicPr>
-          <p:cNvPr id="23" name="그림 29" descr="C:/Users/Admin1/AppData/Roaming/PolarisOffice/ETemp/8940_18798640/fImage223252759169.png"/>
+          <p:cNvPr id="23" name="그림 29"/>
           <p:cNvPicPr>
             <a:picLocks noChangeAspect="1"/>
           </p:cNvPicPr>
@@ -13805,7 +13232,7 @@
       </p:sp>
       <p:pic>
         <p:nvPicPr>
-          <p:cNvPr id="9" name="그림 41" descr="C:/Users/Admin1/AppData/Roaming/PolarisOffice/ETemp/8940_18798640/fImage191501945724.png"/>
+          <p:cNvPr id="9" name="그림 41"/>
           <p:cNvPicPr>
             <a:picLocks noChangeAspect="1"/>
           </p:cNvPicPr>
@@ -13935,7 +13362,7 @@
       </p:sp>
       <p:pic>
         <p:nvPicPr>
-          <p:cNvPr id="12" name="그림 94" descr="C:/Users/Admin1/AppData/Roaming/PolarisOffice/ETemp/8940_18798640/fImage125483459358.png"/>
+          <p:cNvPr id="12" name="그림 94"/>
           <p:cNvPicPr>
             <a:picLocks noChangeAspect="1"/>
           </p:cNvPicPr>
@@ -14037,7 +13464,7 @@
       </p:sp>
       <p:pic>
         <p:nvPicPr>
-          <p:cNvPr id="14" name="그림 19" descr="C:/Users/Admin1/AppData/Roaming/PolarisOffice/ETemp/8940_18798640/fImage100302685724.png"/>
+          <p:cNvPr id="14" name="그림 19"/>
           <p:cNvPicPr>
             <a:picLocks noChangeAspect="1"/>
           </p:cNvPicPr>
@@ -14068,7 +13495,7 @@
       </p:pic>
       <p:pic>
         <p:nvPicPr>
-          <p:cNvPr id="15" name="그림 22" descr="C:/Users/Admin1/AppData/Roaming/PolarisOffice/ETemp/8940_18798640/fImage173371898467.png"/>
+          <p:cNvPr id="15" name="그림 22"/>
           <p:cNvPicPr>
             <a:picLocks noChangeAspect="1"/>
           </p:cNvPicPr>
@@ -14285,7 +13712,7 @@
       </p:sp>
       <p:pic>
         <p:nvPicPr>
-          <p:cNvPr id="4" name="그림 12" descr="C:/Users/Admin1/AppData/Roaming/PolarisOffice/ETemp/8940_18798640/fImage64291715724.png"/>
+          <p:cNvPr id="4" name="그림 12"/>
           <p:cNvPicPr>
             <a:picLocks noChangeAspect="1"/>
           </p:cNvPicPr>
@@ -14442,7 +13869,7 @@
       </p:sp>
       <p:pic>
         <p:nvPicPr>
-          <p:cNvPr id="11" name="그림 93" descr="C:/Users/Admin1/AppData/Roaming/PolarisOffice/ETemp/8940_18798640/fImage121013266962.png"/>
+          <p:cNvPr id="11" name="그림 93"/>
           <p:cNvPicPr>
             <a:picLocks noChangeAspect="1"/>
           </p:cNvPicPr>
@@ -14517,7 +13944,7 @@
       </p:sp>
       <p:pic>
         <p:nvPicPr>
-          <p:cNvPr id="13" name="그림 18" descr="C:/Users/Admin1/AppData/Roaming/PolarisOffice/ETemp/8940_18798640/fImage603472316500.png"/>
+          <p:cNvPr id="13" name="그림 18"/>
           <p:cNvPicPr>
             <a:picLocks noChangeAspect="1"/>
           </p:cNvPicPr>
@@ -14744,7 +14171,7 @@
       </p:sp>
       <p:pic>
         <p:nvPicPr>
-          <p:cNvPr id="16" name="그림 32" descr="C:/Users/Admin1/AppData/Roaming/PolarisOffice/ETemp/8940_18798640/fImage21692074464.png"/>
+          <p:cNvPr id="16" name="그림 32"/>
           <p:cNvPicPr>
             <a:picLocks noChangeAspect="1"/>
           </p:cNvPicPr>
@@ -14775,7 +14202,7 @@
       </p:pic>
       <p:pic>
         <p:nvPicPr>
-          <p:cNvPr id="17" name="그림 37" descr="C:/Users/Admin1/AppData/Roaming/PolarisOffice/ETemp/8940_18798640/fImage330252115705.png"/>
+          <p:cNvPr id="17" name="그림 37"/>
           <p:cNvPicPr>
             <a:picLocks noChangeAspect="1"/>
           </p:cNvPicPr>
@@ -14904,7 +14331,7 @@
       </p:sp>
       <p:pic>
         <p:nvPicPr>
-          <p:cNvPr id="26" name="그림 51" descr="C:/Users/Admin1/AppData/Roaming/PolarisOffice/ETemp/8940_18798640/fImage94852004464.png"/>
+          <p:cNvPr id="26" name="그림 51"/>
           <p:cNvPicPr>
             <a:picLocks noChangeAspect="1"/>
           </p:cNvPicPr>
@@ -14970,7 +14397,7 @@
       </p:cxnSp>
       <p:pic>
         <p:nvPicPr>
-          <p:cNvPr id="27" name="그림 54" descr="C:/Users/Admin1/AppData/Roaming/PolarisOffice/ETemp/8940_18798640/fImage97142015705.png"/>
+          <p:cNvPr id="27" name="그림 54"/>
           <p:cNvPicPr>
             <a:picLocks noChangeAspect="1"/>
           </p:cNvPicPr>
@@ -15348,7 +14775,7 @@
       </p:sp>
       <p:pic>
         <p:nvPicPr>
-          <p:cNvPr id="38" name="그림 37" descr="C:/Users/Admin1/AppData/Roaming/PolarisOffice/ETemp/8940_18798640/fImage150362771478.png"/>
+          <p:cNvPr id="38" name="그림 37"/>
           <p:cNvPicPr>
             <a:picLocks noChangeAspect="1"/>
           </p:cNvPicPr>
@@ -15377,7 +14804,7 @@
       </p:pic>
       <p:pic>
         <p:nvPicPr>
-          <p:cNvPr id="39" name="그림 38" descr="C:/Users/Admin1/AppData/Roaming/PolarisOffice/ETemp/8940_18798640/fImage135102789358.png"/>
+          <p:cNvPr id="39" name="그림 38"/>
           <p:cNvPicPr>
             <a:picLocks noChangeAspect="1"/>
           </p:cNvPicPr>

</xml_diff>

<commit_message>
Implementing The Store System
- Layout and build the shop
  interface

- Photon Room Data Update

- Implemented to be able to
  purchase items on the server

- Add and delete resource data
</commit_message>
<xml_diff>
--- a/Assets/Class/Photon Server/PPT Data/Photon RPC.pptx
+++ b/Assets/Class/Photon Server/PPT Data/Photon RPC.pptx
@@ -2,27 +2,27 @@
 <file path=ppt/presentation.xml><?xml version="1.0" encoding="utf-8"?>
 <p:presentation xmlns:a="http://schemas.openxmlformats.org/drawingml/2006/main" xmlns:r="http://schemas.openxmlformats.org/officeDocument/2006/relationships" xmlns:p="http://schemas.openxmlformats.org/presentationml/2006/main" xmlns:p14="http://schemas.microsoft.com/office/powerpoint/2010/main" saveSubsetFonts="1" firstSlideNum="0">
   <p:sldMasterIdLst>
-    <p:sldMasterId id="2147486866" r:id="rId12"/>
+    <p:sldMasterId id="2147486867" r:id="rId12"/>
   </p:sldMasterIdLst>
   <p:notesMasterIdLst>
     <p:notesMasterId r:id="rId14"/>
   </p:notesMasterIdLst>
   <p:sldIdLst>
     <p:sldId id="303" r:id="rId16"/>
-    <p:sldId id="315" r:id="rId17"/>
-    <p:sldId id="317" r:id="rId18"/>
-    <p:sldId id="320" r:id="rId19"/>
-    <p:sldId id="316" r:id="rId20"/>
-    <p:sldId id="318" r:id="rId21"/>
-    <p:sldId id="314" r:id="rId22"/>
-    <p:sldId id="319" r:id="rId23"/>
-    <p:sldId id="322" r:id="rId24"/>
-    <p:sldId id="323" r:id="rId25"/>
-    <p:sldId id="324" r:id="rId26"/>
-    <p:sldId id="325" r:id="rId27"/>
-    <p:sldId id="326" r:id="rId28"/>
-    <p:sldId id="327" r:id="rId29"/>
-    <p:sldId id="329" r:id="rId30"/>
+    <p:sldId id="315" r:id="rId18"/>
+    <p:sldId id="317" r:id="rId20"/>
+    <p:sldId id="320" r:id="rId22"/>
+    <p:sldId id="316" r:id="rId24"/>
+    <p:sldId id="318" r:id="rId26"/>
+    <p:sldId id="314" r:id="rId28"/>
+    <p:sldId id="319" r:id="rId30"/>
+    <p:sldId id="322" r:id="rId32"/>
+    <p:sldId id="323" r:id="rId34"/>
+    <p:sldId id="324" r:id="rId36"/>
+    <p:sldId id="325" r:id="rId38"/>
+    <p:sldId id="326" r:id="rId39"/>
+    <p:sldId id="327" r:id="rId41"/>
+    <p:sldId id="329" r:id="rId43"/>
   </p:sldIdLst>
   <p:sldSz cx="12192000" cy="6858000"/>
   <p:notesSz cx="6858000" cy="9144000"/>
@@ -9842,17 +9842,17 @@
       </p:pic>
       <p:pic>
         <p:nvPicPr>
-          <p:cNvPr id="62" name="그림 67"/>
+          <p:cNvPr id="62" name="그림 67" descr="C:/Users/Admin1/AppData/Roaming/PolarisOffice/ETemp/6568_14335912/fImage22353224827.png"/>
           <p:cNvPicPr>
             <a:picLocks noChangeAspect="1"/>
           </p:cNvPicPr>
           <p:nvPr/>
         </p:nvPicPr>
         <p:blipFill rotWithShape="1">
-          <a:blip r:embed="rId4" cstate="print">
+          <a:blip r:embed="rId4" cstate="hqprint">
             <a:extLst>
               <a:ext uri="{28A0092B-C50C-407E-A947-70E740481C1C}">
-                <a14:useLocalDpi xmlns:a14="http://schemas.microsoft.com/office/drawing/2010/main" val="0"/>
+                <a14:useLocalDpi xmlns:a14="http://schemas.microsoft.com/office/drawing/2010/main"/>
               </a:ext>
             </a:extLst>
           </a:blip>
@@ -9862,8 +9862,8 @@
         </p:blipFill>
         <p:spPr>
           <a:xfrm rot="0">
-            <a:off x="4281805" y="3242310"/>
-            <a:ext cx="686435" cy="706755"/>
+            <a:off x="4314825" y="3242310"/>
+            <a:ext cx="654050" cy="707390"/>
           </a:xfrm>
           <a:prstGeom prst="roundRect"/>
           <a:solidFill>
@@ -9881,14 +9881,13 @@
           <p:nvPr/>
         </p:nvCxnSpPr>
         <p:spPr>
-          <a:xfrm rot="0" flipV="1">
-            <a:off x="4624705" y="2826385"/>
-            <a:ext cx="10160" cy="416560"/>
+          <a:xfrm rot="0" flipH="1" flipV="1">
+            <a:off x="4634865" y="2827020"/>
+            <a:ext cx="6985" cy="415925"/>
           </a:xfrm>
           <a:prstGeom prst="straightConnector1"/>
           <a:ln w="6350" cap="flat" cmpd="sng">
             <a:prstDash/>
-            <a:headEnd type="none" w="med" len="med"/>
             <a:tailEnd type="triangle" w="med" len="med"/>
           </a:ln>
         </p:spPr>

</xml_diff>